<commit_message>
added simple nonlinear system example with nmpc
</commit_message>
<xml_diff>
--- a/figures/figures.pptx
+++ b/figures/figures.pptx
@@ -105,6 +105,11 @@
       </a:defRPr>
     </a:lvl9pPr>
   </p:defaultTextStyle>
+  <p:extLst>
+    <p:ext uri="{EFAFB233-063F-42B5-8137-9DF3F51BA10A}">
+      <p15:sldGuideLst xmlns:p15="http://schemas.microsoft.com/office/powerpoint/2012/main"/>
+    </p:ext>
+  </p:extLst>
 </p:presentation>
 </file>
 
@@ -255,7 +260,7 @@
           <a:p>
             <a:fld id="{A85E4C48-C885-47B0-A871-75BBED92D34D}" type="datetimeFigureOut">
               <a:rPr lang="en-US" smtClean="0"/>
-              <a:t>3/20/2024</a:t>
+              <a:t>3/21/2024</a:t>
             </a:fld>
             <a:endParaRPr lang="en-US"/>
           </a:p>
@@ -453,7 +458,7 @@
           <a:p>
             <a:fld id="{A85E4C48-C885-47B0-A871-75BBED92D34D}" type="datetimeFigureOut">
               <a:rPr lang="en-US" smtClean="0"/>
-              <a:t>3/20/2024</a:t>
+              <a:t>3/21/2024</a:t>
             </a:fld>
             <a:endParaRPr lang="en-US"/>
           </a:p>
@@ -661,7 +666,7 @@
           <a:p>
             <a:fld id="{A85E4C48-C885-47B0-A871-75BBED92D34D}" type="datetimeFigureOut">
               <a:rPr lang="en-US" smtClean="0"/>
-              <a:t>3/20/2024</a:t>
+              <a:t>3/21/2024</a:t>
             </a:fld>
             <a:endParaRPr lang="en-US"/>
           </a:p>
@@ -859,7 +864,7 @@
           <a:p>
             <a:fld id="{A85E4C48-C885-47B0-A871-75BBED92D34D}" type="datetimeFigureOut">
               <a:rPr lang="en-US" smtClean="0"/>
-              <a:t>3/20/2024</a:t>
+              <a:t>3/21/2024</a:t>
             </a:fld>
             <a:endParaRPr lang="en-US"/>
           </a:p>
@@ -1134,7 +1139,7 @@
           <a:p>
             <a:fld id="{A85E4C48-C885-47B0-A871-75BBED92D34D}" type="datetimeFigureOut">
               <a:rPr lang="en-US" smtClean="0"/>
-              <a:t>3/20/2024</a:t>
+              <a:t>3/21/2024</a:t>
             </a:fld>
             <a:endParaRPr lang="en-US"/>
           </a:p>
@@ -1399,7 +1404,7 @@
           <a:p>
             <a:fld id="{A85E4C48-C885-47B0-A871-75BBED92D34D}" type="datetimeFigureOut">
               <a:rPr lang="en-US" smtClean="0"/>
-              <a:t>3/20/2024</a:t>
+              <a:t>3/21/2024</a:t>
             </a:fld>
             <a:endParaRPr lang="en-US"/>
           </a:p>
@@ -1811,7 +1816,7 @@
           <a:p>
             <a:fld id="{A85E4C48-C885-47B0-A871-75BBED92D34D}" type="datetimeFigureOut">
               <a:rPr lang="en-US" smtClean="0"/>
-              <a:t>3/20/2024</a:t>
+              <a:t>3/21/2024</a:t>
             </a:fld>
             <a:endParaRPr lang="en-US"/>
           </a:p>
@@ -1952,7 +1957,7 @@
           <a:p>
             <a:fld id="{A85E4C48-C885-47B0-A871-75BBED92D34D}" type="datetimeFigureOut">
               <a:rPr lang="en-US" smtClean="0"/>
-              <a:t>3/20/2024</a:t>
+              <a:t>3/21/2024</a:t>
             </a:fld>
             <a:endParaRPr lang="en-US"/>
           </a:p>
@@ -2065,7 +2070,7 @@
           <a:p>
             <a:fld id="{A85E4C48-C885-47B0-A871-75BBED92D34D}" type="datetimeFigureOut">
               <a:rPr lang="en-US" smtClean="0"/>
-              <a:t>3/20/2024</a:t>
+              <a:t>3/21/2024</a:t>
             </a:fld>
             <a:endParaRPr lang="en-US"/>
           </a:p>
@@ -2376,7 +2381,7 @@
           <a:p>
             <a:fld id="{A85E4C48-C885-47B0-A871-75BBED92D34D}" type="datetimeFigureOut">
               <a:rPr lang="en-US" smtClean="0"/>
-              <a:t>3/20/2024</a:t>
+              <a:t>3/21/2024</a:t>
             </a:fld>
             <a:endParaRPr lang="en-US"/>
           </a:p>
@@ -2664,7 +2669,7 @@
           <a:p>
             <a:fld id="{A85E4C48-C885-47B0-A871-75BBED92D34D}" type="datetimeFigureOut">
               <a:rPr lang="en-US" smtClean="0"/>
-              <a:t>3/20/2024</a:t>
+              <a:t>3/21/2024</a:t>
             </a:fld>
             <a:endParaRPr lang="en-US"/>
           </a:p>
@@ -2905,7 +2910,7 @@
           <a:p>
             <a:fld id="{A85E4C48-C885-47B0-A871-75BBED92D34D}" type="datetimeFigureOut">
               <a:rPr lang="en-US" smtClean="0"/>
-              <a:t>3/20/2024</a:t>
+              <a:t>3/21/2024</a:t>
             </a:fld>
             <a:endParaRPr lang="en-US"/>
           </a:p>
@@ -3324,10 +3329,10 @@
       </p:grpSpPr>
       <p:grpSp>
         <p:nvGrpSpPr>
-          <p:cNvPr id="6" name="Group 5">
-            <a:extLst>
-              <a:ext uri="{FF2B5EF4-FFF2-40B4-BE49-F238E27FC236}">
-                <a16:creationId xmlns:a16="http://schemas.microsoft.com/office/drawing/2014/main" id="{BAA0B044-43A2-E64D-B92E-190FA74067C3}"/>
+          <p:cNvPr id="7" name="Group 6">
+            <a:extLst>
+              <a:ext uri="{FF2B5EF4-FFF2-40B4-BE49-F238E27FC236}">
+                <a16:creationId xmlns:a16="http://schemas.microsoft.com/office/drawing/2014/main" id="{A8D4AE21-C46B-1DD5-3212-CC032170DCEE}"/>
               </a:ext>
             </a:extLst>
           </p:cNvPr>
@@ -3342,66 +3347,12 @@
             <a:chExt cx="8289096" cy="4225290"/>
           </a:xfrm>
         </p:grpSpPr>
-        <p:sp>
-          <p:nvSpPr>
-            <p:cNvPr id="46" name="Rectangle 45">
+        <p:grpSp>
+          <p:nvGrpSpPr>
+            <p:cNvPr id="6" name="Group 5">
               <a:extLst>
                 <a:ext uri="{FF2B5EF4-FFF2-40B4-BE49-F238E27FC236}">
-                  <a16:creationId xmlns:a16="http://schemas.microsoft.com/office/drawing/2014/main" id="{4A6A7986-58DE-FD91-8650-0090C0676BC2}"/>
-                </a:ext>
-              </a:extLst>
-            </p:cNvPr>
-            <p:cNvSpPr/>
-            <p:nvPr/>
-          </p:nvSpPr>
-          <p:spPr>
-            <a:xfrm>
-              <a:off x="1167155" y="809625"/>
-              <a:ext cx="8289096" cy="4225290"/>
-            </a:xfrm>
-            <a:prstGeom prst="rect">
-              <a:avLst/>
-            </a:prstGeom>
-            <a:solidFill>
-              <a:schemeClr val="bg1"/>
-            </a:solidFill>
-            <a:ln>
-              <a:solidFill>
-                <a:schemeClr val="bg1"/>
-              </a:solidFill>
-            </a:ln>
-          </p:spPr>
-          <p:style>
-            <a:lnRef idx="2">
-              <a:schemeClr val="accent1">
-                <a:shade val="50000"/>
-              </a:schemeClr>
-            </a:lnRef>
-            <a:fillRef idx="1">
-              <a:schemeClr val="accent1"/>
-            </a:fillRef>
-            <a:effectRef idx="0">
-              <a:schemeClr val="accent1"/>
-            </a:effectRef>
-            <a:fontRef idx="minor">
-              <a:schemeClr val="lt1"/>
-            </a:fontRef>
-          </p:style>
-          <p:txBody>
-            <a:bodyPr rtlCol="0" anchor="ctr"/>
-            <a:lstStyle/>
-            <a:p>
-              <a:pPr algn="ctr"/>
-              <a:endParaRPr lang="en-US"/>
-            </a:p>
-          </p:txBody>
-        </p:sp>
-        <p:grpSp>
-          <p:nvGrpSpPr>
-            <p:cNvPr id="39" name="Group 38">
-              <a:extLst>
-                <a:ext uri="{FF2B5EF4-FFF2-40B4-BE49-F238E27FC236}">
-                  <a16:creationId xmlns:a16="http://schemas.microsoft.com/office/drawing/2014/main" id="{36A21939-B82E-EEE6-2EBD-9D3DB1FBE5A5}"/>
+                  <a16:creationId xmlns:a16="http://schemas.microsoft.com/office/drawing/2014/main" id="{BAA0B044-43A2-E64D-B92E-190FA74067C3}"/>
                 </a:ext>
               </a:extLst>
             </p:cNvPr>
@@ -3410,170 +3361,18 @@
           </p:nvGrpSpPr>
           <p:grpSpPr>
             <a:xfrm>
-              <a:off x="2066637" y="901065"/>
-              <a:ext cx="3723453" cy="4133850"/>
-              <a:chOff x="2066637" y="901065"/>
-              <a:chExt cx="3723453" cy="4133850"/>
+              <a:off x="1167155" y="809625"/>
+              <a:ext cx="8289096" cy="4225290"/>
+              <a:chOff x="1167155" y="809625"/>
+              <a:chExt cx="8289096" cy="4225290"/>
             </a:xfrm>
           </p:grpSpPr>
-          <p:pic>
-            <p:nvPicPr>
-              <p:cNvPr id="5" name="Picture 4" descr="A picture containing screenshot, diagram, design&#10;&#10;Description automatically generated">
+          <p:sp>
+            <p:nvSpPr>
+              <p:cNvPr id="46" name="Rectangle 45">
                 <a:extLst>
                   <a:ext uri="{FF2B5EF4-FFF2-40B4-BE49-F238E27FC236}">
-                    <a16:creationId xmlns:a16="http://schemas.microsoft.com/office/drawing/2014/main" id="{187B6EA4-FF9E-ECFA-C3BF-90E4F6EE03C0}"/>
-                  </a:ext>
-                </a:extLst>
-              </p:cNvPr>
-              <p:cNvPicPr>
-                <a:picLocks noChangeAspect="1"/>
-              </p:cNvPicPr>
-              <p:nvPr/>
-            </p:nvPicPr>
-            <p:blipFill rotWithShape="1">
-              <a:blip r:embed="rId2">
-                <a:extLst>
-                  <a:ext uri="{28A0092B-C50C-407E-A947-70E740481C1C}">
-                    <a14:useLocalDpi xmlns:a14="http://schemas.microsoft.com/office/drawing/2010/main" val="0"/>
-                  </a:ext>
-                </a:extLst>
-              </a:blip>
-              <a:srcRect l="49631" t="19982" b="13208"/>
-              <a:stretch/>
-            </p:blipFill>
-            <p:spPr>
-              <a:xfrm>
-                <a:off x="2164079" y="901065"/>
-                <a:ext cx="3626011" cy="4133850"/>
-              </a:xfrm>
-              <a:prstGeom prst="rect">
-                <a:avLst/>
-              </a:prstGeom>
-            </p:spPr>
-          </p:pic>
-          <p:grpSp>
-            <p:nvGrpSpPr>
-              <p:cNvPr id="11" name="Group 10">
-                <a:extLst>
-                  <a:ext uri="{FF2B5EF4-FFF2-40B4-BE49-F238E27FC236}">
-                    <a16:creationId xmlns:a16="http://schemas.microsoft.com/office/drawing/2014/main" id="{9BEF7A65-1146-0451-EC51-60869CD8DC36}"/>
-                  </a:ext>
-                </a:extLst>
-              </p:cNvPr>
-              <p:cNvGrpSpPr/>
-              <p:nvPr/>
-            </p:nvGrpSpPr>
-            <p:grpSpPr>
-              <a:xfrm>
-                <a:off x="2830900" y="1779659"/>
-                <a:ext cx="668299" cy="435841"/>
-                <a:chOff x="6130360" y="2351159"/>
-                <a:chExt cx="668299" cy="435841"/>
-              </a:xfrm>
-            </p:grpSpPr>
-            <p:sp>
-              <p:nvSpPr>
-                <p:cNvPr id="12" name="Thought Bubble: Cloud 11">
-                  <a:extLst>
-                    <a:ext uri="{FF2B5EF4-FFF2-40B4-BE49-F238E27FC236}">
-                      <a16:creationId xmlns:a16="http://schemas.microsoft.com/office/drawing/2014/main" id="{7467E158-A95D-6CB6-C1BB-C23B52F7AE96}"/>
-                    </a:ext>
-                  </a:extLst>
-                </p:cNvPr>
-                <p:cNvSpPr/>
-                <p:nvPr/>
-              </p:nvSpPr>
-              <p:spPr>
-                <a:xfrm>
-                  <a:off x="6130360" y="2351159"/>
-                  <a:ext cx="668299" cy="435841"/>
-                </a:xfrm>
-                <a:prstGeom prst="cloudCallout">
-                  <a:avLst>
-                    <a:gd name="adj1" fmla="val -33386"/>
-                    <a:gd name="adj2" fmla="val 91372"/>
-                  </a:avLst>
-                </a:prstGeom>
-                <a:solidFill>
-                  <a:schemeClr val="bg1"/>
-                </a:solidFill>
-                <a:ln w="19050">
-                  <a:solidFill>
-                    <a:schemeClr val="tx1"/>
-                  </a:solidFill>
-                </a:ln>
-              </p:spPr>
-              <p:style>
-                <a:lnRef idx="2">
-                  <a:schemeClr val="accent1">
-                    <a:shade val="50000"/>
-                  </a:schemeClr>
-                </a:lnRef>
-                <a:fillRef idx="1">
-                  <a:schemeClr val="accent1"/>
-                </a:fillRef>
-                <a:effectRef idx="0">
-                  <a:schemeClr val="accent1"/>
-                </a:effectRef>
-                <a:fontRef idx="minor">
-                  <a:schemeClr val="lt1"/>
-                </a:fontRef>
-              </p:style>
-              <p:txBody>
-                <a:bodyPr rtlCol="0" anchor="ctr"/>
-                <a:lstStyle/>
-                <a:p>
-                  <a:pPr algn="ctr"/>
-                  <a:endParaRPr lang="en-US"/>
-                </a:p>
-              </p:txBody>
-            </p:sp>
-            <p:pic>
-              <p:nvPicPr>
-                <p:cNvPr id="13" name="Graphic 12" descr="Question Mark with solid fill">
-                  <a:extLst>
-                    <a:ext uri="{FF2B5EF4-FFF2-40B4-BE49-F238E27FC236}">
-                      <a16:creationId xmlns:a16="http://schemas.microsoft.com/office/drawing/2014/main" id="{41593EDC-3972-9BE1-CD99-953ACB57EB41}"/>
-                    </a:ext>
-                  </a:extLst>
-                </p:cNvPr>
-                <p:cNvPicPr>
-                  <a:picLocks noChangeAspect="1"/>
-                </p:cNvPicPr>
-                <p:nvPr/>
-              </p:nvPicPr>
-              <p:blipFill>
-                <a:blip r:embed="rId3">
-                  <a:extLst>
-                    <a:ext uri="{28A0092B-C50C-407E-A947-70E740481C1C}">
-                      <a14:useLocalDpi xmlns:a14="http://schemas.microsoft.com/office/drawing/2010/main" val="0"/>
-                    </a:ext>
-                    <a:ext uri="{96DAC541-7B7A-43D3-8B79-37D633B846F1}">
-                      <asvg:svgBlip xmlns:asvg="http://schemas.microsoft.com/office/drawing/2016/SVG/main" r:embed="rId4"/>
-                    </a:ext>
-                  </a:extLst>
-                </a:blip>
-                <a:stretch>
-                  <a:fillRect/>
-                </a:stretch>
-              </p:blipFill>
-              <p:spPr>
-                <a:xfrm>
-                  <a:off x="6301852" y="2428600"/>
-                  <a:ext cx="280957" cy="280957"/>
-                </a:xfrm>
-                <a:prstGeom prst="rect">
-                  <a:avLst/>
-                </a:prstGeom>
-              </p:spPr>
-            </p:pic>
-          </p:grpSp>
-          <p:sp>
-            <p:nvSpPr>
-              <p:cNvPr id="30" name="Oval 29">
-                <a:extLst>
-                  <a:ext uri="{FF2B5EF4-FFF2-40B4-BE49-F238E27FC236}">
-                    <a16:creationId xmlns:a16="http://schemas.microsoft.com/office/drawing/2014/main" id="{7E48300C-19C7-114F-EE3D-19FFF84D9BA1}"/>
+                    <a16:creationId xmlns:a16="http://schemas.microsoft.com/office/drawing/2014/main" id="{4A6A7986-58DE-FD91-8650-0090C0676BC2}"/>
                   </a:ext>
                 </a:extLst>
               </p:cNvPr>
@@ -3582,116 +3381,8 @@
             </p:nvSpPr>
             <p:spPr>
               <a:xfrm>
-                <a:off x="2115358" y="1234440"/>
-                <a:ext cx="277254" cy="310529"/>
-              </a:xfrm>
-              <a:prstGeom prst="ellipse">
-                <a:avLst/>
-              </a:prstGeom>
-              <a:solidFill>
-                <a:schemeClr val="bg1"/>
-              </a:solidFill>
-              <a:ln>
-                <a:solidFill>
-                  <a:schemeClr val="bg1"/>
-                </a:solidFill>
-              </a:ln>
-            </p:spPr>
-            <p:style>
-              <a:lnRef idx="2">
-                <a:schemeClr val="accent1">
-                  <a:shade val="50000"/>
-                </a:schemeClr>
-              </a:lnRef>
-              <a:fillRef idx="1">
-                <a:schemeClr val="accent1"/>
-              </a:fillRef>
-              <a:effectRef idx="0">
-                <a:schemeClr val="accent1"/>
-              </a:effectRef>
-              <a:fontRef idx="minor">
-                <a:schemeClr val="lt1"/>
-              </a:fontRef>
-            </p:style>
-            <p:txBody>
-              <a:bodyPr rtlCol="0" anchor="ctr"/>
-              <a:lstStyle/>
-              <a:p>
-                <a:pPr algn="ctr"/>
-                <a:endParaRPr lang="en-US"/>
-              </a:p>
-            </p:txBody>
-          </p:sp>
-          <p:sp>
-            <p:nvSpPr>
-              <p:cNvPr id="31" name="Oval 30">
-                <a:extLst>
-                  <a:ext uri="{FF2B5EF4-FFF2-40B4-BE49-F238E27FC236}">
-                    <a16:creationId xmlns:a16="http://schemas.microsoft.com/office/drawing/2014/main" id="{E27B1DA4-7012-DC3A-9787-7D16B40214A2}"/>
-                  </a:ext>
-                </a:extLst>
-              </p:cNvPr>
-              <p:cNvSpPr/>
-              <p:nvPr/>
-            </p:nvSpPr>
-            <p:spPr>
-              <a:xfrm>
-                <a:off x="2066637" y="4040439"/>
-                <a:ext cx="277254" cy="310529"/>
-              </a:xfrm>
-              <a:prstGeom prst="ellipse">
-                <a:avLst/>
-              </a:prstGeom>
-              <a:solidFill>
-                <a:schemeClr val="bg1"/>
-              </a:solidFill>
-              <a:ln>
-                <a:solidFill>
-                  <a:schemeClr val="bg1"/>
-                </a:solidFill>
-              </a:ln>
-            </p:spPr>
-            <p:style>
-              <a:lnRef idx="2">
-                <a:schemeClr val="accent1">
-                  <a:shade val="50000"/>
-                </a:schemeClr>
-              </a:lnRef>
-              <a:fillRef idx="1">
-                <a:schemeClr val="accent1"/>
-              </a:fillRef>
-              <a:effectRef idx="0">
-                <a:schemeClr val="accent1"/>
-              </a:effectRef>
-              <a:fontRef idx="minor">
-                <a:schemeClr val="lt1"/>
-              </a:fontRef>
-            </p:style>
-            <p:txBody>
-              <a:bodyPr rtlCol="0" anchor="ctr"/>
-              <a:lstStyle/>
-              <a:p>
-                <a:pPr algn="ctr"/>
-                <a:endParaRPr lang="en-US"/>
-              </a:p>
-            </p:txBody>
-          </p:sp>
-          <p:sp>
-            <p:nvSpPr>
-              <p:cNvPr id="32" name="Rectangle 31">
-                <a:extLst>
-                  <a:ext uri="{FF2B5EF4-FFF2-40B4-BE49-F238E27FC236}">
-                    <a16:creationId xmlns:a16="http://schemas.microsoft.com/office/drawing/2014/main" id="{3B75EB1B-A72A-8DC4-3334-9BC2FDD16D4D}"/>
-                  </a:ext>
-                </a:extLst>
-              </p:cNvPr>
-              <p:cNvSpPr/>
-              <p:nvPr/>
-            </p:nvSpPr>
-            <p:spPr>
-              <a:xfrm>
-                <a:off x="2132278" y="1691640"/>
-                <a:ext cx="45719" cy="2202180"/>
+                <a:off x="1167155" y="809625"/>
+                <a:ext cx="8289096" cy="4225290"/>
               </a:xfrm>
               <a:prstGeom prst="rect">
                 <a:avLst/>
@@ -3730,87 +3421,745 @@
               </a:p>
             </p:txBody>
           </p:sp>
-          <p:sp>
-            <p:nvSpPr>
-              <p:cNvPr id="35" name="Oval 34">
+          <p:grpSp>
+            <p:nvGrpSpPr>
+              <p:cNvPr id="39" name="Group 38">
                 <a:extLst>
                   <a:ext uri="{FF2B5EF4-FFF2-40B4-BE49-F238E27FC236}">
-                    <a16:creationId xmlns:a16="http://schemas.microsoft.com/office/drawing/2014/main" id="{10BE3989-0569-356F-5AA1-3F79053DD2D0}"/>
+                    <a16:creationId xmlns:a16="http://schemas.microsoft.com/office/drawing/2014/main" id="{36A21939-B82E-EEE6-2EBD-9D3DB1FBE5A5}"/>
                   </a:ext>
                 </a:extLst>
               </p:cNvPr>
-              <p:cNvSpPr/>
+              <p:cNvGrpSpPr/>
+              <p:nvPr/>
+            </p:nvGrpSpPr>
+            <p:grpSpPr>
+              <a:xfrm>
+                <a:off x="2066637" y="901065"/>
+                <a:ext cx="3723453" cy="4133850"/>
+                <a:chOff x="2066637" y="901065"/>
+                <a:chExt cx="3723453" cy="4133850"/>
+              </a:xfrm>
+            </p:grpSpPr>
+            <p:pic>
+              <p:nvPicPr>
+                <p:cNvPr id="5" name="Picture 4" descr="A picture containing screenshot, diagram, design&#10;&#10;Description automatically generated">
+                  <a:extLst>
+                    <a:ext uri="{FF2B5EF4-FFF2-40B4-BE49-F238E27FC236}">
+                      <a16:creationId xmlns:a16="http://schemas.microsoft.com/office/drawing/2014/main" id="{187B6EA4-FF9E-ECFA-C3BF-90E4F6EE03C0}"/>
+                    </a:ext>
+                  </a:extLst>
+                </p:cNvPr>
+                <p:cNvPicPr>
+                  <a:picLocks noChangeAspect="1"/>
+                </p:cNvPicPr>
+                <p:nvPr/>
+              </p:nvPicPr>
+              <p:blipFill rotWithShape="1">
+                <a:blip r:embed="rId2">
+                  <a:extLst>
+                    <a:ext uri="{28A0092B-C50C-407E-A947-70E740481C1C}">
+                      <a14:useLocalDpi xmlns:a14="http://schemas.microsoft.com/office/drawing/2010/main" val="0"/>
+                    </a:ext>
+                  </a:extLst>
+                </a:blip>
+                <a:srcRect l="49631" t="19982" b="13208"/>
+                <a:stretch/>
+              </p:blipFill>
+              <p:spPr>
+                <a:xfrm>
+                  <a:off x="2164079" y="901065"/>
+                  <a:ext cx="3626011" cy="4133850"/>
+                </a:xfrm>
+                <a:prstGeom prst="rect">
+                  <a:avLst/>
+                </a:prstGeom>
+              </p:spPr>
+            </p:pic>
+            <p:grpSp>
+              <p:nvGrpSpPr>
+                <p:cNvPr id="11" name="Group 10">
+                  <a:extLst>
+                    <a:ext uri="{FF2B5EF4-FFF2-40B4-BE49-F238E27FC236}">
+                      <a16:creationId xmlns:a16="http://schemas.microsoft.com/office/drawing/2014/main" id="{9BEF7A65-1146-0451-EC51-60869CD8DC36}"/>
+                    </a:ext>
+                  </a:extLst>
+                </p:cNvPr>
+                <p:cNvGrpSpPr/>
+                <p:nvPr/>
+              </p:nvGrpSpPr>
+              <p:grpSpPr>
+                <a:xfrm>
+                  <a:off x="2830900" y="1779659"/>
+                  <a:ext cx="668299" cy="435841"/>
+                  <a:chOff x="6130360" y="2351159"/>
+                  <a:chExt cx="668299" cy="435841"/>
+                </a:xfrm>
+              </p:grpSpPr>
+              <p:sp>
+                <p:nvSpPr>
+                  <p:cNvPr id="12" name="Thought Bubble: Cloud 11">
+                    <a:extLst>
+                      <a:ext uri="{FF2B5EF4-FFF2-40B4-BE49-F238E27FC236}">
+                        <a16:creationId xmlns:a16="http://schemas.microsoft.com/office/drawing/2014/main" id="{7467E158-A95D-6CB6-C1BB-C23B52F7AE96}"/>
+                      </a:ext>
+                    </a:extLst>
+                  </p:cNvPr>
+                  <p:cNvSpPr/>
+                  <p:nvPr/>
+                </p:nvSpPr>
+                <p:spPr>
+                  <a:xfrm>
+                    <a:off x="6130360" y="2351159"/>
+                    <a:ext cx="668299" cy="435841"/>
+                  </a:xfrm>
+                  <a:prstGeom prst="cloudCallout">
+                    <a:avLst>
+                      <a:gd name="adj1" fmla="val -33386"/>
+                      <a:gd name="adj2" fmla="val 91372"/>
+                    </a:avLst>
+                  </a:prstGeom>
+                  <a:solidFill>
+                    <a:schemeClr val="bg1"/>
+                  </a:solidFill>
+                  <a:ln w="19050">
+                    <a:solidFill>
+                      <a:schemeClr val="tx1"/>
+                    </a:solidFill>
+                  </a:ln>
+                </p:spPr>
+                <p:style>
+                  <a:lnRef idx="2">
+                    <a:schemeClr val="accent1">
+                      <a:shade val="50000"/>
+                    </a:schemeClr>
+                  </a:lnRef>
+                  <a:fillRef idx="1">
+                    <a:schemeClr val="accent1"/>
+                  </a:fillRef>
+                  <a:effectRef idx="0">
+                    <a:schemeClr val="accent1"/>
+                  </a:effectRef>
+                  <a:fontRef idx="minor">
+                    <a:schemeClr val="lt1"/>
+                  </a:fontRef>
+                </p:style>
+                <p:txBody>
+                  <a:bodyPr rtlCol="0" anchor="ctr"/>
+                  <a:lstStyle/>
+                  <a:p>
+                    <a:pPr algn="ctr"/>
+                    <a:endParaRPr lang="en-US" dirty="0"/>
+                  </a:p>
+                </p:txBody>
+              </p:sp>
+              <p:pic>
+                <p:nvPicPr>
+                  <p:cNvPr id="13" name="Graphic 12" descr="Question Mark with solid fill">
+                    <a:extLst>
+                      <a:ext uri="{FF2B5EF4-FFF2-40B4-BE49-F238E27FC236}">
+                        <a16:creationId xmlns:a16="http://schemas.microsoft.com/office/drawing/2014/main" id="{41593EDC-3972-9BE1-CD99-953ACB57EB41}"/>
+                      </a:ext>
+                    </a:extLst>
+                  </p:cNvPr>
+                  <p:cNvPicPr>
+                    <a:picLocks noChangeAspect="1"/>
+                  </p:cNvPicPr>
+                  <p:nvPr/>
+                </p:nvPicPr>
+                <p:blipFill>
+                  <a:blip r:embed="rId3">
+                    <a:extLst>
+                      <a:ext uri="{28A0092B-C50C-407E-A947-70E740481C1C}">
+                        <a14:useLocalDpi xmlns:a14="http://schemas.microsoft.com/office/drawing/2010/main" val="0"/>
+                      </a:ext>
+                      <a:ext uri="{96DAC541-7B7A-43D3-8B79-37D633B846F1}">
+                        <asvg:svgBlip xmlns:asvg="http://schemas.microsoft.com/office/drawing/2016/SVG/main" r:embed="rId4"/>
+                      </a:ext>
+                    </a:extLst>
+                  </a:blip>
+                  <a:stretch>
+                    <a:fillRect/>
+                  </a:stretch>
+                </p:blipFill>
+                <p:spPr>
+                  <a:xfrm>
+                    <a:off x="6301852" y="2428600"/>
+                    <a:ext cx="280957" cy="280957"/>
+                  </a:xfrm>
+                  <a:prstGeom prst="rect">
+                    <a:avLst/>
+                  </a:prstGeom>
+                </p:spPr>
+              </p:pic>
+            </p:grpSp>
+            <p:sp>
+              <p:nvSpPr>
+                <p:cNvPr id="30" name="Oval 29">
+                  <a:extLst>
+                    <a:ext uri="{FF2B5EF4-FFF2-40B4-BE49-F238E27FC236}">
+                      <a16:creationId xmlns:a16="http://schemas.microsoft.com/office/drawing/2014/main" id="{7E48300C-19C7-114F-EE3D-19FFF84D9BA1}"/>
+                    </a:ext>
+                  </a:extLst>
+                </p:cNvPr>
+                <p:cNvSpPr/>
+                <p:nvPr/>
+              </p:nvSpPr>
+              <p:spPr>
+                <a:xfrm>
+                  <a:off x="2115358" y="1234440"/>
+                  <a:ext cx="277254" cy="310529"/>
+                </a:xfrm>
+                <a:prstGeom prst="ellipse">
+                  <a:avLst/>
+                </a:prstGeom>
+                <a:solidFill>
+                  <a:schemeClr val="bg1"/>
+                </a:solidFill>
+                <a:ln>
+                  <a:solidFill>
+                    <a:schemeClr val="bg1"/>
+                  </a:solidFill>
+                </a:ln>
+              </p:spPr>
+              <p:style>
+                <a:lnRef idx="2">
+                  <a:schemeClr val="accent1">
+                    <a:shade val="50000"/>
+                  </a:schemeClr>
+                </a:lnRef>
+                <a:fillRef idx="1">
+                  <a:schemeClr val="accent1"/>
+                </a:fillRef>
+                <a:effectRef idx="0">
+                  <a:schemeClr val="accent1"/>
+                </a:effectRef>
+                <a:fontRef idx="minor">
+                  <a:schemeClr val="lt1"/>
+                </a:fontRef>
+              </p:style>
+              <p:txBody>
+                <a:bodyPr rtlCol="0" anchor="ctr"/>
+                <a:lstStyle/>
+                <a:p>
+                  <a:pPr algn="ctr"/>
+                  <a:endParaRPr lang="en-US"/>
+                </a:p>
+              </p:txBody>
+            </p:sp>
+            <p:sp>
+              <p:nvSpPr>
+                <p:cNvPr id="31" name="Oval 30">
+                  <a:extLst>
+                    <a:ext uri="{FF2B5EF4-FFF2-40B4-BE49-F238E27FC236}">
+                      <a16:creationId xmlns:a16="http://schemas.microsoft.com/office/drawing/2014/main" id="{E27B1DA4-7012-DC3A-9787-7D16B40214A2}"/>
+                    </a:ext>
+                  </a:extLst>
+                </p:cNvPr>
+                <p:cNvSpPr/>
+                <p:nvPr/>
+              </p:nvSpPr>
+              <p:spPr>
+                <a:xfrm>
+                  <a:off x="2066637" y="4040439"/>
+                  <a:ext cx="277254" cy="310529"/>
+                </a:xfrm>
+                <a:prstGeom prst="ellipse">
+                  <a:avLst/>
+                </a:prstGeom>
+                <a:solidFill>
+                  <a:schemeClr val="bg1"/>
+                </a:solidFill>
+                <a:ln>
+                  <a:solidFill>
+                    <a:schemeClr val="bg1"/>
+                  </a:solidFill>
+                </a:ln>
+              </p:spPr>
+              <p:style>
+                <a:lnRef idx="2">
+                  <a:schemeClr val="accent1">
+                    <a:shade val="50000"/>
+                  </a:schemeClr>
+                </a:lnRef>
+                <a:fillRef idx="1">
+                  <a:schemeClr val="accent1"/>
+                </a:fillRef>
+                <a:effectRef idx="0">
+                  <a:schemeClr val="accent1"/>
+                </a:effectRef>
+                <a:fontRef idx="minor">
+                  <a:schemeClr val="lt1"/>
+                </a:fontRef>
+              </p:style>
+              <p:txBody>
+                <a:bodyPr rtlCol="0" anchor="ctr"/>
+                <a:lstStyle/>
+                <a:p>
+                  <a:pPr algn="ctr"/>
+                  <a:endParaRPr lang="en-US"/>
+                </a:p>
+              </p:txBody>
+            </p:sp>
+            <p:sp>
+              <p:nvSpPr>
+                <p:cNvPr id="32" name="Rectangle 31">
+                  <a:extLst>
+                    <a:ext uri="{FF2B5EF4-FFF2-40B4-BE49-F238E27FC236}">
+                      <a16:creationId xmlns:a16="http://schemas.microsoft.com/office/drawing/2014/main" id="{3B75EB1B-A72A-8DC4-3334-9BC2FDD16D4D}"/>
+                    </a:ext>
+                  </a:extLst>
+                </p:cNvPr>
+                <p:cNvSpPr/>
+                <p:nvPr/>
+              </p:nvSpPr>
+              <p:spPr>
+                <a:xfrm>
+                  <a:off x="2132278" y="1691640"/>
+                  <a:ext cx="45719" cy="2202180"/>
+                </a:xfrm>
+                <a:prstGeom prst="rect">
+                  <a:avLst/>
+                </a:prstGeom>
+                <a:solidFill>
+                  <a:schemeClr val="bg1"/>
+                </a:solidFill>
+                <a:ln>
+                  <a:solidFill>
+                    <a:schemeClr val="bg1"/>
+                  </a:solidFill>
+                </a:ln>
+              </p:spPr>
+              <p:style>
+                <a:lnRef idx="2">
+                  <a:schemeClr val="accent1">
+                    <a:shade val="50000"/>
+                  </a:schemeClr>
+                </a:lnRef>
+                <a:fillRef idx="1">
+                  <a:schemeClr val="accent1"/>
+                </a:fillRef>
+                <a:effectRef idx="0">
+                  <a:schemeClr val="accent1"/>
+                </a:effectRef>
+                <a:fontRef idx="minor">
+                  <a:schemeClr val="lt1"/>
+                </a:fontRef>
+              </p:style>
+              <p:txBody>
+                <a:bodyPr rtlCol="0" anchor="ctr"/>
+                <a:lstStyle/>
+                <a:p>
+                  <a:pPr algn="ctr"/>
+                  <a:endParaRPr lang="en-US"/>
+                </a:p>
+              </p:txBody>
+            </p:sp>
+            <p:sp>
+              <p:nvSpPr>
+                <p:cNvPr id="35" name="Oval 34">
+                  <a:extLst>
+                    <a:ext uri="{FF2B5EF4-FFF2-40B4-BE49-F238E27FC236}">
+                      <a16:creationId xmlns:a16="http://schemas.microsoft.com/office/drawing/2014/main" id="{10BE3989-0569-356F-5AA1-3F79053DD2D0}"/>
+                    </a:ext>
+                  </a:extLst>
+                </p:cNvPr>
+                <p:cNvSpPr/>
+                <p:nvPr/>
+              </p:nvSpPr>
+              <p:spPr>
+                <a:xfrm>
+                  <a:off x="2267761" y="1756540"/>
+                  <a:ext cx="335534" cy="361063"/>
+                </a:xfrm>
+                <a:prstGeom prst="ellipse">
+                  <a:avLst/>
+                </a:prstGeom>
+                <a:solidFill>
+                  <a:schemeClr val="bg1"/>
+                </a:solidFill>
+                <a:ln>
+                  <a:solidFill>
+                    <a:schemeClr val="bg1"/>
+                  </a:solidFill>
+                </a:ln>
+              </p:spPr>
+              <p:style>
+                <a:lnRef idx="2">
+                  <a:schemeClr val="accent1">
+                    <a:shade val="50000"/>
+                  </a:schemeClr>
+                </a:lnRef>
+                <a:fillRef idx="1">
+                  <a:schemeClr val="accent1"/>
+                </a:fillRef>
+                <a:effectRef idx="0">
+                  <a:schemeClr val="accent1"/>
+                </a:effectRef>
+                <a:fontRef idx="minor">
+                  <a:schemeClr val="lt1"/>
+                </a:fontRef>
+              </p:style>
+              <p:txBody>
+                <a:bodyPr rtlCol="0" anchor="ctr"/>
+                <a:lstStyle/>
+                <a:p>
+                  <a:pPr algn="ctr"/>
+                  <a:endParaRPr lang="en-US"/>
+                </a:p>
+              </p:txBody>
+            </p:sp>
+          </p:grpSp>
+          <p:grpSp>
+            <p:nvGrpSpPr>
+              <p:cNvPr id="38" name="Group 37">
+                <a:extLst>
+                  <a:ext uri="{FF2B5EF4-FFF2-40B4-BE49-F238E27FC236}">
+                    <a16:creationId xmlns:a16="http://schemas.microsoft.com/office/drawing/2014/main" id="{5D6B29A0-BDC1-918A-2EA4-9AD334EA0320}"/>
+                  </a:ext>
+                </a:extLst>
+              </p:cNvPr>
+              <p:cNvGrpSpPr/>
+              <p:nvPr/>
+            </p:nvGrpSpPr>
+            <p:grpSpPr>
+              <a:xfrm>
+                <a:off x="6242539" y="1421240"/>
+                <a:ext cx="3151135" cy="2960488"/>
+                <a:chOff x="6233014" y="1421240"/>
+                <a:chExt cx="3151135" cy="2960488"/>
+              </a:xfrm>
+            </p:grpSpPr>
+            <p:pic>
+              <p:nvPicPr>
+                <p:cNvPr id="34" name="Picture 33" descr="A picture containing screenshot, diagram, design&#10;&#10;Description automatically generated">
+                  <a:extLst>
+                    <a:ext uri="{FF2B5EF4-FFF2-40B4-BE49-F238E27FC236}">
+                      <a16:creationId xmlns:a16="http://schemas.microsoft.com/office/drawing/2014/main" id="{3972D254-2E17-4204-2495-CE05733662FD}"/>
+                    </a:ext>
+                  </a:extLst>
+                </p:cNvPr>
+                <p:cNvPicPr>
+                  <a:picLocks noChangeAspect="1"/>
+                </p:cNvPicPr>
+                <p:nvPr/>
+              </p:nvPicPr>
+              <p:blipFill rotWithShape="1">
+                <a:blip r:embed="rId2">
+                  <a:extLst>
+                    <a:ext uri="{28A0092B-C50C-407E-A947-70E740481C1C}">
+                      <a14:useLocalDpi xmlns:a14="http://schemas.microsoft.com/office/drawing/2010/main" val="0"/>
+                    </a:ext>
+                  </a:extLst>
+                </a:blip>
+                <a:srcRect t="52197" r="58786"/>
+                <a:stretch/>
+              </p:blipFill>
+              <p:spPr>
+                <a:xfrm>
+                  <a:off x="6417163" y="1421240"/>
+                  <a:ext cx="2966986" cy="2957801"/>
+                </a:xfrm>
+                <a:prstGeom prst="rect">
+                  <a:avLst/>
+                </a:prstGeom>
+              </p:spPr>
+            </p:pic>
+            <p:pic>
+              <p:nvPicPr>
+                <p:cNvPr id="36" name="Picture 35" descr="A picture containing screenshot, diagram, design&#10;&#10;Description automatically generated">
+                  <a:extLst>
+                    <a:ext uri="{FF2B5EF4-FFF2-40B4-BE49-F238E27FC236}">
+                      <a16:creationId xmlns:a16="http://schemas.microsoft.com/office/drawing/2014/main" id="{6F586AEA-CC53-8498-5891-1D4BA5DED2E5}"/>
+                    </a:ext>
+                  </a:extLst>
+                </p:cNvPr>
+                <p:cNvPicPr>
+                  <a:picLocks noChangeAspect="1"/>
+                </p:cNvPicPr>
+                <p:nvPr/>
+              </p:nvPicPr>
+              <p:blipFill rotWithShape="1">
+                <a:blip r:embed="rId2">
+                  <a:extLst>
+                    <a:ext uri="{28A0092B-C50C-407E-A947-70E740481C1C}">
+                      <a14:useLocalDpi xmlns:a14="http://schemas.microsoft.com/office/drawing/2010/main" val="0"/>
+                    </a:ext>
+                  </a:extLst>
+                </a:blip>
+                <a:srcRect l="8770" t="90881" r="83539"/>
+                <a:stretch/>
+              </p:blipFill>
+              <p:spPr>
+                <a:xfrm>
+                  <a:off x="6452672" y="3814816"/>
+                  <a:ext cx="553673" cy="564225"/>
+                </a:xfrm>
+                <a:prstGeom prst="rect">
+                  <a:avLst/>
+                </a:prstGeom>
+              </p:spPr>
+            </p:pic>
+            <p:sp>
+              <p:nvSpPr>
+                <p:cNvPr id="37" name="Rectangle 36">
+                  <a:extLst>
+                    <a:ext uri="{FF2B5EF4-FFF2-40B4-BE49-F238E27FC236}">
+                      <a16:creationId xmlns:a16="http://schemas.microsoft.com/office/drawing/2014/main" id="{B5D94C0B-0B05-3A6C-91CC-95FDE86CEC77}"/>
+                    </a:ext>
+                  </a:extLst>
+                </p:cNvPr>
+                <p:cNvSpPr/>
+                <p:nvPr/>
+              </p:nvSpPr>
+              <p:spPr>
+                <a:xfrm>
+                  <a:off x="6233014" y="2179548"/>
+                  <a:ext cx="234898" cy="2202180"/>
+                </a:xfrm>
+                <a:prstGeom prst="rect">
+                  <a:avLst/>
+                </a:prstGeom>
+                <a:solidFill>
+                  <a:schemeClr val="bg1"/>
+                </a:solidFill>
+                <a:ln>
+                  <a:solidFill>
+                    <a:schemeClr val="bg1"/>
+                  </a:solidFill>
+                </a:ln>
+              </p:spPr>
+              <p:style>
+                <a:lnRef idx="2">
+                  <a:schemeClr val="accent1">
+                    <a:shade val="50000"/>
+                  </a:schemeClr>
+                </a:lnRef>
+                <a:fillRef idx="1">
+                  <a:schemeClr val="accent1"/>
+                </a:fillRef>
+                <a:effectRef idx="0">
+                  <a:schemeClr val="accent1"/>
+                </a:effectRef>
+                <a:fontRef idx="minor">
+                  <a:schemeClr val="lt1"/>
+                </a:fontRef>
+              </p:style>
+              <p:txBody>
+                <a:bodyPr rtlCol="0" anchor="ctr"/>
+                <a:lstStyle/>
+                <a:p>
+                  <a:pPr algn="ctr"/>
+                  <a:endParaRPr lang="en-US"/>
+                </a:p>
+              </p:txBody>
+            </p:sp>
+          </p:grpSp>
+          <p:cxnSp>
+            <p:nvCxnSpPr>
+              <p:cNvPr id="41" name="Straight Arrow Connector 40">
+                <a:extLst>
+                  <a:ext uri="{FF2B5EF4-FFF2-40B4-BE49-F238E27FC236}">
+                    <a16:creationId xmlns:a16="http://schemas.microsoft.com/office/drawing/2014/main" id="{C1A76C46-9480-F085-4FFF-611D2669624F}"/>
+                  </a:ext>
+                </a:extLst>
+              </p:cNvPr>
+              <p:cNvCxnSpPr>
+                <a:stCxn id="5" idx="3"/>
+              </p:cNvCxnSpPr>
+              <p:nvPr/>
+            </p:nvCxnSpPr>
+            <p:spPr>
+              <a:xfrm>
+                <a:off x="5790090" y="2967990"/>
+                <a:ext cx="579423" cy="8024"/>
+              </a:xfrm>
+              <a:prstGeom prst="straightConnector1">
+                <a:avLst/>
+              </a:prstGeom>
+              <a:ln w="57150">
+                <a:tailEnd type="triangle"/>
+              </a:ln>
+            </p:spPr>
+            <p:style>
+              <a:lnRef idx="1">
+                <a:schemeClr val="dk1"/>
+              </a:lnRef>
+              <a:fillRef idx="0">
+                <a:schemeClr val="dk1"/>
+              </a:fillRef>
+              <a:effectRef idx="0">
+                <a:schemeClr val="dk1"/>
+              </a:effectRef>
+              <a:fontRef idx="minor">
+                <a:schemeClr val="tx1"/>
+              </a:fontRef>
+            </p:style>
+          </p:cxnSp>
+          <p:sp>
+            <p:nvSpPr>
+              <p:cNvPr id="42" name="TextBox 41">
+                <a:extLst>
+                  <a:ext uri="{FF2B5EF4-FFF2-40B4-BE49-F238E27FC236}">
+                    <a16:creationId xmlns:a16="http://schemas.microsoft.com/office/drawing/2014/main" id="{C594CD6D-3D90-391F-AF52-7FCF07BD7E69}"/>
+                  </a:ext>
+                </a:extLst>
+              </p:cNvPr>
+              <p:cNvSpPr txBox="1"/>
               <p:nvPr/>
             </p:nvSpPr>
             <p:spPr>
               <a:xfrm>
-                <a:off x="2267761" y="1756540"/>
-                <a:ext cx="335534" cy="361063"/>
+                <a:off x="2179957" y="1703272"/>
+                <a:ext cx="466794" cy="369332"/>
               </a:xfrm>
-              <a:prstGeom prst="ellipse">
+              <a:prstGeom prst="rect">
                 <a:avLst/>
               </a:prstGeom>
-              <a:solidFill>
-                <a:schemeClr val="bg1"/>
-              </a:solidFill>
-              <a:ln>
-                <a:solidFill>
-                  <a:schemeClr val="bg1"/>
-                </a:solidFill>
-              </a:ln>
+              <a:noFill/>
             </p:spPr>
-            <p:style>
-              <a:lnRef idx="2">
-                <a:schemeClr val="accent1">
-                  <a:shade val="50000"/>
-                </a:schemeClr>
-              </a:lnRef>
-              <a:fillRef idx="1">
-                <a:schemeClr val="accent1"/>
-              </a:fillRef>
-              <a:effectRef idx="0">
-                <a:schemeClr val="accent1"/>
-              </a:effectRef>
-              <a:fontRef idx="minor">
-                <a:schemeClr val="lt1"/>
-              </a:fontRef>
-            </p:style>
             <p:txBody>
-              <a:bodyPr rtlCol="0" anchor="ctr"/>
+              <a:bodyPr wrap="none" rtlCol="0">
+                <a:spAutoFit/>
+              </a:bodyPr>
               <a:lstStyle/>
               <a:p>
-                <a:pPr algn="ctr"/>
-                <a:endParaRPr lang="en-US"/>
+                <a:r>
+                  <a:rPr lang="en-US" dirty="0">
+                    <a:latin typeface="Arial" panose="020B0604020202020204" pitchFamily="34" charset="0"/>
+                    <a:cs typeface="Arial" panose="020B0604020202020204" pitchFamily="34" charset="0"/>
+                  </a:rPr>
+                  <a:t>(a)</a:t>
+                </a:r>
               </a:p>
             </p:txBody>
           </p:sp>
-        </p:grpSp>
-        <p:grpSp>
-          <p:nvGrpSpPr>
-            <p:cNvPr id="38" name="Group 37">
-              <a:extLst>
-                <a:ext uri="{FF2B5EF4-FFF2-40B4-BE49-F238E27FC236}">
-                  <a16:creationId xmlns:a16="http://schemas.microsoft.com/office/drawing/2014/main" id="{5D6B29A0-BDC1-918A-2EA4-9AD334EA0320}"/>
-                </a:ext>
-              </a:extLst>
-            </p:cNvPr>
-            <p:cNvGrpSpPr/>
-            <p:nvPr/>
-          </p:nvGrpSpPr>
-          <p:grpSpPr>
-            <a:xfrm>
-              <a:off x="6242539" y="1421240"/>
-              <a:ext cx="3151135" cy="2960488"/>
-              <a:chOff x="6233014" y="1421240"/>
-              <a:chExt cx="3151135" cy="2960488"/>
-            </a:xfrm>
-          </p:grpSpPr>
+          <p:sp>
+            <p:nvSpPr>
+              <p:cNvPr id="43" name="TextBox 42">
+                <a:extLst>
+                  <a:ext uri="{FF2B5EF4-FFF2-40B4-BE49-F238E27FC236}">
+                    <a16:creationId xmlns:a16="http://schemas.microsoft.com/office/drawing/2014/main" id="{7635E9DB-83F2-E704-FD46-CDF46CA33FA0}"/>
+                  </a:ext>
+                </a:extLst>
+              </p:cNvPr>
+              <p:cNvSpPr txBox="1"/>
+              <p:nvPr/>
+            </p:nvSpPr>
+            <p:spPr>
+              <a:xfrm>
+                <a:off x="6496487" y="3940837"/>
+                <a:ext cx="466794" cy="369332"/>
+              </a:xfrm>
+              <a:prstGeom prst="rect">
+                <a:avLst/>
+              </a:prstGeom>
+              <a:noFill/>
+            </p:spPr>
+            <p:txBody>
+              <a:bodyPr wrap="none" rtlCol="0">
+                <a:spAutoFit/>
+              </a:bodyPr>
+              <a:lstStyle/>
+              <a:p>
+                <a:r>
+                  <a:rPr lang="en-US" dirty="0">
+                    <a:solidFill>
+                      <a:schemeClr val="bg1"/>
+                    </a:solidFill>
+                    <a:latin typeface="Arial" panose="020B0604020202020204" pitchFamily="34" charset="0"/>
+                    <a:cs typeface="Arial" panose="020B0604020202020204" pitchFamily="34" charset="0"/>
+                  </a:rPr>
+                  <a:t>(b)</a:t>
+                </a:r>
+              </a:p>
+            </p:txBody>
+          </p:sp>
+          <p:sp>
+            <p:nvSpPr>
+              <p:cNvPr id="44" name="TextBox 43">
+                <a:extLst>
+                  <a:ext uri="{FF2B5EF4-FFF2-40B4-BE49-F238E27FC236}">
+                    <a16:creationId xmlns:a16="http://schemas.microsoft.com/office/drawing/2014/main" id="{D2B8250C-F6B6-6B66-3B6D-5658ED4AB649}"/>
+                  </a:ext>
+                </a:extLst>
+              </p:cNvPr>
+              <p:cNvSpPr txBox="1"/>
+              <p:nvPr/>
+            </p:nvSpPr>
+            <p:spPr>
+              <a:xfrm>
+                <a:off x="7411727" y="3940837"/>
+                <a:ext cx="1338828" cy="369332"/>
+              </a:xfrm>
+              <a:prstGeom prst="rect">
+                <a:avLst/>
+              </a:prstGeom>
+              <a:noFill/>
+            </p:spPr>
+            <p:txBody>
+              <a:bodyPr wrap="none" rtlCol="0">
+                <a:spAutoFit/>
+              </a:bodyPr>
+              <a:lstStyle/>
+              <a:p>
+                <a:r>
+                  <a:rPr lang="en-US" dirty="0">
+                    <a:solidFill>
+                      <a:schemeClr val="bg1"/>
+                    </a:solidFill>
+                    <a:latin typeface="Arial" panose="020B0604020202020204" pitchFamily="34" charset="0"/>
+                    <a:cs typeface="Arial" panose="020B0604020202020204" pitchFamily="34" charset="0"/>
+                  </a:rPr>
+                  <a:t>Occupancy</a:t>
+                </a:r>
+              </a:p>
+            </p:txBody>
+          </p:sp>
+          <p:sp>
+            <p:nvSpPr>
+              <p:cNvPr id="45" name="TextBox 44">
+                <a:extLst>
+                  <a:ext uri="{FF2B5EF4-FFF2-40B4-BE49-F238E27FC236}">
+                    <a16:creationId xmlns:a16="http://schemas.microsoft.com/office/drawing/2014/main" id="{56E2DC75-767E-3A90-E0E1-AB031E01BED1}"/>
+                  </a:ext>
+                </a:extLst>
+              </p:cNvPr>
+              <p:cNvSpPr txBox="1"/>
+              <p:nvPr/>
+            </p:nvSpPr>
+            <p:spPr>
+              <a:xfrm>
+                <a:off x="3139220" y="4166302"/>
+                <a:ext cx="1672253" cy="369332"/>
+              </a:xfrm>
+              <a:prstGeom prst="rect">
+                <a:avLst/>
+              </a:prstGeom>
+              <a:noFill/>
+            </p:spPr>
+            <p:txBody>
+              <a:bodyPr wrap="none" rtlCol="0">
+                <a:spAutoFit/>
+              </a:bodyPr>
+              <a:lstStyle/>
+              <a:p>
+                <a:r>
+                  <a:rPr lang="en-US" dirty="0">
+                    <a:latin typeface="Arial" panose="020B0604020202020204" pitchFamily="34" charset="0"/>
+                    <a:cs typeface="Arial" panose="020B0604020202020204" pitchFamily="34" charset="0"/>
+                  </a:rPr>
+                  <a:t>Density Space</a:t>
+                </a:r>
+              </a:p>
+            </p:txBody>
+          </p:sp>
           <p:pic>
             <p:nvPicPr>
-              <p:cNvPr id="34" name="Picture 33" descr="A picture containing screenshot, diagram, design&#10;&#10;Description automatically generated">
+              <p:cNvPr id="4" name="Picture 3" descr="A yellow cylindrical object with arrows&#10;&#10;Description automatically generated">
                 <a:extLst>
                   <a:ext uri="{FF2B5EF4-FFF2-40B4-BE49-F238E27FC236}">
-                    <a16:creationId xmlns:a16="http://schemas.microsoft.com/office/drawing/2014/main" id="{3972D254-2E17-4204-2495-CE05733662FD}"/>
+                    <a16:creationId xmlns:a16="http://schemas.microsoft.com/office/drawing/2014/main" id="{F562B671-B5EA-5028-0D9B-47E988F29B94}"/>
                   </a:ext>
                 </a:extLst>
               </p:cNvPr>
@@ -3819,164 +4168,63 @@
               </p:cNvPicPr>
               <p:nvPr/>
             </p:nvPicPr>
-            <p:blipFill rotWithShape="1">
-              <a:blip r:embed="rId2">
+            <p:blipFill>
+              <a:blip r:embed="rId5">
                 <a:extLst>
+                  <a:ext uri="{BEBA8EAE-BF5A-486C-A8C5-ECC9F3942E4B}">
+                    <a14:imgProps xmlns:a14="http://schemas.microsoft.com/office/drawing/2010/main">
+                      <a14:imgLayer r:embed="rId6">
+                        <a14:imgEffect>
+                          <a14:backgroundRemoval t="9524" b="96561" l="2808" r="91793">
+                            <a14:foregroundMark x1="22894" y1="89153" x2="6803" y2="99735"/>
+                            <a14:foregroundMark x1="6803" y1="99735" x2="5400" y2="79894"/>
+                            <a14:foregroundMark x1="5400" y1="79894" x2="14255" y2="70370"/>
+                            <a14:foregroundMark x1="14255" y1="70370" x2="5616" y2="79101"/>
+                            <a14:foregroundMark x1="5616" y1="79101" x2="11231" y2="93386"/>
+                            <a14:foregroundMark x1="11231" y1="93386" x2="2808" y2="92328"/>
+                            <a14:foregroundMark x1="2808" y1="92328" x2="7451" y2="96825"/>
+                            <a14:foregroundMark x1="28942" y1="51323" x2="38877" y2="44180"/>
+                            <a14:foregroundMark x1="38877" y1="44180" x2="29266" y2="49471"/>
+                            <a14:foregroundMark x1="29266" y1="49471" x2="29266" y2="49471"/>
+                            <a14:foregroundMark x1="87905" y1="11905" x2="91793" y2="17196"/>
+                            <a14:foregroundMark x1="90389" y1="13757" x2="80670" y2="12963"/>
+                            <a14:foregroundMark x1="80670" y1="12963" x2="83369" y2="12434"/>
+                            <a14:foregroundMark x1="84449" y1="9524" x2="76242" y2="13228"/>
+                            <a14:foregroundMark x1="90929" y1="11376" x2="84773" y2="9524"/>
+                            <a14:foregroundMark x1="86933" y1="9524" x2="90929" y2="12169"/>
+                            <a14:foregroundMark x1="31210" y1="48413" x2="41793" y2="39683"/>
+                            <a14:foregroundMark x1="39633" y1="41005" x2="44600" y2="37566"/>
+                          </a14:backgroundRemoval>
+                        </a14:imgEffect>
+                      </a14:imgLayer>
+                    </a14:imgProps>
+                  </a:ext>
                   <a:ext uri="{28A0092B-C50C-407E-A947-70E740481C1C}">
                     <a14:useLocalDpi xmlns:a14="http://schemas.microsoft.com/office/drawing/2010/main" val="0"/>
                   </a:ext>
                 </a:extLst>
               </a:blip>
-              <a:srcRect t="52197" r="58786"/>
-              <a:stretch/>
+              <a:stretch>
+                <a:fillRect/>
+              </a:stretch>
             </p:blipFill>
             <p:spPr>
-              <a:xfrm>
-                <a:off x="6417163" y="1421240"/>
-                <a:ext cx="2966986" cy="2957801"/>
+              <a:xfrm rot="1170268">
+                <a:off x="1249456" y="2175820"/>
+                <a:ext cx="2086023" cy="851530"/>
               </a:xfrm>
               <a:prstGeom prst="rect">
                 <a:avLst/>
               </a:prstGeom>
             </p:spPr>
           </p:pic>
-          <p:pic>
-            <p:nvPicPr>
-              <p:cNvPr id="36" name="Picture 35" descr="A picture containing screenshot, diagram, design&#10;&#10;Description automatically generated">
-                <a:extLst>
-                  <a:ext uri="{FF2B5EF4-FFF2-40B4-BE49-F238E27FC236}">
-                    <a16:creationId xmlns:a16="http://schemas.microsoft.com/office/drawing/2014/main" id="{6F586AEA-CC53-8498-5891-1D4BA5DED2E5}"/>
-                  </a:ext>
-                </a:extLst>
-              </p:cNvPr>
-              <p:cNvPicPr>
-                <a:picLocks noChangeAspect="1"/>
-              </p:cNvPicPr>
-              <p:nvPr/>
-            </p:nvPicPr>
-            <p:blipFill rotWithShape="1">
-              <a:blip r:embed="rId2">
-                <a:extLst>
-                  <a:ext uri="{28A0092B-C50C-407E-A947-70E740481C1C}">
-                    <a14:useLocalDpi xmlns:a14="http://schemas.microsoft.com/office/drawing/2010/main" val="0"/>
-                  </a:ext>
-                </a:extLst>
-              </a:blip>
-              <a:srcRect l="8770" t="90881" r="83539"/>
-              <a:stretch/>
-            </p:blipFill>
-            <p:spPr>
-              <a:xfrm>
-                <a:off x="6452672" y="3814816"/>
-                <a:ext cx="553673" cy="564225"/>
-              </a:xfrm>
-              <a:prstGeom prst="rect">
-                <a:avLst/>
-              </a:prstGeom>
-            </p:spPr>
-          </p:pic>
-          <p:sp>
-            <p:nvSpPr>
-              <p:cNvPr id="37" name="Rectangle 36">
-                <a:extLst>
-                  <a:ext uri="{FF2B5EF4-FFF2-40B4-BE49-F238E27FC236}">
-                    <a16:creationId xmlns:a16="http://schemas.microsoft.com/office/drawing/2014/main" id="{B5D94C0B-0B05-3A6C-91CC-95FDE86CEC77}"/>
-                  </a:ext>
-                </a:extLst>
-              </p:cNvPr>
-              <p:cNvSpPr/>
-              <p:nvPr/>
-            </p:nvSpPr>
-            <p:spPr>
-              <a:xfrm>
-                <a:off x="6233014" y="2179548"/>
-                <a:ext cx="234898" cy="2202180"/>
-              </a:xfrm>
-              <a:prstGeom prst="rect">
-                <a:avLst/>
-              </a:prstGeom>
-              <a:solidFill>
-                <a:schemeClr val="bg1"/>
-              </a:solidFill>
-              <a:ln>
-                <a:solidFill>
-                  <a:schemeClr val="bg1"/>
-                </a:solidFill>
-              </a:ln>
-            </p:spPr>
-            <p:style>
-              <a:lnRef idx="2">
-                <a:schemeClr val="accent1">
-                  <a:shade val="50000"/>
-                </a:schemeClr>
-              </a:lnRef>
-              <a:fillRef idx="1">
-                <a:schemeClr val="accent1"/>
-              </a:fillRef>
-              <a:effectRef idx="0">
-                <a:schemeClr val="accent1"/>
-              </a:effectRef>
-              <a:fontRef idx="minor">
-                <a:schemeClr val="lt1"/>
-              </a:fontRef>
-            </p:style>
-            <p:txBody>
-              <a:bodyPr rtlCol="0" anchor="ctr"/>
-              <a:lstStyle/>
-              <a:p>
-                <a:pPr algn="ctr"/>
-                <a:endParaRPr lang="en-US"/>
-              </a:p>
-            </p:txBody>
-          </p:sp>
         </p:grpSp>
-        <p:cxnSp>
-          <p:nvCxnSpPr>
-            <p:cNvPr id="41" name="Straight Arrow Connector 40">
+        <p:sp>
+          <p:nvSpPr>
+            <p:cNvPr id="3" name="TextBox 2">
               <a:extLst>
                 <a:ext uri="{FF2B5EF4-FFF2-40B4-BE49-F238E27FC236}">
-                  <a16:creationId xmlns:a16="http://schemas.microsoft.com/office/drawing/2014/main" id="{C1A76C46-9480-F085-4FFF-611D2669624F}"/>
-                </a:ext>
-              </a:extLst>
-            </p:cNvPr>
-            <p:cNvCxnSpPr>
-              <a:stCxn id="5" idx="3"/>
-            </p:cNvCxnSpPr>
-            <p:nvPr/>
-          </p:nvCxnSpPr>
-          <p:spPr>
-            <a:xfrm>
-              <a:off x="5790090" y="2967990"/>
-              <a:ext cx="579423" cy="8024"/>
-            </a:xfrm>
-            <a:prstGeom prst="straightConnector1">
-              <a:avLst/>
-            </a:prstGeom>
-            <a:ln w="57150">
-              <a:tailEnd type="triangle"/>
-            </a:ln>
-          </p:spPr>
-          <p:style>
-            <a:lnRef idx="1">
-              <a:schemeClr val="dk1"/>
-            </a:lnRef>
-            <a:fillRef idx="0">
-              <a:schemeClr val="dk1"/>
-            </a:fillRef>
-            <a:effectRef idx="0">
-              <a:schemeClr val="dk1"/>
-            </a:effectRef>
-            <a:fontRef idx="minor">
-              <a:schemeClr val="tx1"/>
-            </a:fontRef>
-          </p:style>
-        </p:cxnSp>
-        <p:sp>
-          <p:nvSpPr>
-            <p:cNvPr id="42" name="TextBox 41">
-              <a:extLst>
-                <a:ext uri="{FF2B5EF4-FFF2-40B4-BE49-F238E27FC236}">
-                  <a16:creationId xmlns:a16="http://schemas.microsoft.com/office/drawing/2014/main" id="{C594CD6D-3D90-391F-AF52-7FCF07BD7E69}"/>
+                  <a16:creationId xmlns:a16="http://schemas.microsoft.com/office/drawing/2014/main" id="{21BDB62D-46B1-2D06-7FDD-23BD0BE9A7A4}"/>
                 </a:ext>
               </a:extLst>
             </p:cNvPr>
@@ -3985,8 +4233,8 @@
           </p:nvSpPr>
           <p:spPr>
             <a:xfrm>
-              <a:off x="2179957" y="1703272"/>
-              <a:ext cx="466794" cy="369332"/>
+              <a:off x="1378551" y="2737604"/>
+              <a:ext cx="659155" cy="369332"/>
             </a:xfrm>
             <a:prstGeom prst="rect">
               <a:avLst/>
@@ -4004,195 +4252,11 @@
                   <a:latin typeface="Arial" panose="020B0604020202020204" pitchFamily="34" charset="0"/>
                   <a:cs typeface="Arial" panose="020B0604020202020204" pitchFamily="34" charset="0"/>
                 </a:rPr>
-                <a:t>(a)</a:t>
+                <a:t>AUV</a:t>
               </a:r>
             </a:p>
           </p:txBody>
         </p:sp>
-        <p:sp>
-          <p:nvSpPr>
-            <p:cNvPr id="43" name="TextBox 42">
-              <a:extLst>
-                <a:ext uri="{FF2B5EF4-FFF2-40B4-BE49-F238E27FC236}">
-                  <a16:creationId xmlns:a16="http://schemas.microsoft.com/office/drawing/2014/main" id="{7635E9DB-83F2-E704-FD46-CDF46CA33FA0}"/>
-                </a:ext>
-              </a:extLst>
-            </p:cNvPr>
-            <p:cNvSpPr txBox="1"/>
-            <p:nvPr/>
-          </p:nvSpPr>
-          <p:spPr>
-            <a:xfrm>
-              <a:off x="6496487" y="3940837"/>
-              <a:ext cx="466794" cy="369332"/>
-            </a:xfrm>
-            <a:prstGeom prst="rect">
-              <a:avLst/>
-            </a:prstGeom>
-            <a:noFill/>
-          </p:spPr>
-          <p:txBody>
-            <a:bodyPr wrap="none" rtlCol="0">
-              <a:spAutoFit/>
-            </a:bodyPr>
-            <a:lstStyle/>
-            <a:p>
-              <a:r>
-                <a:rPr lang="en-US" dirty="0">
-                  <a:solidFill>
-                    <a:schemeClr val="bg1"/>
-                  </a:solidFill>
-                  <a:latin typeface="Arial" panose="020B0604020202020204" pitchFamily="34" charset="0"/>
-                  <a:cs typeface="Arial" panose="020B0604020202020204" pitchFamily="34" charset="0"/>
-                </a:rPr>
-                <a:t>(b)</a:t>
-              </a:r>
-            </a:p>
-          </p:txBody>
-        </p:sp>
-        <p:sp>
-          <p:nvSpPr>
-            <p:cNvPr id="44" name="TextBox 43">
-              <a:extLst>
-                <a:ext uri="{FF2B5EF4-FFF2-40B4-BE49-F238E27FC236}">
-                  <a16:creationId xmlns:a16="http://schemas.microsoft.com/office/drawing/2014/main" id="{D2B8250C-F6B6-6B66-3B6D-5658ED4AB649}"/>
-                </a:ext>
-              </a:extLst>
-            </p:cNvPr>
-            <p:cNvSpPr txBox="1"/>
-            <p:nvPr/>
-          </p:nvSpPr>
-          <p:spPr>
-            <a:xfrm>
-              <a:off x="7411727" y="3940837"/>
-              <a:ext cx="1338828" cy="369332"/>
-            </a:xfrm>
-            <a:prstGeom prst="rect">
-              <a:avLst/>
-            </a:prstGeom>
-            <a:noFill/>
-          </p:spPr>
-          <p:txBody>
-            <a:bodyPr wrap="none" rtlCol="0">
-              <a:spAutoFit/>
-            </a:bodyPr>
-            <a:lstStyle/>
-            <a:p>
-              <a:r>
-                <a:rPr lang="en-US" dirty="0">
-                  <a:solidFill>
-                    <a:schemeClr val="bg1"/>
-                  </a:solidFill>
-                  <a:latin typeface="Arial" panose="020B0604020202020204" pitchFamily="34" charset="0"/>
-                  <a:cs typeface="Arial" panose="020B0604020202020204" pitchFamily="34" charset="0"/>
-                </a:rPr>
-                <a:t>Occupancy</a:t>
-              </a:r>
-            </a:p>
-          </p:txBody>
-        </p:sp>
-        <p:sp>
-          <p:nvSpPr>
-            <p:cNvPr id="45" name="TextBox 44">
-              <a:extLst>
-                <a:ext uri="{FF2B5EF4-FFF2-40B4-BE49-F238E27FC236}">
-                  <a16:creationId xmlns:a16="http://schemas.microsoft.com/office/drawing/2014/main" id="{56E2DC75-767E-3A90-E0E1-AB031E01BED1}"/>
-                </a:ext>
-              </a:extLst>
-            </p:cNvPr>
-            <p:cNvSpPr txBox="1"/>
-            <p:nvPr/>
-          </p:nvSpPr>
-          <p:spPr>
-            <a:xfrm>
-              <a:off x="3139220" y="4166302"/>
-              <a:ext cx="1672253" cy="369332"/>
-            </a:xfrm>
-            <a:prstGeom prst="rect">
-              <a:avLst/>
-            </a:prstGeom>
-            <a:noFill/>
-          </p:spPr>
-          <p:txBody>
-            <a:bodyPr wrap="none" rtlCol="0">
-              <a:spAutoFit/>
-            </a:bodyPr>
-            <a:lstStyle/>
-            <a:p>
-              <a:r>
-                <a:rPr lang="en-US" dirty="0">
-                  <a:latin typeface="Arial" panose="020B0604020202020204" pitchFamily="34" charset="0"/>
-                  <a:cs typeface="Arial" panose="020B0604020202020204" pitchFamily="34" charset="0"/>
-                </a:rPr>
-                <a:t>Density Space</a:t>
-              </a:r>
-            </a:p>
-          </p:txBody>
-        </p:sp>
-        <p:pic>
-          <p:nvPicPr>
-            <p:cNvPr id="4" name="Picture 3" descr="A yellow cylindrical object with arrows&#10;&#10;Description automatically generated">
-              <a:extLst>
-                <a:ext uri="{FF2B5EF4-FFF2-40B4-BE49-F238E27FC236}">
-                  <a16:creationId xmlns:a16="http://schemas.microsoft.com/office/drawing/2014/main" id="{F562B671-B5EA-5028-0D9B-47E988F29B94}"/>
-                </a:ext>
-              </a:extLst>
-            </p:cNvPr>
-            <p:cNvPicPr>
-              <a:picLocks noChangeAspect="1"/>
-            </p:cNvPicPr>
-            <p:nvPr/>
-          </p:nvPicPr>
-          <p:blipFill>
-            <a:blip r:embed="rId5">
-              <a:extLst>
-                <a:ext uri="{BEBA8EAE-BF5A-486C-A8C5-ECC9F3942E4B}">
-                  <a14:imgProps xmlns:a14="http://schemas.microsoft.com/office/drawing/2010/main">
-                    <a14:imgLayer r:embed="rId6">
-                      <a14:imgEffect>
-                        <a14:backgroundRemoval t="9524" b="96561" l="2808" r="91793">
-                          <a14:foregroundMark x1="22894" y1="89153" x2="6803" y2="99735"/>
-                          <a14:foregroundMark x1="6803" y1="99735" x2="5400" y2="79894"/>
-                          <a14:foregroundMark x1="5400" y1="79894" x2="14255" y2="70370"/>
-                          <a14:foregroundMark x1="14255" y1="70370" x2="5616" y2="79101"/>
-                          <a14:foregroundMark x1="5616" y1="79101" x2="11231" y2="93386"/>
-                          <a14:foregroundMark x1="11231" y1="93386" x2="2808" y2="92328"/>
-                          <a14:foregroundMark x1="2808" y1="92328" x2="7451" y2="96825"/>
-                          <a14:foregroundMark x1="28942" y1="51323" x2="38877" y2="44180"/>
-                          <a14:foregroundMark x1="38877" y1="44180" x2="29266" y2="49471"/>
-                          <a14:foregroundMark x1="29266" y1="49471" x2="29266" y2="49471"/>
-                          <a14:foregroundMark x1="87905" y1="11905" x2="91793" y2="17196"/>
-                          <a14:foregroundMark x1="90389" y1="13757" x2="80670" y2="12963"/>
-                          <a14:foregroundMark x1="80670" y1="12963" x2="83369" y2="12434"/>
-                          <a14:foregroundMark x1="84449" y1="9524" x2="76242" y2="13228"/>
-                          <a14:foregroundMark x1="90929" y1="11376" x2="84773" y2="9524"/>
-                          <a14:foregroundMark x1="86933" y1="9524" x2="90929" y2="12169"/>
-                          <a14:foregroundMark x1="31210" y1="48413" x2="41793" y2="39683"/>
-                          <a14:foregroundMark x1="39633" y1="41005" x2="44600" y2="37566"/>
-                        </a14:backgroundRemoval>
-                      </a14:imgEffect>
-                    </a14:imgLayer>
-                  </a14:imgProps>
-                </a:ext>
-                <a:ext uri="{28A0092B-C50C-407E-A947-70E740481C1C}">
-                  <a14:useLocalDpi xmlns:a14="http://schemas.microsoft.com/office/drawing/2010/main" val="0"/>
-                </a:ext>
-              </a:extLst>
-            </a:blip>
-            <a:stretch>
-              <a:fillRect/>
-            </a:stretch>
-          </p:blipFill>
-          <p:spPr>
-            <a:xfrm rot="1170268">
-              <a:off x="1249456" y="2175820"/>
-              <a:ext cx="2086023" cy="851530"/>
-            </a:xfrm>
-            <a:prstGeom prst="rect">
-              <a:avLst/>
-            </a:prstGeom>
-          </p:spPr>
-        </p:pic>
       </p:grpSp>
     </p:spTree>
     <p:extLst>

</xml_diff>

<commit_message>
Revert "added simple nonlinear system example with nmpc"
This reverts commit 734fb27595b33e35df267c3e25e4a34ef507c6df.
</commit_message>
<xml_diff>
--- a/figures/figures.pptx
+++ b/figures/figures.pptx
@@ -105,11 +105,6 @@
       </a:defRPr>
     </a:lvl9pPr>
   </p:defaultTextStyle>
-  <p:extLst>
-    <p:ext uri="{EFAFB233-063F-42B5-8137-9DF3F51BA10A}">
-      <p15:sldGuideLst xmlns:p15="http://schemas.microsoft.com/office/powerpoint/2012/main"/>
-    </p:ext>
-  </p:extLst>
 </p:presentation>
 </file>
 
@@ -260,7 +255,7 @@
           <a:p>
             <a:fld id="{A85E4C48-C885-47B0-A871-75BBED92D34D}" type="datetimeFigureOut">
               <a:rPr lang="en-US" smtClean="0"/>
-              <a:t>3/21/2024</a:t>
+              <a:t>3/20/2024</a:t>
             </a:fld>
             <a:endParaRPr lang="en-US"/>
           </a:p>
@@ -458,7 +453,7 @@
           <a:p>
             <a:fld id="{A85E4C48-C885-47B0-A871-75BBED92D34D}" type="datetimeFigureOut">
               <a:rPr lang="en-US" smtClean="0"/>
-              <a:t>3/21/2024</a:t>
+              <a:t>3/20/2024</a:t>
             </a:fld>
             <a:endParaRPr lang="en-US"/>
           </a:p>
@@ -666,7 +661,7 @@
           <a:p>
             <a:fld id="{A85E4C48-C885-47B0-A871-75BBED92D34D}" type="datetimeFigureOut">
               <a:rPr lang="en-US" smtClean="0"/>
-              <a:t>3/21/2024</a:t>
+              <a:t>3/20/2024</a:t>
             </a:fld>
             <a:endParaRPr lang="en-US"/>
           </a:p>
@@ -864,7 +859,7 @@
           <a:p>
             <a:fld id="{A85E4C48-C885-47B0-A871-75BBED92D34D}" type="datetimeFigureOut">
               <a:rPr lang="en-US" smtClean="0"/>
-              <a:t>3/21/2024</a:t>
+              <a:t>3/20/2024</a:t>
             </a:fld>
             <a:endParaRPr lang="en-US"/>
           </a:p>
@@ -1139,7 +1134,7 @@
           <a:p>
             <a:fld id="{A85E4C48-C885-47B0-A871-75BBED92D34D}" type="datetimeFigureOut">
               <a:rPr lang="en-US" smtClean="0"/>
-              <a:t>3/21/2024</a:t>
+              <a:t>3/20/2024</a:t>
             </a:fld>
             <a:endParaRPr lang="en-US"/>
           </a:p>
@@ -1404,7 +1399,7 @@
           <a:p>
             <a:fld id="{A85E4C48-C885-47B0-A871-75BBED92D34D}" type="datetimeFigureOut">
               <a:rPr lang="en-US" smtClean="0"/>
-              <a:t>3/21/2024</a:t>
+              <a:t>3/20/2024</a:t>
             </a:fld>
             <a:endParaRPr lang="en-US"/>
           </a:p>
@@ -1816,7 +1811,7 @@
           <a:p>
             <a:fld id="{A85E4C48-C885-47B0-A871-75BBED92D34D}" type="datetimeFigureOut">
               <a:rPr lang="en-US" smtClean="0"/>
-              <a:t>3/21/2024</a:t>
+              <a:t>3/20/2024</a:t>
             </a:fld>
             <a:endParaRPr lang="en-US"/>
           </a:p>
@@ -1957,7 +1952,7 @@
           <a:p>
             <a:fld id="{A85E4C48-C885-47B0-A871-75BBED92D34D}" type="datetimeFigureOut">
               <a:rPr lang="en-US" smtClean="0"/>
-              <a:t>3/21/2024</a:t>
+              <a:t>3/20/2024</a:t>
             </a:fld>
             <a:endParaRPr lang="en-US"/>
           </a:p>
@@ -2070,7 +2065,7 @@
           <a:p>
             <a:fld id="{A85E4C48-C885-47B0-A871-75BBED92D34D}" type="datetimeFigureOut">
               <a:rPr lang="en-US" smtClean="0"/>
-              <a:t>3/21/2024</a:t>
+              <a:t>3/20/2024</a:t>
             </a:fld>
             <a:endParaRPr lang="en-US"/>
           </a:p>
@@ -2381,7 +2376,7 @@
           <a:p>
             <a:fld id="{A85E4C48-C885-47B0-A871-75BBED92D34D}" type="datetimeFigureOut">
               <a:rPr lang="en-US" smtClean="0"/>
-              <a:t>3/21/2024</a:t>
+              <a:t>3/20/2024</a:t>
             </a:fld>
             <a:endParaRPr lang="en-US"/>
           </a:p>
@@ -2669,7 +2664,7 @@
           <a:p>
             <a:fld id="{A85E4C48-C885-47B0-A871-75BBED92D34D}" type="datetimeFigureOut">
               <a:rPr lang="en-US" smtClean="0"/>
-              <a:t>3/21/2024</a:t>
+              <a:t>3/20/2024</a:t>
             </a:fld>
             <a:endParaRPr lang="en-US"/>
           </a:p>
@@ -2910,7 +2905,7 @@
           <a:p>
             <a:fld id="{A85E4C48-C885-47B0-A871-75BBED92D34D}" type="datetimeFigureOut">
               <a:rPr lang="en-US" smtClean="0"/>
-              <a:t>3/21/2024</a:t>
+              <a:t>3/20/2024</a:t>
             </a:fld>
             <a:endParaRPr lang="en-US"/>
           </a:p>
@@ -3329,10 +3324,10 @@
       </p:grpSpPr>
       <p:grpSp>
         <p:nvGrpSpPr>
-          <p:cNvPr id="7" name="Group 6">
-            <a:extLst>
-              <a:ext uri="{FF2B5EF4-FFF2-40B4-BE49-F238E27FC236}">
-                <a16:creationId xmlns:a16="http://schemas.microsoft.com/office/drawing/2014/main" id="{A8D4AE21-C46B-1DD5-3212-CC032170DCEE}"/>
+          <p:cNvPr id="6" name="Group 5">
+            <a:extLst>
+              <a:ext uri="{FF2B5EF4-FFF2-40B4-BE49-F238E27FC236}">
+                <a16:creationId xmlns:a16="http://schemas.microsoft.com/office/drawing/2014/main" id="{BAA0B044-43A2-E64D-B92E-190FA74067C3}"/>
               </a:ext>
             </a:extLst>
           </p:cNvPr>
@@ -3347,12 +3342,66 @@
             <a:chExt cx="8289096" cy="4225290"/>
           </a:xfrm>
         </p:grpSpPr>
+        <p:sp>
+          <p:nvSpPr>
+            <p:cNvPr id="46" name="Rectangle 45">
+              <a:extLst>
+                <a:ext uri="{FF2B5EF4-FFF2-40B4-BE49-F238E27FC236}">
+                  <a16:creationId xmlns:a16="http://schemas.microsoft.com/office/drawing/2014/main" id="{4A6A7986-58DE-FD91-8650-0090C0676BC2}"/>
+                </a:ext>
+              </a:extLst>
+            </p:cNvPr>
+            <p:cNvSpPr/>
+            <p:nvPr/>
+          </p:nvSpPr>
+          <p:spPr>
+            <a:xfrm>
+              <a:off x="1167155" y="809625"/>
+              <a:ext cx="8289096" cy="4225290"/>
+            </a:xfrm>
+            <a:prstGeom prst="rect">
+              <a:avLst/>
+            </a:prstGeom>
+            <a:solidFill>
+              <a:schemeClr val="bg1"/>
+            </a:solidFill>
+            <a:ln>
+              <a:solidFill>
+                <a:schemeClr val="bg1"/>
+              </a:solidFill>
+            </a:ln>
+          </p:spPr>
+          <p:style>
+            <a:lnRef idx="2">
+              <a:schemeClr val="accent1">
+                <a:shade val="50000"/>
+              </a:schemeClr>
+            </a:lnRef>
+            <a:fillRef idx="1">
+              <a:schemeClr val="accent1"/>
+            </a:fillRef>
+            <a:effectRef idx="0">
+              <a:schemeClr val="accent1"/>
+            </a:effectRef>
+            <a:fontRef idx="minor">
+              <a:schemeClr val="lt1"/>
+            </a:fontRef>
+          </p:style>
+          <p:txBody>
+            <a:bodyPr rtlCol="0" anchor="ctr"/>
+            <a:lstStyle/>
+            <a:p>
+              <a:pPr algn="ctr"/>
+              <a:endParaRPr lang="en-US"/>
+            </a:p>
+          </p:txBody>
+        </p:sp>
         <p:grpSp>
           <p:nvGrpSpPr>
-            <p:cNvPr id="6" name="Group 5">
+            <p:cNvPr id="39" name="Group 38">
               <a:extLst>
                 <a:ext uri="{FF2B5EF4-FFF2-40B4-BE49-F238E27FC236}">
-                  <a16:creationId xmlns:a16="http://schemas.microsoft.com/office/drawing/2014/main" id="{BAA0B044-43A2-E64D-B92E-190FA74067C3}"/>
+                  <a16:creationId xmlns:a16="http://schemas.microsoft.com/office/drawing/2014/main" id="{36A21939-B82E-EEE6-2EBD-9D3DB1FBE5A5}"/>
                 </a:ext>
               </a:extLst>
             </p:cNvPr>
@@ -3361,18 +3410,170 @@
           </p:nvGrpSpPr>
           <p:grpSpPr>
             <a:xfrm>
-              <a:off x="1167155" y="809625"/>
-              <a:ext cx="8289096" cy="4225290"/>
-              <a:chOff x="1167155" y="809625"/>
-              <a:chExt cx="8289096" cy="4225290"/>
+              <a:off x="2066637" y="901065"/>
+              <a:ext cx="3723453" cy="4133850"/>
+              <a:chOff x="2066637" y="901065"/>
+              <a:chExt cx="3723453" cy="4133850"/>
             </a:xfrm>
           </p:grpSpPr>
+          <p:pic>
+            <p:nvPicPr>
+              <p:cNvPr id="5" name="Picture 4" descr="A picture containing screenshot, diagram, design&#10;&#10;Description automatically generated">
+                <a:extLst>
+                  <a:ext uri="{FF2B5EF4-FFF2-40B4-BE49-F238E27FC236}">
+                    <a16:creationId xmlns:a16="http://schemas.microsoft.com/office/drawing/2014/main" id="{187B6EA4-FF9E-ECFA-C3BF-90E4F6EE03C0}"/>
+                  </a:ext>
+                </a:extLst>
+              </p:cNvPr>
+              <p:cNvPicPr>
+                <a:picLocks noChangeAspect="1"/>
+              </p:cNvPicPr>
+              <p:nvPr/>
+            </p:nvPicPr>
+            <p:blipFill rotWithShape="1">
+              <a:blip r:embed="rId2">
+                <a:extLst>
+                  <a:ext uri="{28A0092B-C50C-407E-A947-70E740481C1C}">
+                    <a14:useLocalDpi xmlns:a14="http://schemas.microsoft.com/office/drawing/2010/main" val="0"/>
+                  </a:ext>
+                </a:extLst>
+              </a:blip>
+              <a:srcRect l="49631" t="19982" b="13208"/>
+              <a:stretch/>
+            </p:blipFill>
+            <p:spPr>
+              <a:xfrm>
+                <a:off x="2164079" y="901065"/>
+                <a:ext cx="3626011" cy="4133850"/>
+              </a:xfrm>
+              <a:prstGeom prst="rect">
+                <a:avLst/>
+              </a:prstGeom>
+            </p:spPr>
+          </p:pic>
+          <p:grpSp>
+            <p:nvGrpSpPr>
+              <p:cNvPr id="11" name="Group 10">
+                <a:extLst>
+                  <a:ext uri="{FF2B5EF4-FFF2-40B4-BE49-F238E27FC236}">
+                    <a16:creationId xmlns:a16="http://schemas.microsoft.com/office/drawing/2014/main" id="{9BEF7A65-1146-0451-EC51-60869CD8DC36}"/>
+                  </a:ext>
+                </a:extLst>
+              </p:cNvPr>
+              <p:cNvGrpSpPr/>
+              <p:nvPr/>
+            </p:nvGrpSpPr>
+            <p:grpSpPr>
+              <a:xfrm>
+                <a:off x="2830900" y="1779659"/>
+                <a:ext cx="668299" cy="435841"/>
+                <a:chOff x="6130360" y="2351159"/>
+                <a:chExt cx="668299" cy="435841"/>
+              </a:xfrm>
+            </p:grpSpPr>
+            <p:sp>
+              <p:nvSpPr>
+                <p:cNvPr id="12" name="Thought Bubble: Cloud 11">
+                  <a:extLst>
+                    <a:ext uri="{FF2B5EF4-FFF2-40B4-BE49-F238E27FC236}">
+                      <a16:creationId xmlns:a16="http://schemas.microsoft.com/office/drawing/2014/main" id="{7467E158-A95D-6CB6-C1BB-C23B52F7AE96}"/>
+                    </a:ext>
+                  </a:extLst>
+                </p:cNvPr>
+                <p:cNvSpPr/>
+                <p:nvPr/>
+              </p:nvSpPr>
+              <p:spPr>
+                <a:xfrm>
+                  <a:off x="6130360" y="2351159"/>
+                  <a:ext cx="668299" cy="435841"/>
+                </a:xfrm>
+                <a:prstGeom prst="cloudCallout">
+                  <a:avLst>
+                    <a:gd name="adj1" fmla="val -33386"/>
+                    <a:gd name="adj2" fmla="val 91372"/>
+                  </a:avLst>
+                </a:prstGeom>
+                <a:solidFill>
+                  <a:schemeClr val="bg1"/>
+                </a:solidFill>
+                <a:ln w="19050">
+                  <a:solidFill>
+                    <a:schemeClr val="tx1"/>
+                  </a:solidFill>
+                </a:ln>
+              </p:spPr>
+              <p:style>
+                <a:lnRef idx="2">
+                  <a:schemeClr val="accent1">
+                    <a:shade val="50000"/>
+                  </a:schemeClr>
+                </a:lnRef>
+                <a:fillRef idx="1">
+                  <a:schemeClr val="accent1"/>
+                </a:fillRef>
+                <a:effectRef idx="0">
+                  <a:schemeClr val="accent1"/>
+                </a:effectRef>
+                <a:fontRef idx="minor">
+                  <a:schemeClr val="lt1"/>
+                </a:fontRef>
+              </p:style>
+              <p:txBody>
+                <a:bodyPr rtlCol="0" anchor="ctr"/>
+                <a:lstStyle/>
+                <a:p>
+                  <a:pPr algn="ctr"/>
+                  <a:endParaRPr lang="en-US"/>
+                </a:p>
+              </p:txBody>
+            </p:sp>
+            <p:pic>
+              <p:nvPicPr>
+                <p:cNvPr id="13" name="Graphic 12" descr="Question Mark with solid fill">
+                  <a:extLst>
+                    <a:ext uri="{FF2B5EF4-FFF2-40B4-BE49-F238E27FC236}">
+                      <a16:creationId xmlns:a16="http://schemas.microsoft.com/office/drawing/2014/main" id="{41593EDC-3972-9BE1-CD99-953ACB57EB41}"/>
+                    </a:ext>
+                  </a:extLst>
+                </p:cNvPr>
+                <p:cNvPicPr>
+                  <a:picLocks noChangeAspect="1"/>
+                </p:cNvPicPr>
+                <p:nvPr/>
+              </p:nvPicPr>
+              <p:blipFill>
+                <a:blip r:embed="rId3">
+                  <a:extLst>
+                    <a:ext uri="{28A0092B-C50C-407E-A947-70E740481C1C}">
+                      <a14:useLocalDpi xmlns:a14="http://schemas.microsoft.com/office/drawing/2010/main" val="0"/>
+                    </a:ext>
+                    <a:ext uri="{96DAC541-7B7A-43D3-8B79-37D633B846F1}">
+                      <asvg:svgBlip xmlns:asvg="http://schemas.microsoft.com/office/drawing/2016/SVG/main" r:embed="rId4"/>
+                    </a:ext>
+                  </a:extLst>
+                </a:blip>
+                <a:stretch>
+                  <a:fillRect/>
+                </a:stretch>
+              </p:blipFill>
+              <p:spPr>
+                <a:xfrm>
+                  <a:off x="6301852" y="2428600"/>
+                  <a:ext cx="280957" cy="280957"/>
+                </a:xfrm>
+                <a:prstGeom prst="rect">
+                  <a:avLst/>
+                </a:prstGeom>
+              </p:spPr>
+            </p:pic>
+          </p:grpSp>
           <p:sp>
             <p:nvSpPr>
-              <p:cNvPr id="46" name="Rectangle 45">
+              <p:cNvPr id="30" name="Oval 29">
                 <a:extLst>
                   <a:ext uri="{FF2B5EF4-FFF2-40B4-BE49-F238E27FC236}">
-                    <a16:creationId xmlns:a16="http://schemas.microsoft.com/office/drawing/2014/main" id="{4A6A7986-58DE-FD91-8650-0090C0676BC2}"/>
+                    <a16:creationId xmlns:a16="http://schemas.microsoft.com/office/drawing/2014/main" id="{7E48300C-19C7-114F-EE3D-19FFF84D9BA1}"/>
                   </a:ext>
                 </a:extLst>
               </p:cNvPr>
@@ -3381,8 +3582,116 @@
             </p:nvSpPr>
             <p:spPr>
               <a:xfrm>
-                <a:off x="1167155" y="809625"/>
-                <a:ext cx="8289096" cy="4225290"/>
+                <a:off x="2115358" y="1234440"/>
+                <a:ext cx="277254" cy="310529"/>
+              </a:xfrm>
+              <a:prstGeom prst="ellipse">
+                <a:avLst/>
+              </a:prstGeom>
+              <a:solidFill>
+                <a:schemeClr val="bg1"/>
+              </a:solidFill>
+              <a:ln>
+                <a:solidFill>
+                  <a:schemeClr val="bg1"/>
+                </a:solidFill>
+              </a:ln>
+            </p:spPr>
+            <p:style>
+              <a:lnRef idx="2">
+                <a:schemeClr val="accent1">
+                  <a:shade val="50000"/>
+                </a:schemeClr>
+              </a:lnRef>
+              <a:fillRef idx="1">
+                <a:schemeClr val="accent1"/>
+              </a:fillRef>
+              <a:effectRef idx="0">
+                <a:schemeClr val="accent1"/>
+              </a:effectRef>
+              <a:fontRef idx="minor">
+                <a:schemeClr val="lt1"/>
+              </a:fontRef>
+            </p:style>
+            <p:txBody>
+              <a:bodyPr rtlCol="0" anchor="ctr"/>
+              <a:lstStyle/>
+              <a:p>
+                <a:pPr algn="ctr"/>
+                <a:endParaRPr lang="en-US"/>
+              </a:p>
+            </p:txBody>
+          </p:sp>
+          <p:sp>
+            <p:nvSpPr>
+              <p:cNvPr id="31" name="Oval 30">
+                <a:extLst>
+                  <a:ext uri="{FF2B5EF4-FFF2-40B4-BE49-F238E27FC236}">
+                    <a16:creationId xmlns:a16="http://schemas.microsoft.com/office/drawing/2014/main" id="{E27B1DA4-7012-DC3A-9787-7D16B40214A2}"/>
+                  </a:ext>
+                </a:extLst>
+              </p:cNvPr>
+              <p:cNvSpPr/>
+              <p:nvPr/>
+            </p:nvSpPr>
+            <p:spPr>
+              <a:xfrm>
+                <a:off x="2066637" y="4040439"/>
+                <a:ext cx="277254" cy="310529"/>
+              </a:xfrm>
+              <a:prstGeom prst="ellipse">
+                <a:avLst/>
+              </a:prstGeom>
+              <a:solidFill>
+                <a:schemeClr val="bg1"/>
+              </a:solidFill>
+              <a:ln>
+                <a:solidFill>
+                  <a:schemeClr val="bg1"/>
+                </a:solidFill>
+              </a:ln>
+            </p:spPr>
+            <p:style>
+              <a:lnRef idx="2">
+                <a:schemeClr val="accent1">
+                  <a:shade val="50000"/>
+                </a:schemeClr>
+              </a:lnRef>
+              <a:fillRef idx="1">
+                <a:schemeClr val="accent1"/>
+              </a:fillRef>
+              <a:effectRef idx="0">
+                <a:schemeClr val="accent1"/>
+              </a:effectRef>
+              <a:fontRef idx="minor">
+                <a:schemeClr val="lt1"/>
+              </a:fontRef>
+            </p:style>
+            <p:txBody>
+              <a:bodyPr rtlCol="0" anchor="ctr"/>
+              <a:lstStyle/>
+              <a:p>
+                <a:pPr algn="ctr"/>
+                <a:endParaRPr lang="en-US"/>
+              </a:p>
+            </p:txBody>
+          </p:sp>
+          <p:sp>
+            <p:nvSpPr>
+              <p:cNvPr id="32" name="Rectangle 31">
+                <a:extLst>
+                  <a:ext uri="{FF2B5EF4-FFF2-40B4-BE49-F238E27FC236}">
+                    <a16:creationId xmlns:a16="http://schemas.microsoft.com/office/drawing/2014/main" id="{3B75EB1B-A72A-8DC4-3334-9BC2FDD16D4D}"/>
+                  </a:ext>
+                </a:extLst>
+              </p:cNvPr>
+              <p:cNvSpPr/>
+              <p:nvPr/>
+            </p:nvSpPr>
+            <p:spPr>
+              <a:xfrm>
+                <a:off x="2132278" y="1691640"/>
+                <a:ext cx="45719" cy="2202180"/>
               </a:xfrm>
               <a:prstGeom prst="rect">
                 <a:avLst/>
@@ -3421,745 +3730,87 @@
               </a:p>
             </p:txBody>
           </p:sp>
-          <p:grpSp>
-            <p:nvGrpSpPr>
-              <p:cNvPr id="39" name="Group 38">
+          <p:sp>
+            <p:nvSpPr>
+              <p:cNvPr id="35" name="Oval 34">
                 <a:extLst>
                   <a:ext uri="{FF2B5EF4-FFF2-40B4-BE49-F238E27FC236}">
-                    <a16:creationId xmlns:a16="http://schemas.microsoft.com/office/drawing/2014/main" id="{36A21939-B82E-EEE6-2EBD-9D3DB1FBE5A5}"/>
+                    <a16:creationId xmlns:a16="http://schemas.microsoft.com/office/drawing/2014/main" id="{10BE3989-0569-356F-5AA1-3F79053DD2D0}"/>
                   </a:ext>
                 </a:extLst>
               </p:cNvPr>
-              <p:cNvGrpSpPr/>
-              <p:nvPr/>
-            </p:nvGrpSpPr>
-            <p:grpSpPr>
-              <a:xfrm>
-                <a:off x="2066637" y="901065"/>
-                <a:ext cx="3723453" cy="4133850"/>
-                <a:chOff x="2066637" y="901065"/>
-                <a:chExt cx="3723453" cy="4133850"/>
-              </a:xfrm>
-            </p:grpSpPr>
-            <p:pic>
-              <p:nvPicPr>
-                <p:cNvPr id="5" name="Picture 4" descr="A picture containing screenshot, diagram, design&#10;&#10;Description automatically generated">
-                  <a:extLst>
-                    <a:ext uri="{FF2B5EF4-FFF2-40B4-BE49-F238E27FC236}">
-                      <a16:creationId xmlns:a16="http://schemas.microsoft.com/office/drawing/2014/main" id="{187B6EA4-FF9E-ECFA-C3BF-90E4F6EE03C0}"/>
-                    </a:ext>
-                  </a:extLst>
-                </p:cNvPr>
-                <p:cNvPicPr>
-                  <a:picLocks noChangeAspect="1"/>
-                </p:cNvPicPr>
-                <p:nvPr/>
-              </p:nvPicPr>
-              <p:blipFill rotWithShape="1">
-                <a:blip r:embed="rId2">
-                  <a:extLst>
-                    <a:ext uri="{28A0092B-C50C-407E-A947-70E740481C1C}">
-                      <a14:useLocalDpi xmlns:a14="http://schemas.microsoft.com/office/drawing/2010/main" val="0"/>
-                    </a:ext>
-                  </a:extLst>
-                </a:blip>
-                <a:srcRect l="49631" t="19982" b="13208"/>
-                <a:stretch/>
-              </p:blipFill>
-              <p:spPr>
-                <a:xfrm>
-                  <a:off x="2164079" y="901065"/>
-                  <a:ext cx="3626011" cy="4133850"/>
-                </a:xfrm>
-                <a:prstGeom prst="rect">
-                  <a:avLst/>
-                </a:prstGeom>
-              </p:spPr>
-            </p:pic>
-            <p:grpSp>
-              <p:nvGrpSpPr>
-                <p:cNvPr id="11" name="Group 10">
-                  <a:extLst>
-                    <a:ext uri="{FF2B5EF4-FFF2-40B4-BE49-F238E27FC236}">
-                      <a16:creationId xmlns:a16="http://schemas.microsoft.com/office/drawing/2014/main" id="{9BEF7A65-1146-0451-EC51-60869CD8DC36}"/>
-                    </a:ext>
-                  </a:extLst>
-                </p:cNvPr>
-                <p:cNvGrpSpPr/>
-                <p:nvPr/>
-              </p:nvGrpSpPr>
-              <p:grpSpPr>
-                <a:xfrm>
-                  <a:off x="2830900" y="1779659"/>
-                  <a:ext cx="668299" cy="435841"/>
-                  <a:chOff x="6130360" y="2351159"/>
-                  <a:chExt cx="668299" cy="435841"/>
-                </a:xfrm>
-              </p:grpSpPr>
-              <p:sp>
-                <p:nvSpPr>
-                  <p:cNvPr id="12" name="Thought Bubble: Cloud 11">
-                    <a:extLst>
-                      <a:ext uri="{FF2B5EF4-FFF2-40B4-BE49-F238E27FC236}">
-                        <a16:creationId xmlns:a16="http://schemas.microsoft.com/office/drawing/2014/main" id="{7467E158-A95D-6CB6-C1BB-C23B52F7AE96}"/>
-                      </a:ext>
-                    </a:extLst>
-                  </p:cNvPr>
-                  <p:cNvSpPr/>
-                  <p:nvPr/>
-                </p:nvSpPr>
-                <p:spPr>
-                  <a:xfrm>
-                    <a:off x="6130360" y="2351159"/>
-                    <a:ext cx="668299" cy="435841"/>
-                  </a:xfrm>
-                  <a:prstGeom prst="cloudCallout">
-                    <a:avLst>
-                      <a:gd name="adj1" fmla="val -33386"/>
-                      <a:gd name="adj2" fmla="val 91372"/>
-                    </a:avLst>
-                  </a:prstGeom>
-                  <a:solidFill>
-                    <a:schemeClr val="bg1"/>
-                  </a:solidFill>
-                  <a:ln w="19050">
-                    <a:solidFill>
-                      <a:schemeClr val="tx1"/>
-                    </a:solidFill>
-                  </a:ln>
-                </p:spPr>
-                <p:style>
-                  <a:lnRef idx="2">
-                    <a:schemeClr val="accent1">
-                      <a:shade val="50000"/>
-                    </a:schemeClr>
-                  </a:lnRef>
-                  <a:fillRef idx="1">
-                    <a:schemeClr val="accent1"/>
-                  </a:fillRef>
-                  <a:effectRef idx="0">
-                    <a:schemeClr val="accent1"/>
-                  </a:effectRef>
-                  <a:fontRef idx="minor">
-                    <a:schemeClr val="lt1"/>
-                  </a:fontRef>
-                </p:style>
-                <p:txBody>
-                  <a:bodyPr rtlCol="0" anchor="ctr"/>
-                  <a:lstStyle/>
-                  <a:p>
-                    <a:pPr algn="ctr"/>
-                    <a:endParaRPr lang="en-US" dirty="0"/>
-                  </a:p>
-                </p:txBody>
-              </p:sp>
-              <p:pic>
-                <p:nvPicPr>
-                  <p:cNvPr id="13" name="Graphic 12" descr="Question Mark with solid fill">
-                    <a:extLst>
-                      <a:ext uri="{FF2B5EF4-FFF2-40B4-BE49-F238E27FC236}">
-                        <a16:creationId xmlns:a16="http://schemas.microsoft.com/office/drawing/2014/main" id="{41593EDC-3972-9BE1-CD99-953ACB57EB41}"/>
-                      </a:ext>
-                    </a:extLst>
-                  </p:cNvPr>
-                  <p:cNvPicPr>
-                    <a:picLocks noChangeAspect="1"/>
-                  </p:cNvPicPr>
-                  <p:nvPr/>
-                </p:nvPicPr>
-                <p:blipFill>
-                  <a:blip r:embed="rId3">
-                    <a:extLst>
-                      <a:ext uri="{28A0092B-C50C-407E-A947-70E740481C1C}">
-                        <a14:useLocalDpi xmlns:a14="http://schemas.microsoft.com/office/drawing/2010/main" val="0"/>
-                      </a:ext>
-                      <a:ext uri="{96DAC541-7B7A-43D3-8B79-37D633B846F1}">
-                        <asvg:svgBlip xmlns:asvg="http://schemas.microsoft.com/office/drawing/2016/SVG/main" r:embed="rId4"/>
-                      </a:ext>
-                    </a:extLst>
-                  </a:blip>
-                  <a:stretch>
-                    <a:fillRect/>
-                  </a:stretch>
-                </p:blipFill>
-                <p:spPr>
-                  <a:xfrm>
-                    <a:off x="6301852" y="2428600"/>
-                    <a:ext cx="280957" cy="280957"/>
-                  </a:xfrm>
-                  <a:prstGeom prst="rect">
-                    <a:avLst/>
-                  </a:prstGeom>
-                </p:spPr>
-              </p:pic>
-            </p:grpSp>
-            <p:sp>
-              <p:nvSpPr>
-                <p:cNvPr id="30" name="Oval 29">
-                  <a:extLst>
-                    <a:ext uri="{FF2B5EF4-FFF2-40B4-BE49-F238E27FC236}">
-                      <a16:creationId xmlns:a16="http://schemas.microsoft.com/office/drawing/2014/main" id="{7E48300C-19C7-114F-EE3D-19FFF84D9BA1}"/>
-                    </a:ext>
-                  </a:extLst>
-                </p:cNvPr>
-                <p:cNvSpPr/>
-                <p:nvPr/>
-              </p:nvSpPr>
-              <p:spPr>
-                <a:xfrm>
-                  <a:off x="2115358" y="1234440"/>
-                  <a:ext cx="277254" cy="310529"/>
-                </a:xfrm>
-                <a:prstGeom prst="ellipse">
-                  <a:avLst/>
-                </a:prstGeom>
-                <a:solidFill>
-                  <a:schemeClr val="bg1"/>
-                </a:solidFill>
-                <a:ln>
-                  <a:solidFill>
-                    <a:schemeClr val="bg1"/>
-                  </a:solidFill>
-                </a:ln>
-              </p:spPr>
-              <p:style>
-                <a:lnRef idx="2">
-                  <a:schemeClr val="accent1">
-                    <a:shade val="50000"/>
-                  </a:schemeClr>
-                </a:lnRef>
-                <a:fillRef idx="1">
-                  <a:schemeClr val="accent1"/>
-                </a:fillRef>
-                <a:effectRef idx="0">
-                  <a:schemeClr val="accent1"/>
-                </a:effectRef>
-                <a:fontRef idx="minor">
-                  <a:schemeClr val="lt1"/>
-                </a:fontRef>
-              </p:style>
-              <p:txBody>
-                <a:bodyPr rtlCol="0" anchor="ctr"/>
-                <a:lstStyle/>
-                <a:p>
-                  <a:pPr algn="ctr"/>
-                  <a:endParaRPr lang="en-US"/>
-                </a:p>
-              </p:txBody>
-            </p:sp>
-            <p:sp>
-              <p:nvSpPr>
-                <p:cNvPr id="31" name="Oval 30">
-                  <a:extLst>
-                    <a:ext uri="{FF2B5EF4-FFF2-40B4-BE49-F238E27FC236}">
-                      <a16:creationId xmlns:a16="http://schemas.microsoft.com/office/drawing/2014/main" id="{E27B1DA4-7012-DC3A-9787-7D16B40214A2}"/>
-                    </a:ext>
-                  </a:extLst>
-                </p:cNvPr>
-                <p:cNvSpPr/>
-                <p:nvPr/>
-              </p:nvSpPr>
-              <p:spPr>
-                <a:xfrm>
-                  <a:off x="2066637" y="4040439"/>
-                  <a:ext cx="277254" cy="310529"/>
-                </a:xfrm>
-                <a:prstGeom prst="ellipse">
-                  <a:avLst/>
-                </a:prstGeom>
-                <a:solidFill>
-                  <a:schemeClr val="bg1"/>
-                </a:solidFill>
-                <a:ln>
-                  <a:solidFill>
-                    <a:schemeClr val="bg1"/>
-                  </a:solidFill>
-                </a:ln>
-              </p:spPr>
-              <p:style>
-                <a:lnRef idx="2">
-                  <a:schemeClr val="accent1">
-                    <a:shade val="50000"/>
-                  </a:schemeClr>
-                </a:lnRef>
-                <a:fillRef idx="1">
-                  <a:schemeClr val="accent1"/>
-                </a:fillRef>
-                <a:effectRef idx="0">
-                  <a:schemeClr val="accent1"/>
-                </a:effectRef>
-                <a:fontRef idx="minor">
-                  <a:schemeClr val="lt1"/>
-                </a:fontRef>
-              </p:style>
-              <p:txBody>
-                <a:bodyPr rtlCol="0" anchor="ctr"/>
-                <a:lstStyle/>
-                <a:p>
-                  <a:pPr algn="ctr"/>
-                  <a:endParaRPr lang="en-US"/>
-                </a:p>
-              </p:txBody>
-            </p:sp>
-            <p:sp>
-              <p:nvSpPr>
-                <p:cNvPr id="32" name="Rectangle 31">
-                  <a:extLst>
-                    <a:ext uri="{FF2B5EF4-FFF2-40B4-BE49-F238E27FC236}">
-                      <a16:creationId xmlns:a16="http://schemas.microsoft.com/office/drawing/2014/main" id="{3B75EB1B-A72A-8DC4-3334-9BC2FDD16D4D}"/>
-                    </a:ext>
-                  </a:extLst>
-                </p:cNvPr>
-                <p:cNvSpPr/>
-                <p:nvPr/>
-              </p:nvSpPr>
-              <p:spPr>
-                <a:xfrm>
-                  <a:off x="2132278" y="1691640"/>
-                  <a:ext cx="45719" cy="2202180"/>
-                </a:xfrm>
-                <a:prstGeom prst="rect">
-                  <a:avLst/>
-                </a:prstGeom>
-                <a:solidFill>
-                  <a:schemeClr val="bg1"/>
-                </a:solidFill>
-                <a:ln>
-                  <a:solidFill>
-                    <a:schemeClr val="bg1"/>
-                  </a:solidFill>
-                </a:ln>
-              </p:spPr>
-              <p:style>
-                <a:lnRef idx="2">
-                  <a:schemeClr val="accent1">
-                    <a:shade val="50000"/>
-                  </a:schemeClr>
-                </a:lnRef>
-                <a:fillRef idx="1">
-                  <a:schemeClr val="accent1"/>
-                </a:fillRef>
-                <a:effectRef idx="0">
-                  <a:schemeClr val="accent1"/>
-                </a:effectRef>
-                <a:fontRef idx="minor">
-                  <a:schemeClr val="lt1"/>
-                </a:fontRef>
-              </p:style>
-              <p:txBody>
-                <a:bodyPr rtlCol="0" anchor="ctr"/>
-                <a:lstStyle/>
-                <a:p>
-                  <a:pPr algn="ctr"/>
-                  <a:endParaRPr lang="en-US"/>
-                </a:p>
-              </p:txBody>
-            </p:sp>
-            <p:sp>
-              <p:nvSpPr>
-                <p:cNvPr id="35" name="Oval 34">
-                  <a:extLst>
-                    <a:ext uri="{FF2B5EF4-FFF2-40B4-BE49-F238E27FC236}">
-                      <a16:creationId xmlns:a16="http://schemas.microsoft.com/office/drawing/2014/main" id="{10BE3989-0569-356F-5AA1-3F79053DD2D0}"/>
-                    </a:ext>
-                  </a:extLst>
-                </p:cNvPr>
-                <p:cNvSpPr/>
-                <p:nvPr/>
-              </p:nvSpPr>
-              <p:spPr>
-                <a:xfrm>
-                  <a:off x="2267761" y="1756540"/>
-                  <a:ext cx="335534" cy="361063"/>
-                </a:xfrm>
-                <a:prstGeom prst="ellipse">
-                  <a:avLst/>
-                </a:prstGeom>
-                <a:solidFill>
-                  <a:schemeClr val="bg1"/>
-                </a:solidFill>
-                <a:ln>
-                  <a:solidFill>
-                    <a:schemeClr val="bg1"/>
-                  </a:solidFill>
-                </a:ln>
-              </p:spPr>
-              <p:style>
-                <a:lnRef idx="2">
-                  <a:schemeClr val="accent1">
-                    <a:shade val="50000"/>
-                  </a:schemeClr>
-                </a:lnRef>
-                <a:fillRef idx="1">
-                  <a:schemeClr val="accent1"/>
-                </a:fillRef>
-                <a:effectRef idx="0">
-                  <a:schemeClr val="accent1"/>
-                </a:effectRef>
-                <a:fontRef idx="minor">
-                  <a:schemeClr val="lt1"/>
-                </a:fontRef>
-              </p:style>
-              <p:txBody>
-                <a:bodyPr rtlCol="0" anchor="ctr"/>
-                <a:lstStyle/>
-                <a:p>
-                  <a:pPr algn="ctr"/>
-                  <a:endParaRPr lang="en-US"/>
-                </a:p>
-              </p:txBody>
-            </p:sp>
-          </p:grpSp>
-          <p:grpSp>
-            <p:nvGrpSpPr>
-              <p:cNvPr id="38" name="Group 37">
-                <a:extLst>
-                  <a:ext uri="{FF2B5EF4-FFF2-40B4-BE49-F238E27FC236}">
-                    <a16:creationId xmlns:a16="http://schemas.microsoft.com/office/drawing/2014/main" id="{5D6B29A0-BDC1-918A-2EA4-9AD334EA0320}"/>
-                  </a:ext>
-                </a:extLst>
-              </p:cNvPr>
-              <p:cNvGrpSpPr/>
-              <p:nvPr/>
-            </p:nvGrpSpPr>
-            <p:grpSpPr>
-              <a:xfrm>
-                <a:off x="6242539" y="1421240"/>
-                <a:ext cx="3151135" cy="2960488"/>
-                <a:chOff x="6233014" y="1421240"/>
-                <a:chExt cx="3151135" cy="2960488"/>
-              </a:xfrm>
-            </p:grpSpPr>
-            <p:pic>
-              <p:nvPicPr>
-                <p:cNvPr id="34" name="Picture 33" descr="A picture containing screenshot, diagram, design&#10;&#10;Description automatically generated">
-                  <a:extLst>
-                    <a:ext uri="{FF2B5EF4-FFF2-40B4-BE49-F238E27FC236}">
-                      <a16:creationId xmlns:a16="http://schemas.microsoft.com/office/drawing/2014/main" id="{3972D254-2E17-4204-2495-CE05733662FD}"/>
-                    </a:ext>
-                  </a:extLst>
-                </p:cNvPr>
-                <p:cNvPicPr>
-                  <a:picLocks noChangeAspect="1"/>
-                </p:cNvPicPr>
-                <p:nvPr/>
-              </p:nvPicPr>
-              <p:blipFill rotWithShape="1">
-                <a:blip r:embed="rId2">
-                  <a:extLst>
-                    <a:ext uri="{28A0092B-C50C-407E-A947-70E740481C1C}">
-                      <a14:useLocalDpi xmlns:a14="http://schemas.microsoft.com/office/drawing/2010/main" val="0"/>
-                    </a:ext>
-                  </a:extLst>
-                </a:blip>
-                <a:srcRect t="52197" r="58786"/>
-                <a:stretch/>
-              </p:blipFill>
-              <p:spPr>
-                <a:xfrm>
-                  <a:off x="6417163" y="1421240"/>
-                  <a:ext cx="2966986" cy="2957801"/>
-                </a:xfrm>
-                <a:prstGeom prst="rect">
-                  <a:avLst/>
-                </a:prstGeom>
-              </p:spPr>
-            </p:pic>
-            <p:pic>
-              <p:nvPicPr>
-                <p:cNvPr id="36" name="Picture 35" descr="A picture containing screenshot, diagram, design&#10;&#10;Description automatically generated">
-                  <a:extLst>
-                    <a:ext uri="{FF2B5EF4-FFF2-40B4-BE49-F238E27FC236}">
-                      <a16:creationId xmlns:a16="http://schemas.microsoft.com/office/drawing/2014/main" id="{6F586AEA-CC53-8498-5891-1D4BA5DED2E5}"/>
-                    </a:ext>
-                  </a:extLst>
-                </p:cNvPr>
-                <p:cNvPicPr>
-                  <a:picLocks noChangeAspect="1"/>
-                </p:cNvPicPr>
-                <p:nvPr/>
-              </p:nvPicPr>
-              <p:blipFill rotWithShape="1">
-                <a:blip r:embed="rId2">
-                  <a:extLst>
-                    <a:ext uri="{28A0092B-C50C-407E-A947-70E740481C1C}">
-                      <a14:useLocalDpi xmlns:a14="http://schemas.microsoft.com/office/drawing/2010/main" val="0"/>
-                    </a:ext>
-                  </a:extLst>
-                </a:blip>
-                <a:srcRect l="8770" t="90881" r="83539"/>
-                <a:stretch/>
-              </p:blipFill>
-              <p:spPr>
-                <a:xfrm>
-                  <a:off x="6452672" y="3814816"/>
-                  <a:ext cx="553673" cy="564225"/>
-                </a:xfrm>
-                <a:prstGeom prst="rect">
-                  <a:avLst/>
-                </a:prstGeom>
-              </p:spPr>
-            </p:pic>
-            <p:sp>
-              <p:nvSpPr>
-                <p:cNvPr id="37" name="Rectangle 36">
-                  <a:extLst>
-                    <a:ext uri="{FF2B5EF4-FFF2-40B4-BE49-F238E27FC236}">
-                      <a16:creationId xmlns:a16="http://schemas.microsoft.com/office/drawing/2014/main" id="{B5D94C0B-0B05-3A6C-91CC-95FDE86CEC77}"/>
-                    </a:ext>
-                  </a:extLst>
-                </p:cNvPr>
-                <p:cNvSpPr/>
-                <p:nvPr/>
-              </p:nvSpPr>
-              <p:spPr>
-                <a:xfrm>
-                  <a:off x="6233014" y="2179548"/>
-                  <a:ext cx="234898" cy="2202180"/>
-                </a:xfrm>
-                <a:prstGeom prst="rect">
-                  <a:avLst/>
-                </a:prstGeom>
-                <a:solidFill>
-                  <a:schemeClr val="bg1"/>
-                </a:solidFill>
-                <a:ln>
-                  <a:solidFill>
-                    <a:schemeClr val="bg1"/>
-                  </a:solidFill>
-                </a:ln>
-              </p:spPr>
-              <p:style>
-                <a:lnRef idx="2">
-                  <a:schemeClr val="accent1">
-                    <a:shade val="50000"/>
-                  </a:schemeClr>
-                </a:lnRef>
-                <a:fillRef idx="1">
-                  <a:schemeClr val="accent1"/>
-                </a:fillRef>
-                <a:effectRef idx="0">
-                  <a:schemeClr val="accent1"/>
-                </a:effectRef>
-                <a:fontRef idx="minor">
-                  <a:schemeClr val="lt1"/>
-                </a:fontRef>
-              </p:style>
-              <p:txBody>
-                <a:bodyPr rtlCol="0" anchor="ctr"/>
-                <a:lstStyle/>
-                <a:p>
-                  <a:pPr algn="ctr"/>
-                  <a:endParaRPr lang="en-US"/>
-                </a:p>
-              </p:txBody>
-            </p:sp>
-          </p:grpSp>
-          <p:cxnSp>
-            <p:nvCxnSpPr>
-              <p:cNvPr id="41" name="Straight Arrow Connector 40">
-                <a:extLst>
-                  <a:ext uri="{FF2B5EF4-FFF2-40B4-BE49-F238E27FC236}">
-                    <a16:creationId xmlns:a16="http://schemas.microsoft.com/office/drawing/2014/main" id="{C1A76C46-9480-F085-4FFF-611D2669624F}"/>
-                  </a:ext>
-                </a:extLst>
-              </p:cNvPr>
-              <p:cNvCxnSpPr>
-                <a:stCxn id="5" idx="3"/>
-              </p:cNvCxnSpPr>
-              <p:nvPr/>
-            </p:nvCxnSpPr>
-            <p:spPr>
-              <a:xfrm>
-                <a:off x="5790090" y="2967990"/>
-                <a:ext cx="579423" cy="8024"/>
-              </a:xfrm>
-              <a:prstGeom prst="straightConnector1">
-                <a:avLst/>
-              </a:prstGeom>
-              <a:ln w="57150">
-                <a:tailEnd type="triangle"/>
-              </a:ln>
-            </p:spPr>
-            <p:style>
-              <a:lnRef idx="1">
-                <a:schemeClr val="dk1"/>
-              </a:lnRef>
-              <a:fillRef idx="0">
-                <a:schemeClr val="dk1"/>
-              </a:fillRef>
-              <a:effectRef idx="0">
-                <a:schemeClr val="dk1"/>
-              </a:effectRef>
-              <a:fontRef idx="minor">
-                <a:schemeClr val="tx1"/>
-              </a:fontRef>
-            </p:style>
-          </p:cxnSp>
-          <p:sp>
-            <p:nvSpPr>
-              <p:cNvPr id="42" name="TextBox 41">
-                <a:extLst>
-                  <a:ext uri="{FF2B5EF4-FFF2-40B4-BE49-F238E27FC236}">
-                    <a16:creationId xmlns:a16="http://schemas.microsoft.com/office/drawing/2014/main" id="{C594CD6D-3D90-391F-AF52-7FCF07BD7E69}"/>
-                  </a:ext>
-                </a:extLst>
-              </p:cNvPr>
-              <p:cNvSpPr txBox="1"/>
+              <p:cNvSpPr/>
               <p:nvPr/>
             </p:nvSpPr>
             <p:spPr>
               <a:xfrm>
-                <a:off x="2179957" y="1703272"/>
-                <a:ext cx="466794" cy="369332"/>
+                <a:off x="2267761" y="1756540"/>
+                <a:ext cx="335534" cy="361063"/>
               </a:xfrm>
-              <a:prstGeom prst="rect">
+              <a:prstGeom prst="ellipse">
                 <a:avLst/>
               </a:prstGeom>
-              <a:noFill/>
+              <a:solidFill>
+                <a:schemeClr val="bg1"/>
+              </a:solidFill>
+              <a:ln>
+                <a:solidFill>
+                  <a:schemeClr val="bg1"/>
+                </a:solidFill>
+              </a:ln>
             </p:spPr>
+            <p:style>
+              <a:lnRef idx="2">
+                <a:schemeClr val="accent1">
+                  <a:shade val="50000"/>
+                </a:schemeClr>
+              </a:lnRef>
+              <a:fillRef idx="1">
+                <a:schemeClr val="accent1"/>
+              </a:fillRef>
+              <a:effectRef idx="0">
+                <a:schemeClr val="accent1"/>
+              </a:effectRef>
+              <a:fontRef idx="minor">
+                <a:schemeClr val="lt1"/>
+              </a:fontRef>
+            </p:style>
             <p:txBody>
-              <a:bodyPr wrap="none" rtlCol="0">
-                <a:spAutoFit/>
-              </a:bodyPr>
+              <a:bodyPr rtlCol="0" anchor="ctr"/>
               <a:lstStyle/>
               <a:p>
-                <a:r>
-                  <a:rPr lang="en-US" dirty="0">
-                    <a:latin typeface="Arial" panose="020B0604020202020204" pitchFamily="34" charset="0"/>
-                    <a:cs typeface="Arial" panose="020B0604020202020204" pitchFamily="34" charset="0"/>
-                  </a:rPr>
-                  <a:t>(a)</a:t>
-                </a:r>
+                <a:pPr algn="ctr"/>
+                <a:endParaRPr lang="en-US"/>
               </a:p>
             </p:txBody>
           </p:sp>
-          <p:sp>
-            <p:nvSpPr>
-              <p:cNvPr id="43" name="TextBox 42">
+        </p:grpSp>
+        <p:grpSp>
+          <p:nvGrpSpPr>
+            <p:cNvPr id="38" name="Group 37">
+              <a:extLst>
+                <a:ext uri="{FF2B5EF4-FFF2-40B4-BE49-F238E27FC236}">
+                  <a16:creationId xmlns:a16="http://schemas.microsoft.com/office/drawing/2014/main" id="{5D6B29A0-BDC1-918A-2EA4-9AD334EA0320}"/>
+                </a:ext>
+              </a:extLst>
+            </p:cNvPr>
+            <p:cNvGrpSpPr/>
+            <p:nvPr/>
+          </p:nvGrpSpPr>
+          <p:grpSpPr>
+            <a:xfrm>
+              <a:off x="6242539" y="1421240"/>
+              <a:ext cx="3151135" cy="2960488"/>
+              <a:chOff x="6233014" y="1421240"/>
+              <a:chExt cx="3151135" cy="2960488"/>
+            </a:xfrm>
+          </p:grpSpPr>
+          <p:pic>
+            <p:nvPicPr>
+              <p:cNvPr id="34" name="Picture 33" descr="A picture containing screenshot, diagram, design&#10;&#10;Description automatically generated">
                 <a:extLst>
                   <a:ext uri="{FF2B5EF4-FFF2-40B4-BE49-F238E27FC236}">
-                    <a16:creationId xmlns:a16="http://schemas.microsoft.com/office/drawing/2014/main" id="{7635E9DB-83F2-E704-FD46-CDF46CA33FA0}"/>
-                  </a:ext>
-                </a:extLst>
-              </p:cNvPr>
-              <p:cNvSpPr txBox="1"/>
-              <p:nvPr/>
-            </p:nvSpPr>
-            <p:spPr>
-              <a:xfrm>
-                <a:off x="6496487" y="3940837"/>
-                <a:ext cx="466794" cy="369332"/>
-              </a:xfrm>
-              <a:prstGeom prst="rect">
-                <a:avLst/>
-              </a:prstGeom>
-              <a:noFill/>
-            </p:spPr>
-            <p:txBody>
-              <a:bodyPr wrap="none" rtlCol="0">
-                <a:spAutoFit/>
-              </a:bodyPr>
-              <a:lstStyle/>
-              <a:p>
-                <a:r>
-                  <a:rPr lang="en-US" dirty="0">
-                    <a:solidFill>
-                      <a:schemeClr val="bg1"/>
-                    </a:solidFill>
-                    <a:latin typeface="Arial" panose="020B0604020202020204" pitchFamily="34" charset="0"/>
-                    <a:cs typeface="Arial" panose="020B0604020202020204" pitchFamily="34" charset="0"/>
-                  </a:rPr>
-                  <a:t>(b)</a:t>
-                </a:r>
-              </a:p>
-            </p:txBody>
-          </p:sp>
-          <p:sp>
-            <p:nvSpPr>
-              <p:cNvPr id="44" name="TextBox 43">
-                <a:extLst>
-                  <a:ext uri="{FF2B5EF4-FFF2-40B4-BE49-F238E27FC236}">
-                    <a16:creationId xmlns:a16="http://schemas.microsoft.com/office/drawing/2014/main" id="{D2B8250C-F6B6-6B66-3B6D-5658ED4AB649}"/>
-                  </a:ext>
-                </a:extLst>
-              </p:cNvPr>
-              <p:cNvSpPr txBox="1"/>
-              <p:nvPr/>
-            </p:nvSpPr>
-            <p:spPr>
-              <a:xfrm>
-                <a:off x="7411727" y="3940837"/>
-                <a:ext cx="1338828" cy="369332"/>
-              </a:xfrm>
-              <a:prstGeom prst="rect">
-                <a:avLst/>
-              </a:prstGeom>
-              <a:noFill/>
-            </p:spPr>
-            <p:txBody>
-              <a:bodyPr wrap="none" rtlCol="0">
-                <a:spAutoFit/>
-              </a:bodyPr>
-              <a:lstStyle/>
-              <a:p>
-                <a:r>
-                  <a:rPr lang="en-US" dirty="0">
-                    <a:solidFill>
-                      <a:schemeClr val="bg1"/>
-                    </a:solidFill>
-                    <a:latin typeface="Arial" panose="020B0604020202020204" pitchFamily="34" charset="0"/>
-                    <a:cs typeface="Arial" panose="020B0604020202020204" pitchFamily="34" charset="0"/>
-                  </a:rPr>
-                  <a:t>Occupancy</a:t>
-                </a:r>
-              </a:p>
-            </p:txBody>
-          </p:sp>
-          <p:sp>
-            <p:nvSpPr>
-              <p:cNvPr id="45" name="TextBox 44">
-                <a:extLst>
-                  <a:ext uri="{FF2B5EF4-FFF2-40B4-BE49-F238E27FC236}">
-                    <a16:creationId xmlns:a16="http://schemas.microsoft.com/office/drawing/2014/main" id="{56E2DC75-767E-3A90-E0E1-AB031E01BED1}"/>
-                  </a:ext>
-                </a:extLst>
-              </p:cNvPr>
-              <p:cNvSpPr txBox="1"/>
-              <p:nvPr/>
-            </p:nvSpPr>
-            <p:spPr>
-              <a:xfrm>
-                <a:off x="3139220" y="4166302"/>
-                <a:ext cx="1672253" cy="369332"/>
-              </a:xfrm>
-              <a:prstGeom prst="rect">
-                <a:avLst/>
-              </a:prstGeom>
-              <a:noFill/>
-            </p:spPr>
-            <p:txBody>
-              <a:bodyPr wrap="none" rtlCol="0">
-                <a:spAutoFit/>
-              </a:bodyPr>
-              <a:lstStyle/>
-              <a:p>
-                <a:r>
-                  <a:rPr lang="en-US" dirty="0">
-                    <a:latin typeface="Arial" panose="020B0604020202020204" pitchFamily="34" charset="0"/>
-                    <a:cs typeface="Arial" panose="020B0604020202020204" pitchFamily="34" charset="0"/>
-                  </a:rPr>
-                  <a:t>Density Space</a:t>
-                </a:r>
-              </a:p>
-            </p:txBody>
-          </p:sp>
-          <p:pic>
-            <p:nvPicPr>
-              <p:cNvPr id="4" name="Picture 3" descr="A yellow cylindrical object with arrows&#10;&#10;Description automatically generated">
-                <a:extLst>
-                  <a:ext uri="{FF2B5EF4-FFF2-40B4-BE49-F238E27FC236}">
-                    <a16:creationId xmlns:a16="http://schemas.microsoft.com/office/drawing/2014/main" id="{F562B671-B5EA-5028-0D9B-47E988F29B94}"/>
+                    <a16:creationId xmlns:a16="http://schemas.microsoft.com/office/drawing/2014/main" id="{3972D254-2E17-4204-2495-CE05733662FD}"/>
                   </a:ext>
                 </a:extLst>
               </p:cNvPr>
@@ -4168,63 +3819,164 @@
               </p:cNvPicPr>
               <p:nvPr/>
             </p:nvPicPr>
-            <p:blipFill>
-              <a:blip r:embed="rId5">
+            <p:blipFill rotWithShape="1">
+              <a:blip r:embed="rId2">
                 <a:extLst>
-                  <a:ext uri="{BEBA8EAE-BF5A-486C-A8C5-ECC9F3942E4B}">
-                    <a14:imgProps xmlns:a14="http://schemas.microsoft.com/office/drawing/2010/main">
-                      <a14:imgLayer r:embed="rId6">
-                        <a14:imgEffect>
-                          <a14:backgroundRemoval t="9524" b="96561" l="2808" r="91793">
-                            <a14:foregroundMark x1="22894" y1="89153" x2="6803" y2="99735"/>
-                            <a14:foregroundMark x1="6803" y1="99735" x2="5400" y2="79894"/>
-                            <a14:foregroundMark x1="5400" y1="79894" x2="14255" y2="70370"/>
-                            <a14:foregroundMark x1="14255" y1="70370" x2="5616" y2="79101"/>
-                            <a14:foregroundMark x1="5616" y1="79101" x2="11231" y2="93386"/>
-                            <a14:foregroundMark x1="11231" y1="93386" x2="2808" y2="92328"/>
-                            <a14:foregroundMark x1="2808" y1="92328" x2="7451" y2="96825"/>
-                            <a14:foregroundMark x1="28942" y1="51323" x2="38877" y2="44180"/>
-                            <a14:foregroundMark x1="38877" y1="44180" x2="29266" y2="49471"/>
-                            <a14:foregroundMark x1="29266" y1="49471" x2="29266" y2="49471"/>
-                            <a14:foregroundMark x1="87905" y1="11905" x2="91793" y2="17196"/>
-                            <a14:foregroundMark x1="90389" y1="13757" x2="80670" y2="12963"/>
-                            <a14:foregroundMark x1="80670" y1="12963" x2="83369" y2="12434"/>
-                            <a14:foregroundMark x1="84449" y1="9524" x2="76242" y2="13228"/>
-                            <a14:foregroundMark x1="90929" y1="11376" x2="84773" y2="9524"/>
-                            <a14:foregroundMark x1="86933" y1="9524" x2="90929" y2="12169"/>
-                            <a14:foregroundMark x1="31210" y1="48413" x2="41793" y2="39683"/>
-                            <a14:foregroundMark x1="39633" y1="41005" x2="44600" y2="37566"/>
-                          </a14:backgroundRemoval>
-                        </a14:imgEffect>
-                      </a14:imgLayer>
-                    </a14:imgProps>
-                  </a:ext>
                   <a:ext uri="{28A0092B-C50C-407E-A947-70E740481C1C}">
                     <a14:useLocalDpi xmlns:a14="http://schemas.microsoft.com/office/drawing/2010/main" val="0"/>
                   </a:ext>
                 </a:extLst>
               </a:blip>
-              <a:stretch>
-                <a:fillRect/>
-              </a:stretch>
+              <a:srcRect t="52197" r="58786"/>
+              <a:stretch/>
             </p:blipFill>
             <p:spPr>
-              <a:xfrm rot="1170268">
-                <a:off x="1249456" y="2175820"/>
-                <a:ext cx="2086023" cy="851530"/>
+              <a:xfrm>
+                <a:off x="6417163" y="1421240"/>
+                <a:ext cx="2966986" cy="2957801"/>
               </a:xfrm>
               <a:prstGeom prst="rect">
                 <a:avLst/>
               </a:prstGeom>
             </p:spPr>
           </p:pic>
+          <p:pic>
+            <p:nvPicPr>
+              <p:cNvPr id="36" name="Picture 35" descr="A picture containing screenshot, diagram, design&#10;&#10;Description automatically generated">
+                <a:extLst>
+                  <a:ext uri="{FF2B5EF4-FFF2-40B4-BE49-F238E27FC236}">
+                    <a16:creationId xmlns:a16="http://schemas.microsoft.com/office/drawing/2014/main" id="{6F586AEA-CC53-8498-5891-1D4BA5DED2E5}"/>
+                  </a:ext>
+                </a:extLst>
+              </p:cNvPr>
+              <p:cNvPicPr>
+                <a:picLocks noChangeAspect="1"/>
+              </p:cNvPicPr>
+              <p:nvPr/>
+            </p:nvPicPr>
+            <p:blipFill rotWithShape="1">
+              <a:blip r:embed="rId2">
+                <a:extLst>
+                  <a:ext uri="{28A0092B-C50C-407E-A947-70E740481C1C}">
+                    <a14:useLocalDpi xmlns:a14="http://schemas.microsoft.com/office/drawing/2010/main" val="0"/>
+                  </a:ext>
+                </a:extLst>
+              </a:blip>
+              <a:srcRect l="8770" t="90881" r="83539"/>
+              <a:stretch/>
+            </p:blipFill>
+            <p:spPr>
+              <a:xfrm>
+                <a:off x="6452672" y="3814816"/>
+                <a:ext cx="553673" cy="564225"/>
+              </a:xfrm>
+              <a:prstGeom prst="rect">
+                <a:avLst/>
+              </a:prstGeom>
+            </p:spPr>
+          </p:pic>
+          <p:sp>
+            <p:nvSpPr>
+              <p:cNvPr id="37" name="Rectangle 36">
+                <a:extLst>
+                  <a:ext uri="{FF2B5EF4-FFF2-40B4-BE49-F238E27FC236}">
+                    <a16:creationId xmlns:a16="http://schemas.microsoft.com/office/drawing/2014/main" id="{B5D94C0B-0B05-3A6C-91CC-95FDE86CEC77}"/>
+                  </a:ext>
+                </a:extLst>
+              </p:cNvPr>
+              <p:cNvSpPr/>
+              <p:nvPr/>
+            </p:nvSpPr>
+            <p:spPr>
+              <a:xfrm>
+                <a:off x="6233014" y="2179548"/>
+                <a:ext cx="234898" cy="2202180"/>
+              </a:xfrm>
+              <a:prstGeom prst="rect">
+                <a:avLst/>
+              </a:prstGeom>
+              <a:solidFill>
+                <a:schemeClr val="bg1"/>
+              </a:solidFill>
+              <a:ln>
+                <a:solidFill>
+                  <a:schemeClr val="bg1"/>
+                </a:solidFill>
+              </a:ln>
+            </p:spPr>
+            <p:style>
+              <a:lnRef idx="2">
+                <a:schemeClr val="accent1">
+                  <a:shade val="50000"/>
+                </a:schemeClr>
+              </a:lnRef>
+              <a:fillRef idx="1">
+                <a:schemeClr val="accent1"/>
+              </a:fillRef>
+              <a:effectRef idx="0">
+                <a:schemeClr val="accent1"/>
+              </a:effectRef>
+              <a:fontRef idx="minor">
+                <a:schemeClr val="lt1"/>
+              </a:fontRef>
+            </p:style>
+            <p:txBody>
+              <a:bodyPr rtlCol="0" anchor="ctr"/>
+              <a:lstStyle/>
+              <a:p>
+                <a:pPr algn="ctr"/>
+                <a:endParaRPr lang="en-US"/>
+              </a:p>
+            </p:txBody>
+          </p:sp>
         </p:grpSp>
+        <p:cxnSp>
+          <p:nvCxnSpPr>
+            <p:cNvPr id="41" name="Straight Arrow Connector 40">
+              <a:extLst>
+                <a:ext uri="{FF2B5EF4-FFF2-40B4-BE49-F238E27FC236}">
+                  <a16:creationId xmlns:a16="http://schemas.microsoft.com/office/drawing/2014/main" id="{C1A76C46-9480-F085-4FFF-611D2669624F}"/>
+                </a:ext>
+              </a:extLst>
+            </p:cNvPr>
+            <p:cNvCxnSpPr>
+              <a:stCxn id="5" idx="3"/>
+            </p:cNvCxnSpPr>
+            <p:nvPr/>
+          </p:nvCxnSpPr>
+          <p:spPr>
+            <a:xfrm>
+              <a:off x="5790090" y="2967990"/>
+              <a:ext cx="579423" cy="8024"/>
+            </a:xfrm>
+            <a:prstGeom prst="straightConnector1">
+              <a:avLst/>
+            </a:prstGeom>
+            <a:ln w="57150">
+              <a:tailEnd type="triangle"/>
+            </a:ln>
+          </p:spPr>
+          <p:style>
+            <a:lnRef idx="1">
+              <a:schemeClr val="dk1"/>
+            </a:lnRef>
+            <a:fillRef idx="0">
+              <a:schemeClr val="dk1"/>
+            </a:fillRef>
+            <a:effectRef idx="0">
+              <a:schemeClr val="dk1"/>
+            </a:effectRef>
+            <a:fontRef idx="minor">
+              <a:schemeClr val="tx1"/>
+            </a:fontRef>
+          </p:style>
+        </p:cxnSp>
         <p:sp>
           <p:nvSpPr>
-            <p:cNvPr id="3" name="TextBox 2">
+            <p:cNvPr id="42" name="TextBox 41">
               <a:extLst>
                 <a:ext uri="{FF2B5EF4-FFF2-40B4-BE49-F238E27FC236}">
-                  <a16:creationId xmlns:a16="http://schemas.microsoft.com/office/drawing/2014/main" id="{21BDB62D-46B1-2D06-7FDD-23BD0BE9A7A4}"/>
+                  <a16:creationId xmlns:a16="http://schemas.microsoft.com/office/drawing/2014/main" id="{C594CD6D-3D90-391F-AF52-7FCF07BD7E69}"/>
                 </a:ext>
               </a:extLst>
             </p:cNvPr>
@@ -4233,8 +3985,8 @@
           </p:nvSpPr>
           <p:spPr>
             <a:xfrm>
-              <a:off x="1378551" y="2737604"/>
-              <a:ext cx="659155" cy="369332"/>
+              <a:off x="2179957" y="1703272"/>
+              <a:ext cx="466794" cy="369332"/>
             </a:xfrm>
             <a:prstGeom prst="rect">
               <a:avLst/>
@@ -4252,11 +4004,195 @@
                   <a:latin typeface="Arial" panose="020B0604020202020204" pitchFamily="34" charset="0"/>
                   <a:cs typeface="Arial" panose="020B0604020202020204" pitchFamily="34" charset="0"/>
                 </a:rPr>
-                <a:t>AUV</a:t>
+                <a:t>(a)</a:t>
               </a:r>
             </a:p>
           </p:txBody>
         </p:sp>
+        <p:sp>
+          <p:nvSpPr>
+            <p:cNvPr id="43" name="TextBox 42">
+              <a:extLst>
+                <a:ext uri="{FF2B5EF4-FFF2-40B4-BE49-F238E27FC236}">
+                  <a16:creationId xmlns:a16="http://schemas.microsoft.com/office/drawing/2014/main" id="{7635E9DB-83F2-E704-FD46-CDF46CA33FA0}"/>
+                </a:ext>
+              </a:extLst>
+            </p:cNvPr>
+            <p:cNvSpPr txBox="1"/>
+            <p:nvPr/>
+          </p:nvSpPr>
+          <p:spPr>
+            <a:xfrm>
+              <a:off x="6496487" y="3940837"/>
+              <a:ext cx="466794" cy="369332"/>
+            </a:xfrm>
+            <a:prstGeom prst="rect">
+              <a:avLst/>
+            </a:prstGeom>
+            <a:noFill/>
+          </p:spPr>
+          <p:txBody>
+            <a:bodyPr wrap="none" rtlCol="0">
+              <a:spAutoFit/>
+            </a:bodyPr>
+            <a:lstStyle/>
+            <a:p>
+              <a:r>
+                <a:rPr lang="en-US" dirty="0">
+                  <a:solidFill>
+                    <a:schemeClr val="bg1"/>
+                  </a:solidFill>
+                  <a:latin typeface="Arial" panose="020B0604020202020204" pitchFamily="34" charset="0"/>
+                  <a:cs typeface="Arial" panose="020B0604020202020204" pitchFamily="34" charset="0"/>
+                </a:rPr>
+                <a:t>(b)</a:t>
+              </a:r>
+            </a:p>
+          </p:txBody>
+        </p:sp>
+        <p:sp>
+          <p:nvSpPr>
+            <p:cNvPr id="44" name="TextBox 43">
+              <a:extLst>
+                <a:ext uri="{FF2B5EF4-FFF2-40B4-BE49-F238E27FC236}">
+                  <a16:creationId xmlns:a16="http://schemas.microsoft.com/office/drawing/2014/main" id="{D2B8250C-F6B6-6B66-3B6D-5658ED4AB649}"/>
+                </a:ext>
+              </a:extLst>
+            </p:cNvPr>
+            <p:cNvSpPr txBox="1"/>
+            <p:nvPr/>
+          </p:nvSpPr>
+          <p:spPr>
+            <a:xfrm>
+              <a:off x="7411727" y="3940837"/>
+              <a:ext cx="1338828" cy="369332"/>
+            </a:xfrm>
+            <a:prstGeom prst="rect">
+              <a:avLst/>
+            </a:prstGeom>
+            <a:noFill/>
+          </p:spPr>
+          <p:txBody>
+            <a:bodyPr wrap="none" rtlCol="0">
+              <a:spAutoFit/>
+            </a:bodyPr>
+            <a:lstStyle/>
+            <a:p>
+              <a:r>
+                <a:rPr lang="en-US" dirty="0">
+                  <a:solidFill>
+                    <a:schemeClr val="bg1"/>
+                  </a:solidFill>
+                  <a:latin typeface="Arial" panose="020B0604020202020204" pitchFamily="34" charset="0"/>
+                  <a:cs typeface="Arial" panose="020B0604020202020204" pitchFamily="34" charset="0"/>
+                </a:rPr>
+                <a:t>Occupancy</a:t>
+              </a:r>
+            </a:p>
+          </p:txBody>
+        </p:sp>
+        <p:sp>
+          <p:nvSpPr>
+            <p:cNvPr id="45" name="TextBox 44">
+              <a:extLst>
+                <a:ext uri="{FF2B5EF4-FFF2-40B4-BE49-F238E27FC236}">
+                  <a16:creationId xmlns:a16="http://schemas.microsoft.com/office/drawing/2014/main" id="{56E2DC75-767E-3A90-E0E1-AB031E01BED1}"/>
+                </a:ext>
+              </a:extLst>
+            </p:cNvPr>
+            <p:cNvSpPr txBox="1"/>
+            <p:nvPr/>
+          </p:nvSpPr>
+          <p:spPr>
+            <a:xfrm>
+              <a:off x="3139220" y="4166302"/>
+              <a:ext cx="1672253" cy="369332"/>
+            </a:xfrm>
+            <a:prstGeom prst="rect">
+              <a:avLst/>
+            </a:prstGeom>
+            <a:noFill/>
+          </p:spPr>
+          <p:txBody>
+            <a:bodyPr wrap="none" rtlCol="0">
+              <a:spAutoFit/>
+            </a:bodyPr>
+            <a:lstStyle/>
+            <a:p>
+              <a:r>
+                <a:rPr lang="en-US" dirty="0">
+                  <a:latin typeface="Arial" panose="020B0604020202020204" pitchFamily="34" charset="0"/>
+                  <a:cs typeface="Arial" panose="020B0604020202020204" pitchFamily="34" charset="0"/>
+                </a:rPr>
+                <a:t>Density Space</a:t>
+              </a:r>
+            </a:p>
+          </p:txBody>
+        </p:sp>
+        <p:pic>
+          <p:nvPicPr>
+            <p:cNvPr id="4" name="Picture 3" descr="A yellow cylindrical object with arrows&#10;&#10;Description automatically generated">
+              <a:extLst>
+                <a:ext uri="{FF2B5EF4-FFF2-40B4-BE49-F238E27FC236}">
+                  <a16:creationId xmlns:a16="http://schemas.microsoft.com/office/drawing/2014/main" id="{F562B671-B5EA-5028-0D9B-47E988F29B94}"/>
+                </a:ext>
+              </a:extLst>
+            </p:cNvPr>
+            <p:cNvPicPr>
+              <a:picLocks noChangeAspect="1"/>
+            </p:cNvPicPr>
+            <p:nvPr/>
+          </p:nvPicPr>
+          <p:blipFill>
+            <a:blip r:embed="rId5">
+              <a:extLst>
+                <a:ext uri="{BEBA8EAE-BF5A-486C-A8C5-ECC9F3942E4B}">
+                  <a14:imgProps xmlns:a14="http://schemas.microsoft.com/office/drawing/2010/main">
+                    <a14:imgLayer r:embed="rId6">
+                      <a14:imgEffect>
+                        <a14:backgroundRemoval t="9524" b="96561" l="2808" r="91793">
+                          <a14:foregroundMark x1="22894" y1="89153" x2="6803" y2="99735"/>
+                          <a14:foregroundMark x1="6803" y1="99735" x2="5400" y2="79894"/>
+                          <a14:foregroundMark x1="5400" y1="79894" x2="14255" y2="70370"/>
+                          <a14:foregroundMark x1="14255" y1="70370" x2="5616" y2="79101"/>
+                          <a14:foregroundMark x1="5616" y1="79101" x2="11231" y2="93386"/>
+                          <a14:foregroundMark x1="11231" y1="93386" x2="2808" y2="92328"/>
+                          <a14:foregroundMark x1="2808" y1="92328" x2="7451" y2="96825"/>
+                          <a14:foregroundMark x1="28942" y1="51323" x2="38877" y2="44180"/>
+                          <a14:foregroundMark x1="38877" y1="44180" x2="29266" y2="49471"/>
+                          <a14:foregroundMark x1="29266" y1="49471" x2="29266" y2="49471"/>
+                          <a14:foregroundMark x1="87905" y1="11905" x2="91793" y2="17196"/>
+                          <a14:foregroundMark x1="90389" y1="13757" x2="80670" y2="12963"/>
+                          <a14:foregroundMark x1="80670" y1="12963" x2="83369" y2="12434"/>
+                          <a14:foregroundMark x1="84449" y1="9524" x2="76242" y2="13228"/>
+                          <a14:foregroundMark x1="90929" y1="11376" x2="84773" y2="9524"/>
+                          <a14:foregroundMark x1="86933" y1="9524" x2="90929" y2="12169"/>
+                          <a14:foregroundMark x1="31210" y1="48413" x2="41793" y2="39683"/>
+                          <a14:foregroundMark x1="39633" y1="41005" x2="44600" y2="37566"/>
+                        </a14:backgroundRemoval>
+                      </a14:imgEffect>
+                    </a14:imgLayer>
+                  </a14:imgProps>
+                </a:ext>
+                <a:ext uri="{28A0092B-C50C-407E-A947-70E740481C1C}">
+                  <a14:useLocalDpi xmlns:a14="http://schemas.microsoft.com/office/drawing/2010/main" val="0"/>
+                </a:ext>
+              </a:extLst>
+            </a:blip>
+            <a:stretch>
+              <a:fillRect/>
+            </a:stretch>
+          </p:blipFill>
+          <p:spPr>
+            <a:xfrm rot="1170268">
+              <a:off x="1249456" y="2175820"/>
+              <a:ext cx="2086023" cy="851530"/>
+            </a:xfrm>
+            <a:prstGeom prst="rect">
+              <a:avLst/>
+            </a:prstGeom>
+          </p:spPr>
+        </p:pic>
       </p:grpSp>
     </p:spTree>
     <p:extLst>

</xml_diff>

<commit_message>
Revert "Revert "added simple nonlinear system example with nmpc""
This reverts commit fbf10e9a08275bfb8afb944ad3a99169c8a8d94f.
</commit_message>
<xml_diff>
--- a/figures/figures.pptx
+++ b/figures/figures.pptx
@@ -105,6 +105,11 @@
       </a:defRPr>
     </a:lvl9pPr>
   </p:defaultTextStyle>
+  <p:extLst>
+    <p:ext uri="{EFAFB233-063F-42B5-8137-9DF3F51BA10A}">
+      <p15:sldGuideLst xmlns:p15="http://schemas.microsoft.com/office/powerpoint/2012/main"/>
+    </p:ext>
+  </p:extLst>
 </p:presentation>
 </file>
 
@@ -255,7 +260,7 @@
           <a:p>
             <a:fld id="{A85E4C48-C885-47B0-A871-75BBED92D34D}" type="datetimeFigureOut">
               <a:rPr lang="en-US" smtClean="0"/>
-              <a:t>3/20/2024</a:t>
+              <a:t>3/21/2024</a:t>
             </a:fld>
             <a:endParaRPr lang="en-US"/>
           </a:p>
@@ -453,7 +458,7 @@
           <a:p>
             <a:fld id="{A85E4C48-C885-47B0-A871-75BBED92D34D}" type="datetimeFigureOut">
               <a:rPr lang="en-US" smtClean="0"/>
-              <a:t>3/20/2024</a:t>
+              <a:t>3/21/2024</a:t>
             </a:fld>
             <a:endParaRPr lang="en-US"/>
           </a:p>
@@ -661,7 +666,7 @@
           <a:p>
             <a:fld id="{A85E4C48-C885-47B0-A871-75BBED92D34D}" type="datetimeFigureOut">
               <a:rPr lang="en-US" smtClean="0"/>
-              <a:t>3/20/2024</a:t>
+              <a:t>3/21/2024</a:t>
             </a:fld>
             <a:endParaRPr lang="en-US"/>
           </a:p>
@@ -859,7 +864,7 @@
           <a:p>
             <a:fld id="{A85E4C48-C885-47B0-A871-75BBED92D34D}" type="datetimeFigureOut">
               <a:rPr lang="en-US" smtClean="0"/>
-              <a:t>3/20/2024</a:t>
+              <a:t>3/21/2024</a:t>
             </a:fld>
             <a:endParaRPr lang="en-US"/>
           </a:p>
@@ -1134,7 +1139,7 @@
           <a:p>
             <a:fld id="{A85E4C48-C885-47B0-A871-75BBED92D34D}" type="datetimeFigureOut">
               <a:rPr lang="en-US" smtClean="0"/>
-              <a:t>3/20/2024</a:t>
+              <a:t>3/21/2024</a:t>
             </a:fld>
             <a:endParaRPr lang="en-US"/>
           </a:p>
@@ -1399,7 +1404,7 @@
           <a:p>
             <a:fld id="{A85E4C48-C885-47B0-A871-75BBED92D34D}" type="datetimeFigureOut">
               <a:rPr lang="en-US" smtClean="0"/>
-              <a:t>3/20/2024</a:t>
+              <a:t>3/21/2024</a:t>
             </a:fld>
             <a:endParaRPr lang="en-US"/>
           </a:p>
@@ -1811,7 +1816,7 @@
           <a:p>
             <a:fld id="{A85E4C48-C885-47B0-A871-75BBED92D34D}" type="datetimeFigureOut">
               <a:rPr lang="en-US" smtClean="0"/>
-              <a:t>3/20/2024</a:t>
+              <a:t>3/21/2024</a:t>
             </a:fld>
             <a:endParaRPr lang="en-US"/>
           </a:p>
@@ -1952,7 +1957,7 @@
           <a:p>
             <a:fld id="{A85E4C48-C885-47B0-A871-75BBED92D34D}" type="datetimeFigureOut">
               <a:rPr lang="en-US" smtClean="0"/>
-              <a:t>3/20/2024</a:t>
+              <a:t>3/21/2024</a:t>
             </a:fld>
             <a:endParaRPr lang="en-US"/>
           </a:p>
@@ -2065,7 +2070,7 @@
           <a:p>
             <a:fld id="{A85E4C48-C885-47B0-A871-75BBED92D34D}" type="datetimeFigureOut">
               <a:rPr lang="en-US" smtClean="0"/>
-              <a:t>3/20/2024</a:t>
+              <a:t>3/21/2024</a:t>
             </a:fld>
             <a:endParaRPr lang="en-US"/>
           </a:p>
@@ -2376,7 +2381,7 @@
           <a:p>
             <a:fld id="{A85E4C48-C885-47B0-A871-75BBED92D34D}" type="datetimeFigureOut">
               <a:rPr lang="en-US" smtClean="0"/>
-              <a:t>3/20/2024</a:t>
+              <a:t>3/21/2024</a:t>
             </a:fld>
             <a:endParaRPr lang="en-US"/>
           </a:p>
@@ -2664,7 +2669,7 @@
           <a:p>
             <a:fld id="{A85E4C48-C885-47B0-A871-75BBED92D34D}" type="datetimeFigureOut">
               <a:rPr lang="en-US" smtClean="0"/>
-              <a:t>3/20/2024</a:t>
+              <a:t>3/21/2024</a:t>
             </a:fld>
             <a:endParaRPr lang="en-US"/>
           </a:p>
@@ -2905,7 +2910,7 @@
           <a:p>
             <a:fld id="{A85E4C48-C885-47B0-A871-75BBED92D34D}" type="datetimeFigureOut">
               <a:rPr lang="en-US" smtClean="0"/>
-              <a:t>3/20/2024</a:t>
+              <a:t>3/21/2024</a:t>
             </a:fld>
             <a:endParaRPr lang="en-US"/>
           </a:p>
@@ -3324,10 +3329,10 @@
       </p:grpSpPr>
       <p:grpSp>
         <p:nvGrpSpPr>
-          <p:cNvPr id="6" name="Group 5">
-            <a:extLst>
-              <a:ext uri="{FF2B5EF4-FFF2-40B4-BE49-F238E27FC236}">
-                <a16:creationId xmlns:a16="http://schemas.microsoft.com/office/drawing/2014/main" id="{BAA0B044-43A2-E64D-B92E-190FA74067C3}"/>
+          <p:cNvPr id="7" name="Group 6">
+            <a:extLst>
+              <a:ext uri="{FF2B5EF4-FFF2-40B4-BE49-F238E27FC236}">
+                <a16:creationId xmlns:a16="http://schemas.microsoft.com/office/drawing/2014/main" id="{A8D4AE21-C46B-1DD5-3212-CC032170DCEE}"/>
               </a:ext>
             </a:extLst>
           </p:cNvPr>
@@ -3342,66 +3347,12 @@
             <a:chExt cx="8289096" cy="4225290"/>
           </a:xfrm>
         </p:grpSpPr>
-        <p:sp>
-          <p:nvSpPr>
-            <p:cNvPr id="46" name="Rectangle 45">
+        <p:grpSp>
+          <p:nvGrpSpPr>
+            <p:cNvPr id="6" name="Group 5">
               <a:extLst>
                 <a:ext uri="{FF2B5EF4-FFF2-40B4-BE49-F238E27FC236}">
-                  <a16:creationId xmlns:a16="http://schemas.microsoft.com/office/drawing/2014/main" id="{4A6A7986-58DE-FD91-8650-0090C0676BC2}"/>
-                </a:ext>
-              </a:extLst>
-            </p:cNvPr>
-            <p:cNvSpPr/>
-            <p:nvPr/>
-          </p:nvSpPr>
-          <p:spPr>
-            <a:xfrm>
-              <a:off x="1167155" y="809625"/>
-              <a:ext cx="8289096" cy="4225290"/>
-            </a:xfrm>
-            <a:prstGeom prst="rect">
-              <a:avLst/>
-            </a:prstGeom>
-            <a:solidFill>
-              <a:schemeClr val="bg1"/>
-            </a:solidFill>
-            <a:ln>
-              <a:solidFill>
-                <a:schemeClr val="bg1"/>
-              </a:solidFill>
-            </a:ln>
-          </p:spPr>
-          <p:style>
-            <a:lnRef idx="2">
-              <a:schemeClr val="accent1">
-                <a:shade val="50000"/>
-              </a:schemeClr>
-            </a:lnRef>
-            <a:fillRef idx="1">
-              <a:schemeClr val="accent1"/>
-            </a:fillRef>
-            <a:effectRef idx="0">
-              <a:schemeClr val="accent1"/>
-            </a:effectRef>
-            <a:fontRef idx="minor">
-              <a:schemeClr val="lt1"/>
-            </a:fontRef>
-          </p:style>
-          <p:txBody>
-            <a:bodyPr rtlCol="0" anchor="ctr"/>
-            <a:lstStyle/>
-            <a:p>
-              <a:pPr algn="ctr"/>
-              <a:endParaRPr lang="en-US"/>
-            </a:p>
-          </p:txBody>
-        </p:sp>
-        <p:grpSp>
-          <p:nvGrpSpPr>
-            <p:cNvPr id="39" name="Group 38">
-              <a:extLst>
-                <a:ext uri="{FF2B5EF4-FFF2-40B4-BE49-F238E27FC236}">
-                  <a16:creationId xmlns:a16="http://schemas.microsoft.com/office/drawing/2014/main" id="{36A21939-B82E-EEE6-2EBD-9D3DB1FBE5A5}"/>
+                  <a16:creationId xmlns:a16="http://schemas.microsoft.com/office/drawing/2014/main" id="{BAA0B044-43A2-E64D-B92E-190FA74067C3}"/>
                 </a:ext>
               </a:extLst>
             </p:cNvPr>
@@ -3410,170 +3361,18 @@
           </p:nvGrpSpPr>
           <p:grpSpPr>
             <a:xfrm>
-              <a:off x="2066637" y="901065"/>
-              <a:ext cx="3723453" cy="4133850"/>
-              <a:chOff x="2066637" y="901065"/>
-              <a:chExt cx="3723453" cy="4133850"/>
+              <a:off x="1167155" y="809625"/>
+              <a:ext cx="8289096" cy="4225290"/>
+              <a:chOff x="1167155" y="809625"/>
+              <a:chExt cx="8289096" cy="4225290"/>
             </a:xfrm>
           </p:grpSpPr>
-          <p:pic>
-            <p:nvPicPr>
-              <p:cNvPr id="5" name="Picture 4" descr="A picture containing screenshot, diagram, design&#10;&#10;Description automatically generated">
+          <p:sp>
+            <p:nvSpPr>
+              <p:cNvPr id="46" name="Rectangle 45">
                 <a:extLst>
                   <a:ext uri="{FF2B5EF4-FFF2-40B4-BE49-F238E27FC236}">
-                    <a16:creationId xmlns:a16="http://schemas.microsoft.com/office/drawing/2014/main" id="{187B6EA4-FF9E-ECFA-C3BF-90E4F6EE03C0}"/>
-                  </a:ext>
-                </a:extLst>
-              </p:cNvPr>
-              <p:cNvPicPr>
-                <a:picLocks noChangeAspect="1"/>
-              </p:cNvPicPr>
-              <p:nvPr/>
-            </p:nvPicPr>
-            <p:blipFill rotWithShape="1">
-              <a:blip r:embed="rId2">
-                <a:extLst>
-                  <a:ext uri="{28A0092B-C50C-407E-A947-70E740481C1C}">
-                    <a14:useLocalDpi xmlns:a14="http://schemas.microsoft.com/office/drawing/2010/main" val="0"/>
-                  </a:ext>
-                </a:extLst>
-              </a:blip>
-              <a:srcRect l="49631" t="19982" b="13208"/>
-              <a:stretch/>
-            </p:blipFill>
-            <p:spPr>
-              <a:xfrm>
-                <a:off x="2164079" y="901065"/>
-                <a:ext cx="3626011" cy="4133850"/>
-              </a:xfrm>
-              <a:prstGeom prst="rect">
-                <a:avLst/>
-              </a:prstGeom>
-            </p:spPr>
-          </p:pic>
-          <p:grpSp>
-            <p:nvGrpSpPr>
-              <p:cNvPr id="11" name="Group 10">
-                <a:extLst>
-                  <a:ext uri="{FF2B5EF4-FFF2-40B4-BE49-F238E27FC236}">
-                    <a16:creationId xmlns:a16="http://schemas.microsoft.com/office/drawing/2014/main" id="{9BEF7A65-1146-0451-EC51-60869CD8DC36}"/>
-                  </a:ext>
-                </a:extLst>
-              </p:cNvPr>
-              <p:cNvGrpSpPr/>
-              <p:nvPr/>
-            </p:nvGrpSpPr>
-            <p:grpSpPr>
-              <a:xfrm>
-                <a:off x="2830900" y="1779659"/>
-                <a:ext cx="668299" cy="435841"/>
-                <a:chOff x="6130360" y="2351159"/>
-                <a:chExt cx="668299" cy="435841"/>
-              </a:xfrm>
-            </p:grpSpPr>
-            <p:sp>
-              <p:nvSpPr>
-                <p:cNvPr id="12" name="Thought Bubble: Cloud 11">
-                  <a:extLst>
-                    <a:ext uri="{FF2B5EF4-FFF2-40B4-BE49-F238E27FC236}">
-                      <a16:creationId xmlns:a16="http://schemas.microsoft.com/office/drawing/2014/main" id="{7467E158-A95D-6CB6-C1BB-C23B52F7AE96}"/>
-                    </a:ext>
-                  </a:extLst>
-                </p:cNvPr>
-                <p:cNvSpPr/>
-                <p:nvPr/>
-              </p:nvSpPr>
-              <p:spPr>
-                <a:xfrm>
-                  <a:off x="6130360" y="2351159"/>
-                  <a:ext cx="668299" cy="435841"/>
-                </a:xfrm>
-                <a:prstGeom prst="cloudCallout">
-                  <a:avLst>
-                    <a:gd name="adj1" fmla="val -33386"/>
-                    <a:gd name="adj2" fmla="val 91372"/>
-                  </a:avLst>
-                </a:prstGeom>
-                <a:solidFill>
-                  <a:schemeClr val="bg1"/>
-                </a:solidFill>
-                <a:ln w="19050">
-                  <a:solidFill>
-                    <a:schemeClr val="tx1"/>
-                  </a:solidFill>
-                </a:ln>
-              </p:spPr>
-              <p:style>
-                <a:lnRef idx="2">
-                  <a:schemeClr val="accent1">
-                    <a:shade val="50000"/>
-                  </a:schemeClr>
-                </a:lnRef>
-                <a:fillRef idx="1">
-                  <a:schemeClr val="accent1"/>
-                </a:fillRef>
-                <a:effectRef idx="0">
-                  <a:schemeClr val="accent1"/>
-                </a:effectRef>
-                <a:fontRef idx="minor">
-                  <a:schemeClr val="lt1"/>
-                </a:fontRef>
-              </p:style>
-              <p:txBody>
-                <a:bodyPr rtlCol="0" anchor="ctr"/>
-                <a:lstStyle/>
-                <a:p>
-                  <a:pPr algn="ctr"/>
-                  <a:endParaRPr lang="en-US"/>
-                </a:p>
-              </p:txBody>
-            </p:sp>
-            <p:pic>
-              <p:nvPicPr>
-                <p:cNvPr id="13" name="Graphic 12" descr="Question Mark with solid fill">
-                  <a:extLst>
-                    <a:ext uri="{FF2B5EF4-FFF2-40B4-BE49-F238E27FC236}">
-                      <a16:creationId xmlns:a16="http://schemas.microsoft.com/office/drawing/2014/main" id="{41593EDC-3972-9BE1-CD99-953ACB57EB41}"/>
-                    </a:ext>
-                  </a:extLst>
-                </p:cNvPr>
-                <p:cNvPicPr>
-                  <a:picLocks noChangeAspect="1"/>
-                </p:cNvPicPr>
-                <p:nvPr/>
-              </p:nvPicPr>
-              <p:blipFill>
-                <a:blip r:embed="rId3">
-                  <a:extLst>
-                    <a:ext uri="{28A0092B-C50C-407E-A947-70E740481C1C}">
-                      <a14:useLocalDpi xmlns:a14="http://schemas.microsoft.com/office/drawing/2010/main" val="0"/>
-                    </a:ext>
-                    <a:ext uri="{96DAC541-7B7A-43D3-8B79-37D633B846F1}">
-                      <asvg:svgBlip xmlns:asvg="http://schemas.microsoft.com/office/drawing/2016/SVG/main" r:embed="rId4"/>
-                    </a:ext>
-                  </a:extLst>
-                </a:blip>
-                <a:stretch>
-                  <a:fillRect/>
-                </a:stretch>
-              </p:blipFill>
-              <p:spPr>
-                <a:xfrm>
-                  <a:off x="6301852" y="2428600"/>
-                  <a:ext cx="280957" cy="280957"/>
-                </a:xfrm>
-                <a:prstGeom prst="rect">
-                  <a:avLst/>
-                </a:prstGeom>
-              </p:spPr>
-            </p:pic>
-          </p:grpSp>
-          <p:sp>
-            <p:nvSpPr>
-              <p:cNvPr id="30" name="Oval 29">
-                <a:extLst>
-                  <a:ext uri="{FF2B5EF4-FFF2-40B4-BE49-F238E27FC236}">
-                    <a16:creationId xmlns:a16="http://schemas.microsoft.com/office/drawing/2014/main" id="{7E48300C-19C7-114F-EE3D-19FFF84D9BA1}"/>
+                    <a16:creationId xmlns:a16="http://schemas.microsoft.com/office/drawing/2014/main" id="{4A6A7986-58DE-FD91-8650-0090C0676BC2}"/>
                   </a:ext>
                 </a:extLst>
               </p:cNvPr>
@@ -3582,116 +3381,8 @@
             </p:nvSpPr>
             <p:spPr>
               <a:xfrm>
-                <a:off x="2115358" y="1234440"/>
-                <a:ext cx="277254" cy="310529"/>
-              </a:xfrm>
-              <a:prstGeom prst="ellipse">
-                <a:avLst/>
-              </a:prstGeom>
-              <a:solidFill>
-                <a:schemeClr val="bg1"/>
-              </a:solidFill>
-              <a:ln>
-                <a:solidFill>
-                  <a:schemeClr val="bg1"/>
-                </a:solidFill>
-              </a:ln>
-            </p:spPr>
-            <p:style>
-              <a:lnRef idx="2">
-                <a:schemeClr val="accent1">
-                  <a:shade val="50000"/>
-                </a:schemeClr>
-              </a:lnRef>
-              <a:fillRef idx="1">
-                <a:schemeClr val="accent1"/>
-              </a:fillRef>
-              <a:effectRef idx="0">
-                <a:schemeClr val="accent1"/>
-              </a:effectRef>
-              <a:fontRef idx="minor">
-                <a:schemeClr val="lt1"/>
-              </a:fontRef>
-            </p:style>
-            <p:txBody>
-              <a:bodyPr rtlCol="0" anchor="ctr"/>
-              <a:lstStyle/>
-              <a:p>
-                <a:pPr algn="ctr"/>
-                <a:endParaRPr lang="en-US"/>
-              </a:p>
-            </p:txBody>
-          </p:sp>
-          <p:sp>
-            <p:nvSpPr>
-              <p:cNvPr id="31" name="Oval 30">
-                <a:extLst>
-                  <a:ext uri="{FF2B5EF4-FFF2-40B4-BE49-F238E27FC236}">
-                    <a16:creationId xmlns:a16="http://schemas.microsoft.com/office/drawing/2014/main" id="{E27B1DA4-7012-DC3A-9787-7D16B40214A2}"/>
-                  </a:ext>
-                </a:extLst>
-              </p:cNvPr>
-              <p:cNvSpPr/>
-              <p:nvPr/>
-            </p:nvSpPr>
-            <p:spPr>
-              <a:xfrm>
-                <a:off x="2066637" y="4040439"/>
-                <a:ext cx="277254" cy="310529"/>
-              </a:xfrm>
-              <a:prstGeom prst="ellipse">
-                <a:avLst/>
-              </a:prstGeom>
-              <a:solidFill>
-                <a:schemeClr val="bg1"/>
-              </a:solidFill>
-              <a:ln>
-                <a:solidFill>
-                  <a:schemeClr val="bg1"/>
-                </a:solidFill>
-              </a:ln>
-            </p:spPr>
-            <p:style>
-              <a:lnRef idx="2">
-                <a:schemeClr val="accent1">
-                  <a:shade val="50000"/>
-                </a:schemeClr>
-              </a:lnRef>
-              <a:fillRef idx="1">
-                <a:schemeClr val="accent1"/>
-              </a:fillRef>
-              <a:effectRef idx="0">
-                <a:schemeClr val="accent1"/>
-              </a:effectRef>
-              <a:fontRef idx="minor">
-                <a:schemeClr val="lt1"/>
-              </a:fontRef>
-            </p:style>
-            <p:txBody>
-              <a:bodyPr rtlCol="0" anchor="ctr"/>
-              <a:lstStyle/>
-              <a:p>
-                <a:pPr algn="ctr"/>
-                <a:endParaRPr lang="en-US"/>
-              </a:p>
-            </p:txBody>
-          </p:sp>
-          <p:sp>
-            <p:nvSpPr>
-              <p:cNvPr id="32" name="Rectangle 31">
-                <a:extLst>
-                  <a:ext uri="{FF2B5EF4-FFF2-40B4-BE49-F238E27FC236}">
-                    <a16:creationId xmlns:a16="http://schemas.microsoft.com/office/drawing/2014/main" id="{3B75EB1B-A72A-8DC4-3334-9BC2FDD16D4D}"/>
-                  </a:ext>
-                </a:extLst>
-              </p:cNvPr>
-              <p:cNvSpPr/>
-              <p:nvPr/>
-            </p:nvSpPr>
-            <p:spPr>
-              <a:xfrm>
-                <a:off x="2132278" y="1691640"/>
-                <a:ext cx="45719" cy="2202180"/>
+                <a:off x="1167155" y="809625"/>
+                <a:ext cx="8289096" cy="4225290"/>
               </a:xfrm>
               <a:prstGeom prst="rect">
                 <a:avLst/>
@@ -3730,87 +3421,745 @@
               </a:p>
             </p:txBody>
           </p:sp>
-          <p:sp>
-            <p:nvSpPr>
-              <p:cNvPr id="35" name="Oval 34">
+          <p:grpSp>
+            <p:nvGrpSpPr>
+              <p:cNvPr id="39" name="Group 38">
                 <a:extLst>
                   <a:ext uri="{FF2B5EF4-FFF2-40B4-BE49-F238E27FC236}">
-                    <a16:creationId xmlns:a16="http://schemas.microsoft.com/office/drawing/2014/main" id="{10BE3989-0569-356F-5AA1-3F79053DD2D0}"/>
+                    <a16:creationId xmlns:a16="http://schemas.microsoft.com/office/drawing/2014/main" id="{36A21939-B82E-EEE6-2EBD-9D3DB1FBE5A5}"/>
                   </a:ext>
                 </a:extLst>
               </p:cNvPr>
-              <p:cNvSpPr/>
+              <p:cNvGrpSpPr/>
+              <p:nvPr/>
+            </p:nvGrpSpPr>
+            <p:grpSpPr>
+              <a:xfrm>
+                <a:off x="2066637" y="901065"/>
+                <a:ext cx="3723453" cy="4133850"/>
+                <a:chOff x="2066637" y="901065"/>
+                <a:chExt cx="3723453" cy="4133850"/>
+              </a:xfrm>
+            </p:grpSpPr>
+            <p:pic>
+              <p:nvPicPr>
+                <p:cNvPr id="5" name="Picture 4" descr="A picture containing screenshot, diagram, design&#10;&#10;Description automatically generated">
+                  <a:extLst>
+                    <a:ext uri="{FF2B5EF4-FFF2-40B4-BE49-F238E27FC236}">
+                      <a16:creationId xmlns:a16="http://schemas.microsoft.com/office/drawing/2014/main" id="{187B6EA4-FF9E-ECFA-C3BF-90E4F6EE03C0}"/>
+                    </a:ext>
+                  </a:extLst>
+                </p:cNvPr>
+                <p:cNvPicPr>
+                  <a:picLocks noChangeAspect="1"/>
+                </p:cNvPicPr>
+                <p:nvPr/>
+              </p:nvPicPr>
+              <p:blipFill rotWithShape="1">
+                <a:blip r:embed="rId2">
+                  <a:extLst>
+                    <a:ext uri="{28A0092B-C50C-407E-A947-70E740481C1C}">
+                      <a14:useLocalDpi xmlns:a14="http://schemas.microsoft.com/office/drawing/2010/main" val="0"/>
+                    </a:ext>
+                  </a:extLst>
+                </a:blip>
+                <a:srcRect l="49631" t="19982" b="13208"/>
+                <a:stretch/>
+              </p:blipFill>
+              <p:spPr>
+                <a:xfrm>
+                  <a:off x="2164079" y="901065"/>
+                  <a:ext cx="3626011" cy="4133850"/>
+                </a:xfrm>
+                <a:prstGeom prst="rect">
+                  <a:avLst/>
+                </a:prstGeom>
+              </p:spPr>
+            </p:pic>
+            <p:grpSp>
+              <p:nvGrpSpPr>
+                <p:cNvPr id="11" name="Group 10">
+                  <a:extLst>
+                    <a:ext uri="{FF2B5EF4-FFF2-40B4-BE49-F238E27FC236}">
+                      <a16:creationId xmlns:a16="http://schemas.microsoft.com/office/drawing/2014/main" id="{9BEF7A65-1146-0451-EC51-60869CD8DC36}"/>
+                    </a:ext>
+                  </a:extLst>
+                </p:cNvPr>
+                <p:cNvGrpSpPr/>
+                <p:nvPr/>
+              </p:nvGrpSpPr>
+              <p:grpSpPr>
+                <a:xfrm>
+                  <a:off x="2830900" y="1779659"/>
+                  <a:ext cx="668299" cy="435841"/>
+                  <a:chOff x="6130360" y="2351159"/>
+                  <a:chExt cx="668299" cy="435841"/>
+                </a:xfrm>
+              </p:grpSpPr>
+              <p:sp>
+                <p:nvSpPr>
+                  <p:cNvPr id="12" name="Thought Bubble: Cloud 11">
+                    <a:extLst>
+                      <a:ext uri="{FF2B5EF4-FFF2-40B4-BE49-F238E27FC236}">
+                        <a16:creationId xmlns:a16="http://schemas.microsoft.com/office/drawing/2014/main" id="{7467E158-A95D-6CB6-C1BB-C23B52F7AE96}"/>
+                      </a:ext>
+                    </a:extLst>
+                  </p:cNvPr>
+                  <p:cNvSpPr/>
+                  <p:nvPr/>
+                </p:nvSpPr>
+                <p:spPr>
+                  <a:xfrm>
+                    <a:off x="6130360" y="2351159"/>
+                    <a:ext cx="668299" cy="435841"/>
+                  </a:xfrm>
+                  <a:prstGeom prst="cloudCallout">
+                    <a:avLst>
+                      <a:gd name="adj1" fmla="val -33386"/>
+                      <a:gd name="adj2" fmla="val 91372"/>
+                    </a:avLst>
+                  </a:prstGeom>
+                  <a:solidFill>
+                    <a:schemeClr val="bg1"/>
+                  </a:solidFill>
+                  <a:ln w="19050">
+                    <a:solidFill>
+                      <a:schemeClr val="tx1"/>
+                    </a:solidFill>
+                  </a:ln>
+                </p:spPr>
+                <p:style>
+                  <a:lnRef idx="2">
+                    <a:schemeClr val="accent1">
+                      <a:shade val="50000"/>
+                    </a:schemeClr>
+                  </a:lnRef>
+                  <a:fillRef idx="1">
+                    <a:schemeClr val="accent1"/>
+                  </a:fillRef>
+                  <a:effectRef idx="0">
+                    <a:schemeClr val="accent1"/>
+                  </a:effectRef>
+                  <a:fontRef idx="minor">
+                    <a:schemeClr val="lt1"/>
+                  </a:fontRef>
+                </p:style>
+                <p:txBody>
+                  <a:bodyPr rtlCol="0" anchor="ctr"/>
+                  <a:lstStyle/>
+                  <a:p>
+                    <a:pPr algn="ctr"/>
+                    <a:endParaRPr lang="en-US" dirty="0"/>
+                  </a:p>
+                </p:txBody>
+              </p:sp>
+              <p:pic>
+                <p:nvPicPr>
+                  <p:cNvPr id="13" name="Graphic 12" descr="Question Mark with solid fill">
+                    <a:extLst>
+                      <a:ext uri="{FF2B5EF4-FFF2-40B4-BE49-F238E27FC236}">
+                        <a16:creationId xmlns:a16="http://schemas.microsoft.com/office/drawing/2014/main" id="{41593EDC-3972-9BE1-CD99-953ACB57EB41}"/>
+                      </a:ext>
+                    </a:extLst>
+                  </p:cNvPr>
+                  <p:cNvPicPr>
+                    <a:picLocks noChangeAspect="1"/>
+                  </p:cNvPicPr>
+                  <p:nvPr/>
+                </p:nvPicPr>
+                <p:blipFill>
+                  <a:blip r:embed="rId3">
+                    <a:extLst>
+                      <a:ext uri="{28A0092B-C50C-407E-A947-70E740481C1C}">
+                        <a14:useLocalDpi xmlns:a14="http://schemas.microsoft.com/office/drawing/2010/main" val="0"/>
+                      </a:ext>
+                      <a:ext uri="{96DAC541-7B7A-43D3-8B79-37D633B846F1}">
+                        <asvg:svgBlip xmlns:asvg="http://schemas.microsoft.com/office/drawing/2016/SVG/main" r:embed="rId4"/>
+                      </a:ext>
+                    </a:extLst>
+                  </a:blip>
+                  <a:stretch>
+                    <a:fillRect/>
+                  </a:stretch>
+                </p:blipFill>
+                <p:spPr>
+                  <a:xfrm>
+                    <a:off x="6301852" y="2428600"/>
+                    <a:ext cx="280957" cy="280957"/>
+                  </a:xfrm>
+                  <a:prstGeom prst="rect">
+                    <a:avLst/>
+                  </a:prstGeom>
+                </p:spPr>
+              </p:pic>
+            </p:grpSp>
+            <p:sp>
+              <p:nvSpPr>
+                <p:cNvPr id="30" name="Oval 29">
+                  <a:extLst>
+                    <a:ext uri="{FF2B5EF4-FFF2-40B4-BE49-F238E27FC236}">
+                      <a16:creationId xmlns:a16="http://schemas.microsoft.com/office/drawing/2014/main" id="{7E48300C-19C7-114F-EE3D-19FFF84D9BA1}"/>
+                    </a:ext>
+                  </a:extLst>
+                </p:cNvPr>
+                <p:cNvSpPr/>
+                <p:nvPr/>
+              </p:nvSpPr>
+              <p:spPr>
+                <a:xfrm>
+                  <a:off x="2115358" y="1234440"/>
+                  <a:ext cx="277254" cy="310529"/>
+                </a:xfrm>
+                <a:prstGeom prst="ellipse">
+                  <a:avLst/>
+                </a:prstGeom>
+                <a:solidFill>
+                  <a:schemeClr val="bg1"/>
+                </a:solidFill>
+                <a:ln>
+                  <a:solidFill>
+                    <a:schemeClr val="bg1"/>
+                  </a:solidFill>
+                </a:ln>
+              </p:spPr>
+              <p:style>
+                <a:lnRef idx="2">
+                  <a:schemeClr val="accent1">
+                    <a:shade val="50000"/>
+                  </a:schemeClr>
+                </a:lnRef>
+                <a:fillRef idx="1">
+                  <a:schemeClr val="accent1"/>
+                </a:fillRef>
+                <a:effectRef idx="0">
+                  <a:schemeClr val="accent1"/>
+                </a:effectRef>
+                <a:fontRef idx="minor">
+                  <a:schemeClr val="lt1"/>
+                </a:fontRef>
+              </p:style>
+              <p:txBody>
+                <a:bodyPr rtlCol="0" anchor="ctr"/>
+                <a:lstStyle/>
+                <a:p>
+                  <a:pPr algn="ctr"/>
+                  <a:endParaRPr lang="en-US"/>
+                </a:p>
+              </p:txBody>
+            </p:sp>
+            <p:sp>
+              <p:nvSpPr>
+                <p:cNvPr id="31" name="Oval 30">
+                  <a:extLst>
+                    <a:ext uri="{FF2B5EF4-FFF2-40B4-BE49-F238E27FC236}">
+                      <a16:creationId xmlns:a16="http://schemas.microsoft.com/office/drawing/2014/main" id="{E27B1DA4-7012-DC3A-9787-7D16B40214A2}"/>
+                    </a:ext>
+                  </a:extLst>
+                </p:cNvPr>
+                <p:cNvSpPr/>
+                <p:nvPr/>
+              </p:nvSpPr>
+              <p:spPr>
+                <a:xfrm>
+                  <a:off x="2066637" y="4040439"/>
+                  <a:ext cx="277254" cy="310529"/>
+                </a:xfrm>
+                <a:prstGeom prst="ellipse">
+                  <a:avLst/>
+                </a:prstGeom>
+                <a:solidFill>
+                  <a:schemeClr val="bg1"/>
+                </a:solidFill>
+                <a:ln>
+                  <a:solidFill>
+                    <a:schemeClr val="bg1"/>
+                  </a:solidFill>
+                </a:ln>
+              </p:spPr>
+              <p:style>
+                <a:lnRef idx="2">
+                  <a:schemeClr val="accent1">
+                    <a:shade val="50000"/>
+                  </a:schemeClr>
+                </a:lnRef>
+                <a:fillRef idx="1">
+                  <a:schemeClr val="accent1"/>
+                </a:fillRef>
+                <a:effectRef idx="0">
+                  <a:schemeClr val="accent1"/>
+                </a:effectRef>
+                <a:fontRef idx="minor">
+                  <a:schemeClr val="lt1"/>
+                </a:fontRef>
+              </p:style>
+              <p:txBody>
+                <a:bodyPr rtlCol="0" anchor="ctr"/>
+                <a:lstStyle/>
+                <a:p>
+                  <a:pPr algn="ctr"/>
+                  <a:endParaRPr lang="en-US"/>
+                </a:p>
+              </p:txBody>
+            </p:sp>
+            <p:sp>
+              <p:nvSpPr>
+                <p:cNvPr id="32" name="Rectangle 31">
+                  <a:extLst>
+                    <a:ext uri="{FF2B5EF4-FFF2-40B4-BE49-F238E27FC236}">
+                      <a16:creationId xmlns:a16="http://schemas.microsoft.com/office/drawing/2014/main" id="{3B75EB1B-A72A-8DC4-3334-9BC2FDD16D4D}"/>
+                    </a:ext>
+                  </a:extLst>
+                </p:cNvPr>
+                <p:cNvSpPr/>
+                <p:nvPr/>
+              </p:nvSpPr>
+              <p:spPr>
+                <a:xfrm>
+                  <a:off x="2132278" y="1691640"/>
+                  <a:ext cx="45719" cy="2202180"/>
+                </a:xfrm>
+                <a:prstGeom prst="rect">
+                  <a:avLst/>
+                </a:prstGeom>
+                <a:solidFill>
+                  <a:schemeClr val="bg1"/>
+                </a:solidFill>
+                <a:ln>
+                  <a:solidFill>
+                    <a:schemeClr val="bg1"/>
+                  </a:solidFill>
+                </a:ln>
+              </p:spPr>
+              <p:style>
+                <a:lnRef idx="2">
+                  <a:schemeClr val="accent1">
+                    <a:shade val="50000"/>
+                  </a:schemeClr>
+                </a:lnRef>
+                <a:fillRef idx="1">
+                  <a:schemeClr val="accent1"/>
+                </a:fillRef>
+                <a:effectRef idx="0">
+                  <a:schemeClr val="accent1"/>
+                </a:effectRef>
+                <a:fontRef idx="minor">
+                  <a:schemeClr val="lt1"/>
+                </a:fontRef>
+              </p:style>
+              <p:txBody>
+                <a:bodyPr rtlCol="0" anchor="ctr"/>
+                <a:lstStyle/>
+                <a:p>
+                  <a:pPr algn="ctr"/>
+                  <a:endParaRPr lang="en-US"/>
+                </a:p>
+              </p:txBody>
+            </p:sp>
+            <p:sp>
+              <p:nvSpPr>
+                <p:cNvPr id="35" name="Oval 34">
+                  <a:extLst>
+                    <a:ext uri="{FF2B5EF4-FFF2-40B4-BE49-F238E27FC236}">
+                      <a16:creationId xmlns:a16="http://schemas.microsoft.com/office/drawing/2014/main" id="{10BE3989-0569-356F-5AA1-3F79053DD2D0}"/>
+                    </a:ext>
+                  </a:extLst>
+                </p:cNvPr>
+                <p:cNvSpPr/>
+                <p:nvPr/>
+              </p:nvSpPr>
+              <p:spPr>
+                <a:xfrm>
+                  <a:off x="2267761" y="1756540"/>
+                  <a:ext cx="335534" cy="361063"/>
+                </a:xfrm>
+                <a:prstGeom prst="ellipse">
+                  <a:avLst/>
+                </a:prstGeom>
+                <a:solidFill>
+                  <a:schemeClr val="bg1"/>
+                </a:solidFill>
+                <a:ln>
+                  <a:solidFill>
+                    <a:schemeClr val="bg1"/>
+                  </a:solidFill>
+                </a:ln>
+              </p:spPr>
+              <p:style>
+                <a:lnRef idx="2">
+                  <a:schemeClr val="accent1">
+                    <a:shade val="50000"/>
+                  </a:schemeClr>
+                </a:lnRef>
+                <a:fillRef idx="1">
+                  <a:schemeClr val="accent1"/>
+                </a:fillRef>
+                <a:effectRef idx="0">
+                  <a:schemeClr val="accent1"/>
+                </a:effectRef>
+                <a:fontRef idx="minor">
+                  <a:schemeClr val="lt1"/>
+                </a:fontRef>
+              </p:style>
+              <p:txBody>
+                <a:bodyPr rtlCol="0" anchor="ctr"/>
+                <a:lstStyle/>
+                <a:p>
+                  <a:pPr algn="ctr"/>
+                  <a:endParaRPr lang="en-US"/>
+                </a:p>
+              </p:txBody>
+            </p:sp>
+          </p:grpSp>
+          <p:grpSp>
+            <p:nvGrpSpPr>
+              <p:cNvPr id="38" name="Group 37">
+                <a:extLst>
+                  <a:ext uri="{FF2B5EF4-FFF2-40B4-BE49-F238E27FC236}">
+                    <a16:creationId xmlns:a16="http://schemas.microsoft.com/office/drawing/2014/main" id="{5D6B29A0-BDC1-918A-2EA4-9AD334EA0320}"/>
+                  </a:ext>
+                </a:extLst>
+              </p:cNvPr>
+              <p:cNvGrpSpPr/>
+              <p:nvPr/>
+            </p:nvGrpSpPr>
+            <p:grpSpPr>
+              <a:xfrm>
+                <a:off x="6242539" y="1421240"/>
+                <a:ext cx="3151135" cy="2960488"/>
+                <a:chOff x="6233014" y="1421240"/>
+                <a:chExt cx="3151135" cy="2960488"/>
+              </a:xfrm>
+            </p:grpSpPr>
+            <p:pic>
+              <p:nvPicPr>
+                <p:cNvPr id="34" name="Picture 33" descr="A picture containing screenshot, diagram, design&#10;&#10;Description automatically generated">
+                  <a:extLst>
+                    <a:ext uri="{FF2B5EF4-FFF2-40B4-BE49-F238E27FC236}">
+                      <a16:creationId xmlns:a16="http://schemas.microsoft.com/office/drawing/2014/main" id="{3972D254-2E17-4204-2495-CE05733662FD}"/>
+                    </a:ext>
+                  </a:extLst>
+                </p:cNvPr>
+                <p:cNvPicPr>
+                  <a:picLocks noChangeAspect="1"/>
+                </p:cNvPicPr>
+                <p:nvPr/>
+              </p:nvPicPr>
+              <p:blipFill rotWithShape="1">
+                <a:blip r:embed="rId2">
+                  <a:extLst>
+                    <a:ext uri="{28A0092B-C50C-407E-A947-70E740481C1C}">
+                      <a14:useLocalDpi xmlns:a14="http://schemas.microsoft.com/office/drawing/2010/main" val="0"/>
+                    </a:ext>
+                  </a:extLst>
+                </a:blip>
+                <a:srcRect t="52197" r="58786"/>
+                <a:stretch/>
+              </p:blipFill>
+              <p:spPr>
+                <a:xfrm>
+                  <a:off x="6417163" y="1421240"/>
+                  <a:ext cx="2966986" cy="2957801"/>
+                </a:xfrm>
+                <a:prstGeom prst="rect">
+                  <a:avLst/>
+                </a:prstGeom>
+              </p:spPr>
+            </p:pic>
+            <p:pic>
+              <p:nvPicPr>
+                <p:cNvPr id="36" name="Picture 35" descr="A picture containing screenshot, diagram, design&#10;&#10;Description automatically generated">
+                  <a:extLst>
+                    <a:ext uri="{FF2B5EF4-FFF2-40B4-BE49-F238E27FC236}">
+                      <a16:creationId xmlns:a16="http://schemas.microsoft.com/office/drawing/2014/main" id="{6F586AEA-CC53-8498-5891-1D4BA5DED2E5}"/>
+                    </a:ext>
+                  </a:extLst>
+                </p:cNvPr>
+                <p:cNvPicPr>
+                  <a:picLocks noChangeAspect="1"/>
+                </p:cNvPicPr>
+                <p:nvPr/>
+              </p:nvPicPr>
+              <p:blipFill rotWithShape="1">
+                <a:blip r:embed="rId2">
+                  <a:extLst>
+                    <a:ext uri="{28A0092B-C50C-407E-A947-70E740481C1C}">
+                      <a14:useLocalDpi xmlns:a14="http://schemas.microsoft.com/office/drawing/2010/main" val="0"/>
+                    </a:ext>
+                  </a:extLst>
+                </a:blip>
+                <a:srcRect l="8770" t="90881" r="83539"/>
+                <a:stretch/>
+              </p:blipFill>
+              <p:spPr>
+                <a:xfrm>
+                  <a:off x="6452672" y="3814816"/>
+                  <a:ext cx="553673" cy="564225"/>
+                </a:xfrm>
+                <a:prstGeom prst="rect">
+                  <a:avLst/>
+                </a:prstGeom>
+              </p:spPr>
+            </p:pic>
+            <p:sp>
+              <p:nvSpPr>
+                <p:cNvPr id="37" name="Rectangle 36">
+                  <a:extLst>
+                    <a:ext uri="{FF2B5EF4-FFF2-40B4-BE49-F238E27FC236}">
+                      <a16:creationId xmlns:a16="http://schemas.microsoft.com/office/drawing/2014/main" id="{B5D94C0B-0B05-3A6C-91CC-95FDE86CEC77}"/>
+                    </a:ext>
+                  </a:extLst>
+                </p:cNvPr>
+                <p:cNvSpPr/>
+                <p:nvPr/>
+              </p:nvSpPr>
+              <p:spPr>
+                <a:xfrm>
+                  <a:off x="6233014" y="2179548"/>
+                  <a:ext cx="234898" cy="2202180"/>
+                </a:xfrm>
+                <a:prstGeom prst="rect">
+                  <a:avLst/>
+                </a:prstGeom>
+                <a:solidFill>
+                  <a:schemeClr val="bg1"/>
+                </a:solidFill>
+                <a:ln>
+                  <a:solidFill>
+                    <a:schemeClr val="bg1"/>
+                  </a:solidFill>
+                </a:ln>
+              </p:spPr>
+              <p:style>
+                <a:lnRef idx="2">
+                  <a:schemeClr val="accent1">
+                    <a:shade val="50000"/>
+                  </a:schemeClr>
+                </a:lnRef>
+                <a:fillRef idx="1">
+                  <a:schemeClr val="accent1"/>
+                </a:fillRef>
+                <a:effectRef idx="0">
+                  <a:schemeClr val="accent1"/>
+                </a:effectRef>
+                <a:fontRef idx="minor">
+                  <a:schemeClr val="lt1"/>
+                </a:fontRef>
+              </p:style>
+              <p:txBody>
+                <a:bodyPr rtlCol="0" anchor="ctr"/>
+                <a:lstStyle/>
+                <a:p>
+                  <a:pPr algn="ctr"/>
+                  <a:endParaRPr lang="en-US"/>
+                </a:p>
+              </p:txBody>
+            </p:sp>
+          </p:grpSp>
+          <p:cxnSp>
+            <p:nvCxnSpPr>
+              <p:cNvPr id="41" name="Straight Arrow Connector 40">
+                <a:extLst>
+                  <a:ext uri="{FF2B5EF4-FFF2-40B4-BE49-F238E27FC236}">
+                    <a16:creationId xmlns:a16="http://schemas.microsoft.com/office/drawing/2014/main" id="{C1A76C46-9480-F085-4FFF-611D2669624F}"/>
+                  </a:ext>
+                </a:extLst>
+              </p:cNvPr>
+              <p:cNvCxnSpPr>
+                <a:stCxn id="5" idx="3"/>
+              </p:cNvCxnSpPr>
+              <p:nvPr/>
+            </p:nvCxnSpPr>
+            <p:spPr>
+              <a:xfrm>
+                <a:off x="5790090" y="2967990"/>
+                <a:ext cx="579423" cy="8024"/>
+              </a:xfrm>
+              <a:prstGeom prst="straightConnector1">
+                <a:avLst/>
+              </a:prstGeom>
+              <a:ln w="57150">
+                <a:tailEnd type="triangle"/>
+              </a:ln>
+            </p:spPr>
+            <p:style>
+              <a:lnRef idx="1">
+                <a:schemeClr val="dk1"/>
+              </a:lnRef>
+              <a:fillRef idx="0">
+                <a:schemeClr val="dk1"/>
+              </a:fillRef>
+              <a:effectRef idx="0">
+                <a:schemeClr val="dk1"/>
+              </a:effectRef>
+              <a:fontRef idx="minor">
+                <a:schemeClr val="tx1"/>
+              </a:fontRef>
+            </p:style>
+          </p:cxnSp>
+          <p:sp>
+            <p:nvSpPr>
+              <p:cNvPr id="42" name="TextBox 41">
+                <a:extLst>
+                  <a:ext uri="{FF2B5EF4-FFF2-40B4-BE49-F238E27FC236}">
+                    <a16:creationId xmlns:a16="http://schemas.microsoft.com/office/drawing/2014/main" id="{C594CD6D-3D90-391F-AF52-7FCF07BD7E69}"/>
+                  </a:ext>
+                </a:extLst>
+              </p:cNvPr>
+              <p:cNvSpPr txBox="1"/>
               <p:nvPr/>
             </p:nvSpPr>
             <p:spPr>
               <a:xfrm>
-                <a:off x="2267761" y="1756540"/>
-                <a:ext cx="335534" cy="361063"/>
+                <a:off x="2179957" y="1703272"/>
+                <a:ext cx="466794" cy="369332"/>
               </a:xfrm>
-              <a:prstGeom prst="ellipse">
+              <a:prstGeom prst="rect">
                 <a:avLst/>
               </a:prstGeom>
-              <a:solidFill>
-                <a:schemeClr val="bg1"/>
-              </a:solidFill>
-              <a:ln>
-                <a:solidFill>
-                  <a:schemeClr val="bg1"/>
-                </a:solidFill>
-              </a:ln>
+              <a:noFill/>
             </p:spPr>
-            <p:style>
-              <a:lnRef idx="2">
-                <a:schemeClr val="accent1">
-                  <a:shade val="50000"/>
-                </a:schemeClr>
-              </a:lnRef>
-              <a:fillRef idx="1">
-                <a:schemeClr val="accent1"/>
-              </a:fillRef>
-              <a:effectRef idx="0">
-                <a:schemeClr val="accent1"/>
-              </a:effectRef>
-              <a:fontRef idx="minor">
-                <a:schemeClr val="lt1"/>
-              </a:fontRef>
-            </p:style>
             <p:txBody>
-              <a:bodyPr rtlCol="0" anchor="ctr"/>
+              <a:bodyPr wrap="none" rtlCol="0">
+                <a:spAutoFit/>
+              </a:bodyPr>
               <a:lstStyle/>
               <a:p>
-                <a:pPr algn="ctr"/>
-                <a:endParaRPr lang="en-US"/>
+                <a:r>
+                  <a:rPr lang="en-US" dirty="0">
+                    <a:latin typeface="Arial" panose="020B0604020202020204" pitchFamily="34" charset="0"/>
+                    <a:cs typeface="Arial" panose="020B0604020202020204" pitchFamily="34" charset="0"/>
+                  </a:rPr>
+                  <a:t>(a)</a:t>
+                </a:r>
               </a:p>
             </p:txBody>
           </p:sp>
-        </p:grpSp>
-        <p:grpSp>
-          <p:nvGrpSpPr>
-            <p:cNvPr id="38" name="Group 37">
-              <a:extLst>
-                <a:ext uri="{FF2B5EF4-FFF2-40B4-BE49-F238E27FC236}">
-                  <a16:creationId xmlns:a16="http://schemas.microsoft.com/office/drawing/2014/main" id="{5D6B29A0-BDC1-918A-2EA4-9AD334EA0320}"/>
-                </a:ext>
-              </a:extLst>
-            </p:cNvPr>
-            <p:cNvGrpSpPr/>
-            <p:nvPr/>
-          </p:nvGrpSpPr>
-          <p:grpSpPr>
-            <a:xfrm>
-              <a:off x="6242539" y="1421240"/>
-              <a:ext cx="3151135" cy="2960488"/>
-              <a:chOff x="6233014" y="1421240"/>
-              <a:chExt cx="3151135" cy="2960488"/>
-            </a:xfrm>
-          </p:grpSpPr>
+          <p:sp>
+            <p:nvSpPr>
+              <p:cNvPr id="43" name="TextBox 42">
+                <a:extLst>
+                  <a:ext uri="{FF2B5EF4-FFF2-40B4-BE49-F238E27FC236}">
+                    <a16:creationId xmlns:a16="http://schemas.microsoft.com/office/drawing/2014/main" id="{7635E9DB-83F2-E704-FD46-CDF46CA33FA0}"/>
+                  </a:ext>
+                </a:extLst>
+              </p:cNvPr>
+              <p:cNvSpPr txBox="1"/>
+              <p:nvPr/>
+            </p:nvSpPr>
+            <p:spPr>
+              <a:xfrm>
+                <a:off x="6496487" y="3940837"/>
+                <a:ext cx="466794" cy="369332"/>
+              </a:xfrm>
+              <a:prstGeom prst="rect">
+                <a:avLst/>
+              </a:prstGeom>
+              <a:noFill/>
+            </p:spPr>
+            <p:txBody>
+              <a:bodyPr wrap="none" rtlCol="0">
+                <a:spAutoFit/>
+              </a:bodyPr>
+              <a:lstStyle/>
+              <a:p>
+                <a:r>
+                  <a:rPr lang="en-US" dirty="0">
+                    <a:solidFill>
+                      <a:schemeClr val="bg1"/>
+                    </a:solidFill>
+                    <a:latin typeface="Arial" panose="020B0604020202020204" pitchFamily="34" charset="0"/>
+                    <a:cs typeface="Arial" panose="020B0604020202020204" pitchFamily="34" charset="0"/>
+                  </a:rPr>
+                  <a:t>(b)</a:t>
+                </a:r>
+              </a:p>
+            </p:txBody>
+          </p:sp>
+          <p:sp>
+            <p:nvSpPr>
+              <p:cNvPr id="44" name="TextBox 43">
+                <a:extLst>
+                  <a:ext uri="{FF2B5EF4-FFF2-40B4-BE49-F238E27FC236}">
+                    <a16:creationId xmlns:a16="http://schemas.microsoft.com/office/drawing/2014/main" id="{D2B8250C-F6B6-6B66-3B6D-5658ED4AB649}"/>
+                  </a:ext>
+                </a:extLst>
+              </p:cNvPr>
+              <p:cNvSpPr txBox="1"/>
+              <p:nvPr/>
+            </p:nvSpPr>
+            <p:spPr>
+              <a:xfrm>
+                <a:off x="7411727" y="3940837"/>
+                <a:ext cx="1338828" cy="369332"/>
+              </a:xfrm>
+              <a:prstGeom prst="rect">
+                <a:avLst/>
+              </a:prstGeom>
+              <a:noFill/>
+            </p:spPr>
+            <p:txBody>
+              <a:bodyPr wrap="none" rtlCol="0">
+                <a:spAutoFit/>
+              </a:bodyPr>
+              <a:lstStyle/>
+              <a:p>
+                <a:r>
+                  <a:rPr lang="en-US" dirty="0">
+                    <a:solidFill>
+                      <a:schemeClr val="bg1"/>
+                    </a:solidFill>
+                    <a:latin typeface="Arial" panose="020B0604020202020204" pitchFamily="34" charset="0"/>
+                    <a:cs typeface="Arial" panose="020B0604020202020204" pitchFamily="34" charset="0"/>
+                  </a:rPr>
+                  <a:t>Occupancy</a:t>
+                </a:r>
+              </a:p>
+            </p:txBody>
+          </p:sp>
+          <p:sp>
+            <p:nvSpPr>
+              <p:cNvPr id="45" name="TextBox 44">
+                <a:extLst>
+                  <a:ext uri="{FF2B5EF4-FFF2-40B4-BE49-F238E27FC236}">
+                    <a16:creationId xmlns:a16="http://schemas.microsoft.com/office/drawing/2014/main" id="{56E2DC75-767E-3A90-E0E1-AB031E01BED1}"/>
+                  </a:ext>
+                </a:extLst>
+              </p:cNvPr>
+              <p:cNvSpPr txBox="1"/>
+              <p:nvPr/>
+            </p:nvSpPr>
+            <p:spPr>
+              <a:xfrm>
+                <a:off x="3139220" y="4166302"/>
+                <a:ext cx="1672253" cy="369332"/>
+              </a:xfrm>
+              <a:prstGeom prst="rect">
+                <a:avLst/>
+              </a:prstGeom>
+              <a:noFill/>
+            </p:spPr>
+            <p:txBody>
+              <a:bodyPr wrap="none" rtlCol="0">
+                <a:spAutoFit/>
+              </a:bodyPr>
+              <a:lstStyle/>
+              <a:p>
+                <a:r>
+                  <a:rPr lang="en-US" dirty="0">
+                    <a:latin typeface="Arial" panose="020B0604020202020204" pitchFamily="34" charset="0"/>
+                    <a:cs typeface="Arial" panose="020B0604020202020204" pitchFamily="34" charset="0"/>
+                  </a:rPr>
+                  <a:t>Density Space</a:t>
+                </a:r>
+              </a:p>
+            </p:txBody>
+          </p:sp>
           <p:pic>
             <p:nvPicPr>
-              <p:cNvPr id="34" name="Picture 33" descr="A picture containing screenshot, diagram, design&#10;&#10;Description automatically generated">
+              <p:cNvPr id="4" name="Picture 3" descr="A yellow cylindrical object with arrows&#10;&#10;Description automatically generated">
                 <a:extLst>
                   <a:ext uri="{FF2B5EF4-FFF2-40B4-BE49-F238E27FC236}">
-                    <a16:creationId xmlns:a16="http://schemas.microsoft.com/office/drawing/2014/main" id="{3972D254-2E17-4204-2495-CE05733662FD}"/>
+                    <a16:creationId xmlns:a16="http://schemas.microsoft.com/office/drawing/2014/main" id="{F562B671-B5EA-5028-0D9B-47E988F29B94}"/>
                   </a:ext>
                 </a:extLst>
               </p:cNvPr>
@@ -3819,164 +4168,63 @@
               </p:cNvPicPr>
               <p:nvPr/>
             </p:nvPicPr>
-            <p:blipFill rotWithShape="1">
-              <a:blip r:embed="rId2">
+            <p:blipFill>
+              <a:blip r:embed="rId5">
                 <a:extLst>
+                  <a:ext uri="{BEBA8EAE-BF5A-486C-A8C5-ECC9F3942E4B}">
+                    <a14:imgProps xmlns:a14="http://schemas.microsoft.com/office/drawing/2010/main">
+                      <a14:imgLayer r:embed="rId6">
+                        <a14:imgEffect>
+                          <a14:backgroundRemoval t="9524" b="96561" l="2808" r="91793">
+                            <a14:foregroundMark x1="22894" y1="89153" x2="6803" y2="99735"/>
+                            <a14:foregroundMark x1="6803" y1="99735" x2="5400" y2="79894"/>
+                            <a14:foregroundMark x1="5400" y1="79894" x2="14255" y2="70370"/>
+                            <a14:foregroundMark x1="14255" y1="70370" x2="5616" y2="79101"/>
+                            <a14:foregroundMark x1="5616" y1="79101" x2="11231" y2="93386"/>
+                            <a14:foregroundMark x1="11231" y1="93386" x2="2808" y2="92328"/>
+                            <a14:foregroundMark x1="2808" y1="92328" x2="7451" y2="96825"/>
+                            <a14:foregroundMark x1="28942" y1="51323" x2="38877" y2="44180"/>
+                            <a14:foregroundMark x1="38877" y1="44180" x2="29266" y2="49471"/>
+                            <a14:foregroundMark x1="29266" y1="49471" x2="29266" y2="49471"/>
+                            <a14:foregroundMark x1="87905" y1="11905" x2="91793" y2="17196"/>
+                            <a14:foregroundMark x1="90389" y1="13757" x2="80670" y2="12963"/>
+                            <a14:foregroundMark x1="80670" y1="12963" x2="83369" y2="12434"/>
+                            <a14:foregroundMark x1="84449" y1="9524" x2="76242" y2="13228"/>
+                            <a14:foregroundMark x1="90929" y1="11376" x2="84773" y2="9524"/>
+                            <a14:foregroundMark x1="86933" y1="9524" x2="90929" y2="12169"/>
+                            <a14:foregroundMark x1="31210" y1="48413" x2="41793" y2="39683"/>
+                            <a14:foregroundMark x1="39633" y1="41005" x2="44600" y2="37566"/>
+                          </a14:backgroundRemoval>
+                        </a14:imgEffect>
+                      </a14:imgLayer>
+                    </a14:imgProps>
+                  </a:ext>
                   <a:ext uri="{28A0092B-C50C-407E-A947-70E740481C1C}">
                     <a14:useLocalDpi xmlns:a14="http://schemas.microsoft.com/office/drawing/2010/main" val="0"/>
                   </a:ext>
                 </a:extLst>
               </a:blip>
-              <a:srcRect t="52197" r="58786"/>
-              <a:stretch/>
+              <a:stretch>
+                <a:fillRect/>
+              </a:stretch>
             </p:blipFill>
             <p:spPr>
-              <a:xfrm>
-                <a:off x="6417163" y="1421240"/>
-                <a:ext cx="2966986" cy="2957801"/>
+              <a:xfrm rot="1170268">
+                <a:off x="1249456" y="2175820"/>
+                <a:ext cx="2086023" cy="851530"/>
               </a:xfrm>
               <a:prstGeom prst="rect">
                 <a:avLst/>
               </a:prstGeom>
             </p:spPr>
           </p:pic>
-          <p:pic>
-            <p:nvPicPr>
-              <p:cNvPr id="36" name="Picture 35" descr="A picture containing screenshot, diagram, design&#10;&#10;Description automatically generated">
-                <a:extLst>
-                  <a:ext uri="{FF2B5EF4-FFF2-40B4-BE49-F238E27FC236}">
-                    <a16:creationId xmlns:a16="http://schemas.microsoft.com/office/drawing/2014/main" id="{6F586AEA-CC53-8498-5891-1D4BA5DED2E5}"/>
-                  </a:ext>
-                </a:extLst>
-              </p:cNvPr>
-              <p:cNvPicPr>
-                <a:picLocks noChangeAspect="1"/>
-              </p:cNvPicPr>
-              <p:nvPr/>
-            </p:nvPicPr>
-            <p:blipFill rotWithShape="1">
-              <a:blip r:embed="rId2">
-                <a:extLst>
-                  <a:ext uri="{28A0092B-C50C-407E-A947-70E740481C1C}">
-                    <a14:useLocalDpi xmlns:a14="http://schemas.microsoft.com/office/drawing/2010/main" val="0"/>
-                  </a:ext>
-                </a:extLst>
-              </a:blip>
-              <a:srcRect l="8770" t="90881" r="83539"/>
-              <a:stretch/>
-            </p:blipFill>
-            <p:spPr>
-              <a:xfrm>
-                <a:off x="6452672" y="3814816"/>
-                <a:ext cx="553673" cy="564225"/>
-              </a:xfrm>
-              <a:prstGeom prst="rect">
-                <a:avLst/>
-              </a:prstGeom>
-            </p:spPr>
-          </p:pic>
-          <p:sp>
-            <p:nvSpPr>
-              <p:cNvPr id="37" name="Rectangle 36">
-                <a:extLst>
-                  <a:ext uri="{FF2B5EF4-FFF2-40B4-BE49-F238E27FC236}">
-                    <a16:creationId xmlns:a16="http://schemas.microsoft.com/office/drawing/2014/main" id="{B5D94C0B-0B05-3A6C-91CC-95FDE86CEC77}"/>
-                  </a:ext>
-                </a:extLst>
-              </p:cNvPr>
-              <p:cNvSpPr/>
-              <p:nvPr/>
-            </p:nvSpPr>
-            <p:spPr>
-              <a:xfrm>
-                <a:off x="6233014" y="2179548"/>
-                <a:ext cx="234898" cy="2202180"/>
-              </a:xfrm>
-              <a:prstGeom prst="rect">
-                <a:avLst/>
-              </a:prstGeom>
-              <a:solidFill>
-                <a:schemeClr val="bg1"/>
-              </a:solidFill>
-              <a:ln>
-                <a:solidFill>
-                  <a:schemeClr val="bg1"/>
-                </a:solidFill>
-              </a:ln>
-            </p:spPr>
-            <p:style>
-              <a:lnRef idx="2">
-                <a:schemeClr val="accent1">
-                  <a:shade val="50000"/>
-                </a:schemeClr>
-              </a:lnRef>
-              <a:fillRef idx="1">
-                <a:schemeClr val="accent1"/>
-              </a:fillRef>
-              <a:effectRef idx="0">
-                <a:schemeClr val="accent1"/>
-              </a:effectRef>
-              <a:fontRef idx="minor">
-                <a:schemeClr val="lt1"/>
-              </a:fontRef>
-            </p:style>
-            <p:txBody>
-              <a:bodyPr rtlCol="0" anchor="ctr"/>
-              <a:lstStyle/>
-              <a:p>
-                <a:pPr algn="ctr"/>
-                <a:endParaRPr lang="en-US"/>
-              </a:p>
-            </p:txBody>
-          </p:sp>
         </p:grpSp>
-        <p:cxnSp>
-          <p:nvCxnSpPr>
-            <p:cNvPr id="41" name="Straight Arrow Connector 40">
+        <p:sp>
+          <p:nvSpPr>
+            <p:cNvPr id="3" name="TextBox 2">
               <a:extLst>
                 <a:ext uri="{FF2B5EF4-FFF2-40B4-BE49-F238E27FC236}">
-                  <a16:creationId xmlns:a16="http://schemas.microsoft.com/office/drawing/2014/main" id="{C1A76C46-9480-F085-4FFF-611D2669624F}"/>
-                </a:ext>
-              </a:extLst>
-            </p:cNvPr>
-            <p:cNvCxnSpPr>
-              <a:stCxn id="5" idx="3"/>
-            </p:cNvCxnSpPr>
-            <p:nvPr/>
-          </p:nvCxnSpPr>
-          <p:spPr>
-            <a:xfrm>
-              <a:off x="5790090" y="2967990"/>
-              <a:ext cx="579423" cy="8024"/>
-            </a:xfrm>
-            <a:prstGeom prst="straightConnector1">
-              <a:avLst/>
-            </a:prstGeom>
-            <a:ln w="57150">
-              <a:tailEnd type="triangle"/>
-            </a:ln>
-          </p:spPr>
-          <p:style>
-            <a:lnRef idx="1">
-              <a:schemeClr val="dk1"/>
-            </a:lnRef>
-            <a:fillRef idx="0">
-              <a:schemeClr val="dk1"/>
-            </a:fillRef>
-            <a:effectRef idx="0">
-              <a:schemeClr val="dk1"/>
-            </a:effectRef>
-            <a:fontRef idx="minor">
-              <a:schemeClr val="tx1"/>
-            </a:fontRef>
-          </p:style>
-        </p:cxnSp>
-        <p:sp>
-          <p:nvSpPr>
-            <p:cNvPr id="42" name="TextBox 41">
-              <a:extLst>
-                <a:ext uri="{FF2B5EF4-FFF2-40B4-BE49-F238E27FC236}">
-                  <a16:creationId xmlns:a16="http://schemas.microsoft.com/office/drawing/2014/main" id="{C594CD6D-3D90-391F-AF52-7FCF07BD7E69}"/>
+                  <a16:creationId xmlns:a16="http://schemas.microsoft.com/office/drawing/2014/main" id="{21BDB62D-46B1-2D06-7FDD-23BD0BE9A7A4}"/>
                 </a:ext>
               </a:extLst>
             </p:cNvPr>
@@ -3985,8 +4233,8 @@
           </p:nvSpPr>
           <p:spPr>
             <a:xfrm>
-              <a:off x="2179957" y="1703272"/>
-              <a:ext cx="466794" cy="369332"/>
+              <a:off x="1378551" y="2737604"/>
+              <a:ext cx="659155" cy="369332"/>
             </a:xfrm>
             <a:prstGeom prst="rect">
               <a:avLst/>
@@ -4004,195 +4252,11 @@
                   <a:latin typeface="Arial" panose="020B0604020202020204" pitchFamily="34" charset="0"/>
                   <a:cs typeface="Arial" panose="020B0604020202020204" pitchFamily="34" charset="0"/>
                 </a:rPr>
-                <a:t>(a)</a:t>
+                <a:t>AUV</a:t>
               </a:r>
             </a:p>
           </p:txBody>
         </p:sp>
-        <p:sp>
-          <p:nvSpPr>
-            <p:cNvPr id="43" name="TextBox 42">
-              <a:extLst>
-                <a:ext uri="{FF2B5EF4-FFF2-40B4-BE49-F238E27FC236}">
-                  <a16:creationId xmlns:a16="http://schemas.microsoft.com/office/drawing/2014/main" id="{7635E9DB-83F2-E704-FD46-CDF46CA33FA0}"/>
-                </a:ext>
-              </a:extLst>
-            </p:cNvPr>
-            <p:cNvSpPr txBox="1"/>
-            <p:nvPr/>
-          </p:nvSpPr>
-          <p:spPr>
-            <a:xfrm>
-              <a:off x="6496487" y="3940837"/>
-              <a:ext cx="466794" cy="369332"/>
-            </a:xfrm>
-            <a:prstGeom prst="rect">
-              <a:avLst/>
-            </a:prstGeom>
-            <a:noFill/>
-          </p:spPr>
-          <p:txBody>
-            <a:bodyPr wrap="none" rtlCol="0">
-              <a:spAutoFit/>
-            </a:bodyPr>
-            <a:lstStyle/>
-            <a:p>
-              <a:r>
-                <a:rPr lang="en-US" dirty="0">
-                  <a:solidFill>
-                    <a:schemeClr val="bg1"/>
-                  </a:solidFill>
-                  <a:latin typeface="Arial" panose="020B0604020202020204" pitchFamily="34" charset="0"/>
-                  <a:cs typeface="Arial" panose="020B0604020202020204" pitchFamily="34" charset="0"/>
-                </a:rPr>
-                <a:t>(b)</a:t>
-              </a:r>
-            </a:p>
-          </p:txBody>
-        </p:sp>
-        <p:sp>
-          <p:nvSpPr>
-            <p:cNvPr id="44" name="TextBox 43">
-              <a:extLst>
-                <a:ext uri="{FF2B5EF4-FFF2-40B4-BE49-F238E27FC236}">
-                  <a16:creationId xmlns:a16="http://schemas.microsoft.com/office/drawing/2014/main" id="{D2B8250C-F6B6-6B66-3B6D-5658ED4AB649}"/>
-                </a:ext>
-              </a:extLst>
-            </p:cNvPr>
-            <p:cNvSpPr txBox="1"/>
-            <p:nvPr/>
-          </p:nvSpPr>
-          <p:spPr>
-            <a:xfrm>
-              <a:off x="7411727" y="3940837"/>
-              <a:ext cx="1338828" cy="369332"/>
-            </a:xfrm>
-            <a:prstGeom prst="rect">
-              <a:avLst/>
-            </a:prstGeom>
-            <a:noFill/>
-          </p:spPr>
-          <p:txBody>
-            <a:bodyPr wrap="none" rtlCol="0">
-              <a:spAutoFit/>
-            </a:bodyPr>
-            <a:lstStyle/>
-            <a:p>
-              <a:r>
-                <a:rPr lang="en-US" dirty="0">
-                  <a:solidFill>
-                    <a:schemeClr val="bg1"/>
-                  </a:solidFill>
-                  <a:latin typeface="Arial" panose="020B0604020202020204" pitchFamily="34" charset="0"/>
-                  <a:cs typeface="Arial" panose="020B0604020202020204" pitchFamily="34" charset="0"/>
-                </a:rPr>
-                <a:t>Occupancy</a:t>
-              </a:r>
-            </a:p>
-          </p:txBody>
-        </p:sp>
-        <p:sp>
-          <p:nvSpPr>
-            <p:cNvPr id="45" name="TextBox 44">
-              <a:extLst>
-                <a:ext uri="{FF2B5EF4-FFF2-40B4-BE49-F238E27FC236}">
-                  <a16:creationId xmlns:a16="http://schemas.microsoft.com/office/drawing/2014/main" id="{56E2DC75-767E-3A90-E0E1-AB031E01BED1}"/>
-                </a:ext>
-              </a:extLst>
-            </p:cNvPr>
-            <p:cNvSpPr txBox="1"/>
-            <p:nvPr/>
-          </p:nvSpPr>
-          <p:spPr>
-            <a:xfrm>
-              <a:off x="3139220" y="4166302"/>
-              <a:ext cx="1672253" cy="369332"/>
-            </a:xfrm>
-            <a:prstGeom prst="rect">
-              <a:avLst/>
-            </a:prstGeom>
-            <a:noFill/>
-          </p:spPr>
-          <p:txBody>
-            <a:bodyPr wrap="none" rtlCol="0">
-              <a:spAutoFit/>
-            </a:bodyPr>
-            <a:lstStyle/>
-            <a:p>
-              <a:r>
-                <a:rPr lang="en-US" dirty="0">
-                  <a:latin typeface="Arial" panose="020B0604020202020204" pitchFamily="34" charset="0"/>
-                  <a:cs typeface="Arial" panose="020B0604020202020204" pitchFamily="34" charset="0"/>
-                </a:rPr>
-                <a:t>Density Space</a:t>
-              </a:r>
-            </a:p>
-          </p:txBody>
-        </p:sp>
-        <p:pic>
-          <p:nvPicPr>
-            <p:cNvPr id="4" name="Picture 3" descr="A yellow cylindrical object with arrows&#10;&#10;Description automatically generated">
-              <a:extLst>
-                <a:ext uri="{FF2B5EF4-FFF2-40B4-BE49-F238E27FC236}">
-                  <a16:creationId xmlns:a16="http://schemas.microsoft.com/office/drawing/2014/main" id="{F562B671-B5EA-5028-0D9B-47E988F29B94}"/>
-                </a:ext>
-              </a:extLst>
-            </p:cNvPr>
-            <p:cNvPicPr>
-              <a:picLocks noChangeAspect="1"/>
-            </p:cNvPicPr>
-            <p:nvPr/>
-          </p:nvPicPr>
-          <p:blipFill>
-            <a:blip r:embed="rId5">
-              <a:extLst>
-                <a:ext uri="{BEBA8EAE-BF5A-486C-A8C5-ECC9F3942E4B}">
-                  <a14:imgProps xmlns:a14="http://schemas.microsoft.com/office/drawing/2010/main">
-                    <a14:imgLayer r:embed="rId6">
-                      <a14:imgEffect>
-                        <a14:backgroundRemoval t="9524" b="96561" l="2808" r="91793">
-                          <a14:foregroundMark x1="22894" y1="89153" x2="6803" y2="99735"/>
-                          <a14:foregroundMark x1="6803" y1="99735" x2="5400" y2="79894"/>
-                          <a14:foregroundMark x1="5400" y1="79894" x2="14255" y2="70370"/>
-                          <a14:foregroundMark x1="14255" y1="70370" x2="5616" y2="79101"/>
-                          <a14:foregroundMark x1="5616" y1="79101" x2="11231" y2="93386"/>
-                          <a14:foregroundMark x1="11231" y1="93386" x2="2808" y2="92328"/>
-                          <a14:foregroundMark x1="2808" y1="92328" x2="7451" y2="96825"/>
-                          <a14:foregroundMark x1="28942" y1="51323" x2="38877" y2="44180"/>
-                          <a14:foregroundMark x1="38877" y1="44180" x2="29266" y2="49471"/>
-                          <a14:foregroundMark x1="29266" y1="49471" x2="29266" y2="49471"/>
-                          <a14:foregroundMark x1="87905" y1="11905" x2="91793" y2="17196"/>
-                          <a14:foregroundMark x1="90389" y1="13757" x2="80670" y2="12963"/>
-                          <a14:foregroundMark x1="80670" y1="12963" x2="83369" y2="12434"/>
-                          <a14:foregroundMark x1="84449" y1="9524" x2="76242" y2="13228"/>
-                          <a14:foregroundMark x1="90929" y1="11376" x2="84773" y2="9524"/>
-                          <a14:foregroundMark x1="86933" y1="9524" x2="90929" y2="12169"/>
-                          <a14:foregroundMark x1="31210" y1="48413" x2="41793" y2="39683"/>
-                          <a14:foregroundMark x1="39633" y1="41005" x2="44600" y2="37566"/>
-                        </a14:backgroundRemoval>
-                      </a14:imgEffect>
-                    </a14:imgLayer>
-                  </a14:imgProps>
-                </a:ext>
-                <a:ext uri="{28A0092B-C50C-407E-A947-70E740481C1C}">
-                  <a14:useLocalDpi xmlns:a14="http://schemas.microsoft.com/office/drawing/2010/main" val="0"/>
-                </a:ext>
-              </a:extLst>
-            </a:blip>
-            <a:stretch>
-              <a:fillRect/>
-            </a:stretch>
-          </p:blipFill>
-          <p:spPr>
-            <a:xfrm rot="1170268">
-              <a:off x="1249456" y="2175820"/>
-              <a:ext cx="2086023" cy="851530"/>
-            </a:xfrm>
-            <a:prstGeom prst="rect">
-              <a:avLst/>
-            </a:prstGeom>
-          </p:spPr>
-        </p:pic>
       </p:grpSp>
     </p:spTree>
     <p:extLst>

</xml_diff>